<commit_message>
Fixed the bug where the graph doesn't include the maximum x tick.
</commit_message>
<xml_diff>
--- a/Ball_and_stick_graph/Presentation.pptx
+++ b/Ball_and_stick_graph/Presentation.pptx
@@ -3596,15 +3596,15 @@
           </p:nvSpPr>
           <p:spPr>
             <a:xfrm>
-              <a:off x="5153083" y="2402547"/>
-              <a:ext cx="2275809" cy="0"/>
+              <a:off x="5134043" y="2402547"/>
+              <a:ext cx="2257894" cy="0"/>
             </a:xfrm>
             <a:custGeom>
               <a:avLst/>
               <a:pathLst>
-                <a:path w="2275809" h="0">
+                <a:path w="2257894" h="0">
                   <a:moveTo>
-                    <a:pt x="2275809" y="0"/>
+                    <a:pt x="2257894" y="0"/>
                   </a:moveTo>
                   <a:lnTo>
                     <a:pt x="0" y="0"/>
@@ -3636,18 +3636,18 @@
           </p:nvSpPr>
           <p:spPr>
             <a:xfrm>
-              <a:off x="6191577" y="2041971"/>
-              <a:ext cx="555319" cy="0"/>
+              <a:off x="6164362" y="2041971"/>
+              <a:ext cx="550947" cy="0"/>
             </a:xfrm>
             <a:custGeom>
               <a:avLst/>
               <a:pathLst>
-                <a:path w="555319" h="0">
+                <a:path w="550947" h="0">
                   <a:moveTo>
                     <a:pt x="0" y="0"/>
                   </a:moveTo>
                   <a:lnTo>
-                    <a:pt x="555319" y="0"/>
+                    <a:pt x="550947" y="0"/>
                   </a:lnTo>
                 </a:path>
               </a:pathLst>
@@ -3716,7 +3716,7 @@
           </p:nvSpPr>
           <p:spPr>
             <a:xfrm>
-              <a:off x="3313451" y="1825625"/>
+              <a:off x="3308893" y="1825625"/>
               <a:ext cx="0" cy="793268"/>
             </a:xfrm>
             <a:custGeom>
@@ -3756,7 +3756,7 @@
           </p:nvSpPr>
           <p:spPr>
             <a:xfrm>
-              <a:off x="3892505" y="1825625"/>
+              <a:off x="3883388" y="1825625"/>
               <a:ext cx="0" cy="793268"/>
             </a:xfrm>
             <a:custGeom>
@@ -3796,7 +3796,7 @@
           </p:nvSpPr>
           <p:spPr>
             <a:xfrm>
-              <a:off x="4471558" y="1825625"/>
+              <a:off x="4457884" y="1825625"/>
               <a:ext cx="0" cy="793268"/>
             </a:xfrm>
             <a:custGeom>
@@ -3836,7 +3836,7 @@
           </p:nvSpPr>
           <p:spPr>
             <a:xfrm>
-              <a:off x="5050612" y="1825625"/>
+              <a:off x="5032379" y="1825625"/>
               <a:ext cx="0" cy="793268"/>
             </a:xfrm>
             <a:custGeom>
@@ -3876,7 +3876,7 @@
           </p:nvSpPr>
           <p:spPr>
             <a:xfrm>
-              <a:off x="5629665" y="1825625"/>
+              <a:off x="5606874" y="1825625"/>
               <a:ext cx="0" cy="793268"/>
             </a:xfrm>
             <a:custGeom>
@@ -3916,7 +3916,7 @@
           </p:nvSpPr>
           <p:spPr>
             <a:xfrm>
-              <a:off x="6208719" y="1825625"/>
+              <a:off x="6181369" y="1825625"/>
               <a:ext cx="0" cy="793268"/>
             </a:xfrm>
             <a:custGeom>
@@ -3956,7 +3956,7 @@
           </p:nvSpPr>
           <p:spPr>
             <a:xfrm>
-              <a:off x="6787773" y="1825625"/>
+              <a:off x="6755864" y="1825625"/>
               <a:ext cx="0" cy="793268"/>
             </a:xfrm>
             <a:custGeom>
@@ -3996,7 +3996,7 @@
           </p:nvSpPr>
           <p:spPr>
             <a:xfrm>
-              <a:off x="7366826" y="1825625"/>
+              <a:off x="7330360" y="1825625"/>
               <a:ext cx="0" cy="793268"/>
             </a:xfrm>
             <a:custGeom>
@@ -4036,7 +4036,7 @@
           </p:nvSpPr>
           <p:spPr>
             <a:xfrm>
-              <a:off x="7945880" y="1825625"/>
+              <a:off x="7904855" y="1825625"/>
               <a:ext cx="0" cy="793268"/>
             </a:xfrm>
             <a:custGeom>
@@ -4070,13 +4070,53 @@
         </p:sp>
         <p:sp>
           <p:nvSpPr>
-            <p:cNvPr id="22" name="pt20"/>
-            <p:cNvSpPr/>
-            <p:nvPr/>
-          </p:nvSpPr>
-          <p:spPr>
-            <a:xfrm>
-              <a:off x="6122509" y="1972903"/>
+            <p:cNvPr id="22" name="pl20"/>
+            <p:cNvSpPr/>
+            <p:nvPr/>
+          </p:nvSpPr>
+          <p:spPr>
+            <a:xfrm>
+              <a:off x="8479350" y="1825625"/>
+              <a:ext cx="0" cy="793268"/>
+            </a:xfrm>
+            <a:custGeom>
+              <a:avLst/>
+              <a:pathLst>
+                <a:path w="0" h="793268">
+                  <a:moveTo>
+                    <a:pt x="0" y="793268"/>
+                  </a:moveTo>
+                  <a:lnTo>
+                    <a:pt x="0" y="0"/>
+                  </a:lnTo>
+                </a:path>
+              </a:pathLst>
+            </a:custGeom>
+            <a:ln w="13550" cap="flat">
+              <a:solidFill>
+                <a:srgbClr val="FFFFFF">
+                  <a:alpha val="100000"/>
+                </a:srgbClr>
+              </a:solidFill>
+              <a:prstDash val="solid"/>
+              <a:round/>
+            </a:ln>
+          </p:spPr>
+          <p:txBody>
+            <a:bodyPr/>
+            <a:lstStyle/>
+            <a:p/>
+          </p:txBody>
+        </p:sp>
+        <p:sp>
+          <p:nvSpPr>
+            <p:cNvPr id="23" name="pt21"/>
+            <p:cNvSpPr/>
+            <p:nvPr/>
+          </p:nvSpPr>
+          <p:spPr>
+            <a:xfrm>
+              <a:off x="6095294" y="1972903"/>
               <a:ext cx="138135" cy="138135"/>
             </a:xfrm>
             <a:prstGeom prst="ellipse">
@@ -4105,13 +4145,13 @@
         </p:sp>
         <p:sp>
           <p:nvSpPr>
-            <p:cNvPr id="23" name="pt21"/>
-            <p:cNvSpPr/>
-            <p:nvPr/>
-          </p:nvSpPr>
-          <p:spPr>
-            <a:xfrm>
-              <a:off x="6677828" y="1972903"/>
+            <p:cNvPr id="24" name="pt22"/>
+            <p:cNvSpPr/>
+            <p:nvPr/>
+          </p:nvSpPr>
+          <p:spPr>
+            <a:xfrm>
+              <a:off x="6646242" y="1972903"/>
               <a:ext cx="138135" cy="138135"/>
             </a:xfrm>
             <a:prstGeom prst="ellipse">
@@ -4140,13 +4180,13 @@
         </p:sp>
         <p:sp>
           <p:nvSpPr>
-            <p:cNvPr id="24" name="pt22"/>
-            <p:cNvSpPr/>
-            <p:nvPr/>
-          </p:nvSpPr>
-          <p:spPr>
-            <a:xfrm>
-              <a:off x="7359825" y="2333479"/>
+            <p:cNvPr id="25" name="pt23"/>
+            <p:cNvSpPr/>
+            <p:nvPr/>
+          </p:nvSpPr>
+          <p:spPr>
+            <a:xfrm>
+              <a:off x="7322870" y="2333479"/>
               <a:ext cx="138135" cy="138135"/>
             </a:xfrm>
             <a:prstGeom prst="ellipse">
@@ -4175,13 +4215,13 @@
         </p:sp>
         <p:sp>
           <p:nvSpPr>
-            <p:cNvPr id="25" name="pt23"/>
-            <p:cNvSpPr/>
-            <p:nvPr/>
-          </p:nvSpPr>
-          <p:spPr>
-            <a:xfrm>
-              <a:off x="5084015" y="2333479"/>
+            <p:cNvPr id="26" name="pt24"/>
+            <p:cNvSpPr/>
+            <p:nvPr/>
+          </p:nvSpPr>
+          <p:spPr>
+            <a:xfrm>
+              <a:off x="5064975" y="2333479"/>
               <a:ext cx="138135" cy="138135"/>
             </a:xfrm>
             <a:prstGeom prst="ellipse">
@@ -4210,7 +4250,7 @@
         </p:sp>
         <p:sp>
           <p:nvSpPr>
-            <p:cNvPr id="26" name="rc24"/>
+            <p:cNvPr id="27" name="rc25"/>
             <p:cNvSpPr/>
             <p:nvPr/>
           </p:nvSpPr>
@@ -4231,7 +4271,7 @@
         </p:sp>
         <p:sp>
           <p:nvSpPr>
-            <p:cNvPr id="27" name="pl25"/>
+            <p:cNvPr id="28" name="pl26"/>
             <p:cNvSpPr/>
             <p:nvPr/>
           </p:nvSpPr>
@@ -4274,7 +4314,7 @@
         </p:sp>
         <p:sp>
           <p:nvSpPr>
-            <p:cNvPr id="28" name="pl26"/>
+            <p:cNvPr id="29" name="pl27"/>
             <p:cNvSpPr/>
             <p:nvPr/>
           </p:nvSpPr>
@@ -4317,7 +4357,7 @@
         </p:sp>
         <p:sp>
           <p:nvSpPr>
-            <p:cNvPr id="29" name="pl27"/>
+            <p:cNvPr id="30" name="pl28"/>
             <p:cNvSpPr/>
             <p:nvPr/>
           </p:nvSpPr>
@@ -4360,7 +4400,7 @@
         </p:sp>
         <p:sp>
           <p:nvSpPr>
-            <p:cNvPr id="30" name="pl28"/>
+            <p:cNvPr id="31" name="pl29"/>
             <p:cNvSpPr/>
             <p:nvPr/>
           </p:nvSpPr>
@@ -4403,21 +4443,21 @@
         </p:sp>
         <p:sp>
           <p:nvSpPr>
-            <p:cNvPr id="31" name="pl29"/>
-            <p:cNvSpPr/>
-            <p:nvPr/>
-          </p:nvSpPr>
-          <p:spPr>
-            <a:xfrm>
-              <a:off x="3383258" y="4068800"/>
-              <a:ext cx="4301702" cy="0"/>
+            <p:cNvPr id="32" name="pl30"/>
+            <p:cNvSpPr/>
+            <p:nvPr/>
+          </p:nvSpPr>
+          <p:spPr>
+            <a:xfrm>
+              <a:off x="3378150" y="4068800"/>
+              <a:ext cx="4267839" cy="0"/>
             </a:xfrm>
             <a:custGeom>
               <a:avLst/>
               <a:pathLst>
-                <a:path w="4301702" h="0">
+                <a:path w="4267839" h="0">
                   <a:moveTo>
-                    <a:pt x="4301702" y="0"/>
+                    <a:pt x="4267839" y="0"/>
                   </a:moveTo>
                   <a:lnTo>
                     <a:pt x="0" y="0"/>
@@ -4443,24 +4483,24 @@
         </p:sp>
         <p:sp>
           <p:nvSpPr>
-            <p:cNvPr id="32" name="pl30"/>
-            <p:cNvSpPr/>
-            <p:nvPr/>
-          </p:nvSpPr>
-          <p:spPr>
-            <a:xfrm>
-              <a:off x="5280546" y="3708223"/>
-              <a:ext cx="3150957" cy="0"/>
+            <p:cNvPr id="33" name="pl31"/>
+            <p:cNvSpPr/>
+            <p:nvPr/>
+          </p:nvSpPr>
+          <p:spPr>
+            <a:xfrm>
+              <a:off x="5260503" y="3708223"/>
+              <a:ext cx="3126152" cy="0"/>
             </a:xfrm>
             <a:custGeom>
               <a:avLst/>
               <a:pathLst>
-                <a:path w="3150957" h="0">
+                <a:path w="3126152" h="0">
                   <a:moveTo>
                     <a:pt x="0" y="0"/>
                   </a:moveTo>
                   <a:lnTo>
-                    <a:pt x="3150957" y="0"/>
+                    <a:pt x="3126152" y="0"/>
                   </a:lnTo>
                 </a:path>
               </a:pathLst>
@@ -4483,21 +4523,21 @@
         </p:sp>
         <p:sp>
           <p:nvSpPr>
-            <p:cNvPr id="33" name="pl31"/>
-            <p:cNvSpPr/>
-            <p:nvPr/>
-          </p:nvSpPr>
-          <p:spPr>
-            <a:xfrm>
-              <a:off x="4750363" y="3347646"/>
-              <a:ext cx="2501097" cy="0"/>
+            <p:cNvPr id="34" name="pl32"/>
+            <p:cNvSpPr/>
+            <p:nvPr/>
+          </p:nvSpPr>
+          <p:spPr>
+            <a:xfrm>
+              <a:off x="4734493" y="3347646"/>
+              <a:ext cx="2481408" cy="0"/>
             </a:xfrm>
             <a:custGeom>
               <a:avLst/>
               <a:pathLst>
-                <a:path w="2501097" h="0">
+                <a:path w="2481408" h="0">
                   <a:moveTo>
-                    <a:pt x="2501097" y="0"/>
+                    <a:pt x="2481408" y="0"/>
                   </a:moveTo>
                   <a:lnTo>
                     <a:pt x="0" y="0"/>
@@ -4523,24 +4563,24 @@
         </p:sp>
         <p:sp>
           <p:nvSpPr>
-            <p:cNvPr id="34" name="pl32"/>
-            <p:cNvSpPr/>
-            <p:nvPr/>
-          </p:nvSpPr>
-          <p:spPr>
-            <a:xfrm>
-              <a:off x="5340074" y="2987070"/>
-              <a:ext cx="3139276" cy="0"/>
+            <p:cNvPr id="35" name="pl33"/>
+            <p:cNvSpPr/>
+            <p:nvPr/>
+          </p:nvSpPr>
+          <p:spPr>
+            <a:xfrm>
+              <a:off x="5319562" y="2987070"/>
+              <a:ext cx="3114564" cy="0"/>
             </a:xfrm>
             <a:custGeom>
               <a:avLst/>
               <a:pathLst>
-                <a:path w="3139276" h="0">
+                <a:path w="3114564" h="0">
                   <a:moveTo>
                     <a:pt x="0" y="0"/>
                   </a:moveTo>
                   <a:lnTo>
-                    <a:pt x="3139276" y="0"/>
+                    <a:pt x="3114564" y="0"/>
                   </a:lnTo>
                 </a:path>
               </a:pathLst>
@@ -4563,7 +4603,7 @@
         </p:sp>
         <p:sp>
           <p:nvSpPr>
-            <p:cNvPr id="35" name="pl33"/>
+            <p:cNvPr id="36" name="pl34"/>
             <p:cNvSpPr/>
             <p:nvPr/>
           </p:nvSpPr>
@@ -4606,13 +4646,13 @@
         </p:sp>
         <p:sp>
           <p:nvSpPr>
-            <p:cNvPr id="36" name="pl34"/>
-            <p:cNvSpPr/>
-            <p:nvPr/>
-          </p:nvSpPr>
-          <p:spPr>
-            <a:xfrm>
-              <a:off x="3313451" y="2770724"/>
+            <p:cNvPr id="37" name="pl35"/>
+            <p:cNvSpPr/>
+            <p:nvPr/>
+          </p:nvSpPr>
+          <p:spPr>
+            <a:xfrm>
+              <a:off x="3308893" y="2770724"/>
               <a:ext cx="0" cy="1514422"/>
             </a:xfrm>
             <a:custGeom>
@@ -4649,13 +4689,13 @@
         </p:sp>
         <p:sp>
           <p:nvSpPr>
-            <p:cNvPr id="37" name="pl35"/>
-            <p:cNvSpPr/>
-            <p:nvPr/>
-          </p:nvSpPr>
-          <p:spPr>
-            <a:xfrm>
-              <a:off x="3892505" y="2770724"/>
+            <p:cNvPr id="38" name="pl36"/>
+            <p:cNvSpPr/>
+            <p:nvPr/>
+          </p:nvSpPr>
+          <p:spPr>
+            <a:xfrm>
+              <a:off x="3883388" y="2770724"/>
               <a:ext cx="0" cy="1514422"/>
             </a:xfrm>
             <a:custGeom>
@@ -4692,13 +4732,13 @@
         </p:sp>
         <p:sp>
           <p:nvSpPr>
-            <p:cNvPr id="38" name="pl36"/>
-            <p:cNvSpPr/>
-            <p:nvPr/>
-          </p:nvSpPr>
-          <p:spPr>
-            <a:xfrm>
-              <a:off x="4471558" y="2770724"/>
+            <p:cNvPr id="39" name="pl37"/>
+            <p:cNvSpPr/>
+            <p:nvPr/>
+          </p:nvSpPr>
+          <p:spPr>
+            <a:xfrm>
+              <a:off x="4457884" y="2770724"/>
               <a:ext cx="0" cy="1514422"/>
             </a:xfrm>
             <a:custGeom>
@@ -4735,13 +4775,13 @@
         </p:sp>
         <p:sp>
           <p:nvSpPr>
-            <p:cNvPr id="39" name="pl37"/>
-            <p:cNvSpPr/>
-            <p:nvPr/>
-          </p:nvSpPr>
-          <p:spPr>
-            <a:xfrm>
-              <a:off x="5050612" y="2770724"/>
+            <p:cNvPr id="40" name="pl38"/>
+            <p:cNvSpPr/>
+            <p:nvPr/>
+          </p:nvSpPr>
+          <p:spPr>
+            <a:xfrm>
+              <a:off x="5032379" y="2770724"/>
               <a:ext cx="0" cy="1514422"/>
             </a:xfrm>
             <a:custGeom>
@@ -4778,13 +4818,13 @@
         </p:sp>
         <p:sp>
           <p:nvSpPr>
-            <p:cNvPr id="40" name="pl38"/>
-            <p:cNvSpPr/>
-            <p:nvPr/>
-          </p:nvSpPr>
-          <p:spPr>
-            <a:xfrm>
-              <a:off x="5629665" y="2770724"/>
+            <p:cNvPr id="41" name="pl39"/>
+            <p:cNvSpPr/>
+            <p:nvPr/>
+          </p:nvSpPr>
+          <p:spPr>
+            <a:xfrm>
+              <a:off x="5606874" y="2770724"/>
               <a:ext cx="0" cy="1514422"/>
             </a:xfrm>
             <a:custGeom>
@@ -4821,13 +4861,13 @@
         </p:sp>
         <p:sp>
           <p:nvSpPr>
-            <p:cNvPr id="41" name="pl39"/>
-            <p:cNvSpPr/>
-            <p:nvPr/>
-          </p:nvSpPr>
-          <p:spPr>
-            <a:xfrm>
-              <a:off x="6208719" y="2770724"/>
+            <p:cNvPr id="42" name="pl40"/>
+            <p:cNvSpPr/>
+            <p:nvPr/>
+          </p:nvSpPr>
+          <p:spPr>
+            <a:xfrm>
+              <a:off x="6181369" y="2770724"/>
               <a:ext cx="0" cy="1514422"/>
             </a:xfrm>
             <a:custGeom>
@@ -4864,13 +4904,13 @@
         </p:sp>
         <p:sp>
           <p:nvSpPr>
-            <p:cNvPr id="42" name="pl40"/>
-            <p:cNvSpPr/>
-            <p:nvPr/>
-          </p:nvSpPr>
-          <p:spPr>
-            <a:xfrm>
-              <a:off x="6787773" y="2770724"/>
+            <p:cNvPr id="43" name="pl41"/>
+            <p:cNvSpPr/>
+            <p:nvPr/>
+          </p:nvSpPr>
+          <p:spPr>
+            <a:xfrm>
+              <a:off x="6755864" y="2770724"/>
               <a:ext cx="0" cy="1514422"/>
             </a:xfrm>
             <a:custGeom>
@@ -4907,13 +4947,13 @@
         </p:sp>
         <p:sp>
           <p:nvSpPr>
-            <p:cNvPr id="43" name="pl41"/>
-            <p:cNvSpPr/>
-            <p:nvPr/>
-          </p:nvSpPr>
-          <p:spPr>
-            <a:xfrm>
-              <a:off x="7366826" y="2770724"/>
+            <p:cNvPr id="44" name="pl42"/>
+            <p:cNvSpPr/>
+            <p:nvPr/>
+          </p:nvSpPr>
+          <p:spPr>
+            <a:xfrm>
+              <a:off x="7330360" y="2770724"/>
               <a:ext cx="0" cy="1514422"/>
             </a:xfrm>
             <a:custGeom>
@@ -4950,13 +4990,13 @@
         </p:sp>
         <p:sp>
           <p:nvSpPr>
-            <p:cNvPr id="44" name="pl42"/>
-            <p:cNvSpPr/>
-            <p:nvPr/>
-          </p:nvSpPr>
-          <p:spPr>
-            <a:xfrm>
-              <a:off x="7945880" y="2770724"/>
+            <p:cNvPr id="45" name="pl43"/>
+            <p:cNvSpPr/>
+            <p:nvPr/>
+          </p:nvSpPr>
+          <p:spPr>
+            <a:xfrm>
+              <a:off x="7904855" y="2770724"/>
               <a:ext cx="0" cy="1514422"/>
             </a:xfrm>
             <a:custGeom>
@@ -4993,13 +5033,56 @@
         </p:sp>
         <p:sp>
           <p:nvSpPr>
-            <p:cNvPr id="45" name="pt43"/>
-            <p:cNvSpPr/>
-            <p:nvPr/>
-          </p:nvSpPr>
-          <p:spPr>
-            <a:xfrm>
-              <a:off x="7182392" y="3278579"/>
+            <p:cNvPr id="46" name="pl44"/>
+            <p:cNvSpPr/>
+            <p:nvPr/>
+          </p:nvSpPr>
+          <p:spPr>
+            <a:xfrm>
+              <a:off x="8479350" y="2770724"/>
+              <a:ext cx="0" cy="1514422"/>
+            </a:xfrm>
+            <a:custGeom>
+              <a:avLst/>
+              <a:pathLst>
+                <a:path w="0" h="1514422">
+                  <a:moveTo>
+                    <a:pt x="0" y="1514422"/>
+                  </a:moveTo>
+                  <a:lnTo>
+                    <a:pt x="0" y="0"/>
+                  </a:lnTo>
+                  <a:lnTo>
+                    <a:pt x="0" y="0"/>
+                  </a:lnTo>
+                </a:path>
+              </a:pathLst>
+            </a:custGeom>
+            <a:ln w="13550" cap="flat">
+              <a:solidFill>
+                <a:srgbClr val="FFFFFF">
+                  <a:alpha val="100000"/>
+                </a:srgbClr>
+              </a:solidFill>
+              <a:prstDash val="solid"/>
+              <a:round/>
+            </a:ln>
+          </p:spPr>
+          <p:txBody>
+            <a:bodyPr/>
+            <a:lstStyle/>
+            <a:p/>
+          </p:txBody>
+        </p:sp>
+        <p:sp>
+          <p:nvSpPr>
+            <p:cNvPr id="47" name="pt45"/>
+            <p:cNvSpPr/>
+            <p:nvPr/>
+          </p:nvSpPr>
+          <p:spPr>
+            <a:xfrm>
+              <a:off x="7146834" y="3278579"/>
               <a:ext cx="138135" cy="138135"/>
             </a:xfrm>
             <a:prstGeom prst="ellipse">
@@ -5028,13 +5111,13 @@
         </p:sp>
         <p:sp>
           <p:nvSpPr>
-            <p:cNvPr id="46" name="pt44"/>
-            <p:cNvSpPr/>
-            <p:nvPr/>
-          </p:nvSpPr>
-          <p:spPr>
-            <a:xfrm>
-              <a:off x="4681295" y="3278579"/>
+            <p:cNvPr id="48" name="pt46"/>
+            <p:cNvSpPr/>
+            <p:nvPr/>
+          </p:nvSpPr>
+          <p:spPr>
+            <a:xfrm>
+              <a:off x="4665426" y="3278579"/>
               <a:ext cx="138135" cy="138135"/>
             </a:xfrm>
             <a:prstGeom prst="ellipse">
@@ -5063,13 +5146,13 @@
         </p:sp>
         <p:sp>
           <p:nvSpPr>
-            <p:cNvPr id="47" name="pt45"/>
-            <p:cNvSpPr/>
-            <p:nvPr/>
-          </p:nvSpPr>
-          <p:spPr>
-            <a:xfrm>
-              <a:off x="5271006" y="2918002"/>
+            <p:cNvPr id="49" name="pt47"/>
+            <p:cNvSpPr/>
+            <p:nvPr/>
+          </p:nvSpPr>
+          <p:spPr>
+            <a:xfrm>
+              <a:off x="5250494" y="2918002"/>
               <a:ext cx="138135" cy="138135"/>
             </a:xfrm>
             <a:prstGeom prst="ellipse">
@@ -5098,13 +5181,13 @@
         </p:sp>
         <p:sp>
           <p:nvSpPr>
-            <p:cNvPr id="48" name="pt46"/>
-            <p:cNvSpPr/>
-            <p:nvPr/>
-          </p:nvSpPr>
-          <p:spPr>
-            <a:xfrm>
-              <a:off x="8410282" y="2918002"/>
+            <p:cNvPr id="50" name="pt48"/>
+            <p:cNvSpPr/>
+            <p:nvPr/>
+          </p:nvSpPr>
+          <p:spPr>
+            <a:xfrm>
+              <a:off x="8365058" y="2918002"/>
               <a:ext cx="138135" cy="138135"/>
             </a:xfrm>
             <a:prstGeom prst="ellipse">
@@ -5133,13 +5216,13 @@
         </p:sp>
         <p:sp>
           <p:nvSpPr>
-            <p:cNvPr id="49" name="pt47"/>
-            <p:cNvSpPr/>
-            <p:nvPr/>
-          </p:nvSpPr>
-          <p:spPr>
-            <a:xfrm>
-              <a:off x="7615892" y="3999732"/>
+            <p:cNvPr id="51" name="pt49"/>
+            <p:cNvSpPr/>
+            <p:nvPr/>
+          </p:nvSpPr>
+          <p:spPr>
+            <a:xfrm>
+              <a:off x="7576922" y="3999732"/>
               <a:ext cx="138135" cy="138135"/>
             </a:xfrm>
             <a:prstGeom prst="ellipse">
@@ -5168,13 +5251,13 @@
         </p:sp>
         <p:sp>
           <p:nvSpPr>
-            <p:cNvPr id="50" name="pt48"/>
-            <p:cNvSpPr/>
-            <p:nvPr/>
-          </p:nvSpPr>
-          <p:spPr>
-            <a:xfrm>
-              <a:off x="3314190" y="3999732"/>
+            <p:cNvPr id="52" name="pt50"/>
+            <p:cNvSpPr/>
+            <p:nvPr/>
+          </p:nvSpPr>
+          <p:spPr>
+            <a:xfrm>
+              <a:off x="3309082" y="3999732"/>
               <a:ext cx="138135" cy="138135"/>
             </a:xfrm>
             <a:prstGeom prst="ellipse">
@@ -5203,13 +5286,13 @@
         </p:sp>
         <p:sp>
           <p:nvSpPr>
-            <p:cNvPr id="51" name="pt49"/>
-            <p:cNvSpPr/>
-            <p:nvPr/>
-          </p:nvSpPr>
-          <p:spPr>
-            <a:xfrm>
-              <a:off x="5211478" y="3639155"/>
+            <p:cNvPr id="53" name="pt51"/>
+            <p:cNvSpPr/>
+            <p:nvPr/>
+          </p:nvSpPr>
+          <p:spPr>
+            <a:xfrm>
+              <a:off x="5191435" y="3639155"/>
               <a:ext cx="138135" cy="138135"/>
             </a:xfrm>
             <a:prstGeom prst="ellipse">
@@ -5238,13 +5321,13 @@
         </p:sp>
         <p:sp>
           <p:nvSpPr>
-            <p:cNvPr id="52" name="pt50"/>
-            <p:cNvSpPr/>
-            <p:nvPr/>
-          </p:nvSpPr>
-          <p:spPr>
-            <a:xfrm>
-              <a:off x="8362435" y="3639155"/>
+            <p:cNvPr id="54" name="pt52"/>
+            <p:cNvSpPr/>
+            <p:nvPr/>
+          </p:nvSpPr>
+          <p:spPr>
+            <a:xfrm>
+              <a:off x="8317588" y="3639155"/>
               <a:ext cx="138135" cy="138135"/>
             </a:xfrm>
             <a:prstGeom prst="ellipse">
@@ -5273,7 +5356,7 @@
         </p:sp>
         <p:sp>
           <p:nvSpPr>
-            <p:cNvPr id="53" name="rc51"/>
+            <p:cNvPr id="55" name="rc53"/>
             <p:cNvSpPr/>
             <p:nvPr/>
           </p:nvSpPr>
@@ -5294,7 +5377,7 @@
         </p:sp>
         <p:sp>
           <p:nvSpPr>
-            <p:cNvPr id="54" name="pl52"/>
+            <p:cNvPr id="56" name="pl54"/>
             <p:cNvSpPr/>
             <p:nvPr/>
           </p:nvSpPr>
@@ -5337,7 +5420,7 @@
         </p:sp>
         <p:sp>
           <p:nvSpPr>
-            <p:cNvPr id="55" name="pl53"/>
+            <p:cNvPr id="57" name="pl55"/>
             <p:cNvSpPr/>
             <p:nvPr/>
           </p:nvSpPr>
@@ -5380,7 +5463,7 @@
         </p:sp>
         <p:sp>
           <p:nvSpPr>
-            <p:cNvPr id="56" name="pl54"/>
+            <p:cNvPr id="58" name="pl56"/>
             <p:cNvSpPr/>
             <p:nvPr/>
           </p:nvSpPr>
@@ -5423,24 +5506,24 @@
         </p:sp>
         <p:sp>
           <p:nvSpPr>
-            <p:cNvPr id="57" name="pl55"/>
-            <p:cNvSpPr/>
-            <p:nvPr/>
-          </p:nvSpPr>
-          <p:spPr>
-            <a:xfrm>
-              <a:off x="4103403" y="5374476"/>
-              <a:ext cx="1749689" cy="0"/>
+            <p:cNvPr id="59" name="pl57"/>
+            <p:cNvSpPr/>
+            <p:nvPr/>
+          </p:nvSpPr>
+          <p:spPr>
+            <a:xfrm>
+              <a:off x="4092626" y="5374476"/>
+              <a:ext cx="1735916" cy="0"/>
             </a:xfrm>
             <a:custGeom>
               <a:avLst/>
               <a:pathLst>
-                <a:path w="1749689" h="0">
+                <a:path w="1735916" h="0">
                   <a:moveTo>
                     <a:pt x="0" y="0"/>
                   </a:moveTo>
                   <a:lnTo>
-                    <a:pt x="1749689" y="0"/>
+                    <a:pt x="1735916" y="0"/>
                   </a:lnTo>
                 </a:path>
               </a:pathLst>
@@ -5463,21 +5546,21 @@
         </p:sp>
         <p:sp>
           <p:nvSpPr>
-            <p:cNvPr id="58" name="pl56"/>
-            <p:cNvSpPr/>
-            <p:nvPr/>
-          </p:nvSpPr>
-          <p:spPr>
-            <a:xfrm>
-              <a:off x="4791900" y="5013899"/>
-              <a:ext cx="33192" cy="0"/>
+            <p:cNvPr id="60" name="pl58"/>
+            <p:cNvSpPr/>
+            <p:nvPr/>
+          </p:nvSpPr>
+          <p:spPr>
+            <a:xfrm>
+              <a:off x="4775704" y="5013899"/>
+              <a:ext cx="32930" cy="0"/>
             </a:xfrm>
             <a:custGeom>
               <a:avLst/>
               <a:pathLst>
-                <a:path w="33192" h="0">
+                <a:path w="32930" h="0">
                   <a:moveTo>
-                    <a:pt x="33192" y="0"/>
+                    <a:pt x="32930" y="0"/>
                   </a:moveTo>
                   <a:lnTo>
                     <a:pt x="0" y="0"/>
@@ -5503,21 +5586,21 @@
         </p:sp>
         <p:sp>
           <p:nvSpPr>
-            <p:cNvPr id="59" name="pl57"/>
-            <p:cNvSpPr/>
-            <p:nvPr/>
-          </p:nvSpPr>
-          <p:spPr>
-            <a:xfrm>
-              <a:off x="3246166" y="4653322"/>
-              <a:ext cx="1277845" cy="0"/>
+            <p:cNvPr id="61" name="pl59"/>
+            <p:cNvSpPr/>
+            <p:nvPr/>
+          </p:nvSpPr>
+          <p:spPr>
+            <a:xfrm>
+              <a:off x="3242137" y="4653322"/>
+              <a:ext cx="1267786" cy="0"/>
             </a:xfrm>
             <a:custGeom>
               <a:avLst/>
               <a:pathLst>
-                <a:path w="1277845" h="0">
+                <a:path w="1267786" h="0">
                   <a:moveTo>
-                    <a:pt x="1277845" y="0"/>
+                    <a:pt x="1267786" y="0"/>
                   </a:moveTo>
                   <a:lnTo>
                     <a:pt x="0" y="0"/>
@@ -5543,7 +5626,7 @@
         </p:sp>
         <p:sp>
           <p:nvSpPr>
-            <p:cNvPr id="60" name="pl58"/>
+            <p:cNvPr id="62" name="pl60"/>
             <p:cNvSpPr/>
             <p:nvPr/>
           </p:nvSpPr>
@@ -5586,13 +5669,13 @@
         </p:sp>
         <p:sp>
           <p:nvSpPr>
-            <p:cNvPr id="61" name="pl59"/>
-            <p:cNvSpPr/>
-            <p:nvPr/>
-          </p:nvSpPr>
-          <p:spPr>
-            <a:xfrm>
-              <a:off x="3313451" y="4436976"/>
+            <p:cNvPr id="63" name="pl61"/>
+            <p:cNvSpPr/>
+            <p:nvPr/>
+          </p:nvSpPr>
+          <p:spPr>
+            <a:xfrm>
+              <a:off x="3308893" y="4436976"/>
               <a:ext cx="0" cy="1153845"/>
             </a:xfrm>
             <a:custGeom>
@@ -5629,13 +5712,13 @@
         </p:sp>
         <p:sp>
           <p:nvSpPr>
-            <p:cNvPr id="62" name="pl60"/>
-            <p:cNvSpPr/>
-            <p:nvPr/>
-          </p:nvSpPr>
-          <p:spPr>
-            <a:xfrm>
-              <a:off x="3892505" y="4436976"/>
+            <p:cNvPr id="64" name="pl62"/>
+            <p:cNvSpPr/>
+            <p:nvPr/>
+          </p:nvSpPr>
+          <p:spPr>
+            <a:xfrm>
+              <a:off x="3883388" y="4436976"/>
               <a:ext cx="0" cy="1153845"/>
             </a:xfrm>
             <a:custGeom>
@@ -5672,13 +5755,13 @@
         </p:sp>
         <p:sp>
           <p:nvSpPr>
-            <p:cNvPr id="63" name="pl61"/>
-            <p:cNvSpPr/>
-            <p:nvPr/>
-          </p:nvSpPr>
-          <p:spPr>
-            <a:xfrm>
-              <a:off x="4471558" y="4436976"/>
+            <p:cNvPr id="65" name="pl63"/>
+            <p:cNvSpPr/>
+            <p:nvPr/>
+          </p:nvSpPr>
+          <p:spPr>
+            <a:xfrm>
+              <a:off x="4457884" y="4436976"/>
               <a:ext cx="0" cy="1153845"/>
             </a:xfrm>
             <a:custGeom>
@@ -5715,13 +5798,13 @@
         </p:sp>
         <p:sp>
           <p:nvSpPr>
-            <p:cNvPr id="64" name="pl62"/>
-            <p:cNvSpPr/>
-            <p:nvPr/>
-          </p:nvSpPr>
-          <p:spPr>
-            <a:xfrm>
-              <a:off x="5050612" y="4436976"/>
+            <p:cNvPr id="66" name="pl64"/>
+            <p:cNvSpPr/>
+            <p:nvPr/>
+          </p:nvSpPr>
+          <p:spPr>
+            <a:xfrm>
+              <a:off x="5032379" y="4436976"/>
               <a:ext cx="0" cy="1153845"/>
             </a:xfrm>
             <a:custGeom>
@@ -5758,13 +5841,13 @@
         </p:sp>
         <p:sp>
           <p:nvSpPr>
-            <p:cNvPr id="65" name="pl63"/>
-            <p:cNvSpPr/>
-            <p:nvPr/>
-          </p:nvSpPr>
-          <p:spPr>
-            <a:xfrm>
-              <a:off x="5629665" y="4436976"/>
+            <p:cNvPr id="67" name="pl65"/>
+            <p:cNvSpPr/>
+            <p:nvPr/>
+          </p:nvSpPr>
+          <p:spPr>
+            <a:xfrm>
+              <a:off x="5606874" y="4436976"/>
               <a:ext cx="0" cy="1153845"/>
             </a:xfrm>
             <a:custGeom>
@@ -5801,13 +5884,13 @@
         </p:sp>
         <p:sp>
           <p:nvSpPr>
-            <p:cNvPr id="66" name="pl64"/>
-            <p:cNvSpPr/>
-            <p:nvPr/>
-          </p:nvSpPr>
-          <p:spPr>
-            <a:xfrm>
-              <a:off x="6208719" y="4436976"/>
+            <p:cNvPr id="68" name="pl66"/>
+            <p:cNvSpPr/>
+            <p:nvPr/>
+          </p:nvSpPr>
+          <p:spPr>
+            <a:xfrm>
+              <a:off x="6181369" y="4436976"/>
               <a:ext cx="0" cy="1153845"/>
             </a:xfrm>
             <a:custGeom>
@@ -5844,13 +5927,13 @@
         </p:sp>
         <p:sp>
           <p:nvSpPr>
-            <p:cNvPr id="67" name="pl65"/>
-            <p:cNvSpPr/>
-            <p:nvPr/>
-          </p:nvSpPr>
-          <p:spPr>
-            <a:xfrm>
-              <a:off x="6787773" y="4436976"/>
+            <p:cNvPr id="69" name="pl67"/>
+            <p:cNvSpPr/>
+            <p:nvPr/>
+          </p:nvSpPr>
+          <p:spPr>
+            <a:xfrm>
+              <a:off x="6755864" y="4436976"/>
               <a:ext cx="0" cy="1153845"/>
             </a:xfrm>
             <a:custGeom>
@@ -5887,13 +5970,13 @@
         </p:sp>
         <p:sp>
           <p:nvSpPr>
-            <p:cNvPr id="68" name="pl66"/>
-            <p:cNvSpPr/>
-            <p:nvPr/>
-          </p:nvSpPr>
-          <p:spPr>
-            <a:xfrm>
-              <a:off x="7366826" y="4436976"/>
+            <p:cNvPr id="70" name="pl68"/>
+            <p:cNvSpPr/>
+            <p:nvPr/>
+          </p:nvSpPr>
+          <p:spPr>
+            <a:xfrm>
+              <a:off x="7330360" y="4436976"/>
               <a:ext cx="0" cy="1153845"/>
             </a:xfrm>
             <a:custGeom>
@@ -5930,13 +6013,13 @@
         </p:sp>
         <p:sp>
           <p:nvSpPr>
-            <p:cNvPr id="69" name="pl67"/>
-            <p:cNvSpPr/>
-            <p:nvPr/>
-          </p:nvSpPr>
-          <p:spPr>
-            <a:xfrm>
-              <a:off x="7945880" y="4436976"/>
+            <p:cNvPr id="71" name="pl69"/>
+            <p:cNvSpPr/>
+            <p:nvPr/>
+          </p:nvSpPr>
+          <p:spPr>
+            <a:xfrm>
+              <a:off x="7904855" y="4436976"/>
               <a:ext cx="0" cy="1153845"/>
             </a:xfrm>
             <a:custGeom>
@@ -5973,13 +6056,56 @@
         </p:sp>
         <p:sp>
           <p:nvSpPr>
-            <p:cNvPr id="70" name="pt68"/>
-            <p:cNvSpPr/>
-            <p:nvPr/>
-          </p:nvSpPr>
-          <p:spPr>
-            <a:xfrm>
-              <a:off x="4034335" y="5305408"/>
+            <p:cNvPr id="72" name="pl70"/>
+            <p:cNvSpPr/>
+            <p:nvPr/>
+          </p:nvSpPr>
+          <p:spPr>
+            <a:xfrm>
+              <a:off x="8479350" y="4436976"/>
+              <a:ext cx="0" cy="1153845"/>
+            </a:xfrm>
+            <a:custGeom>
+              <a:avLst/>
+              <a:pathLst>
+                <a:path w="0" h="1153845">
+                  <a:moveTo>
+                    <a:pt x="0" y="1153845"/>
+                  </a:moveTo>
+                  <a:lnTo>
+                    <a:pt x="0" y="0"/>
+                  </a:lnTo>
+                  <a:lnTo>
+                    <a:pt x="0" y="0"/>
+                  </a:lnTo>
+                </a:path>
+              </a:pathLst>
+            </a:custGeom>
+            <a:ln w="13550" cap="flat">
+              <a:solidFill>
+                <a:srgbClr val="FFFFFF">
+                  <a:alpha val="100000"/>
+                </a:srgbClr>
+              </a:solidFill>
+              <a:prstDash val="solid"/>
+              <a:round/>
+            </a:ln>
+          </p:spPr>
+          <p:txBody>
+            <a:bodyPr/>
+            <a:lstStyle/>
+            <a:p/>
+          </p:txBody>
+        </p:sp>
+        <p:sp>
+          <p:nvSpPr>
+            <p:cNvPr id="73" name="pt71"/>
+            <p:cNvSpPr/>
+            <p:nvPr/>
+          </p:nvSpPr>
+          <p:spPr>
+            <a:xfrm>
+              <a:off x="4023558" y="5305408"/>
               <a:ext cx="138135" cy="138135"/>
             </a:xfrm>
             <a:prstGeom prst="ellipse">
@@ -6008,13 +6134,13 @@
         </p:sp>
         <p:sp>
           <p:nvSpPr>
-            <p:cNvPr id="71" name="pt69"/>
-            <p:cNvSpPr/>
-            <p:nvPr/>
-          </p:nvSpPr>
-          <p:spPr>
-            <a:xfrm>
-              <a:off x="5784024" y="5305408"/>
+            <p:cNvPr id="74" name="pt72"/>
+            <p:cNvSpPr/>
+            <p:nvPr/>
+          </p:nvSpPr>
+          <p:spPr>
+            <a:xfrm>
+              <a:off x="5759474" y="5305408"/>
               <a:ext cx="138135" cy="138135"/>
             </a:xfrm>
             <a:prstGeom prst="ellipse">
@@ -6043,13 +6169,13 @@
         </p:sp>
         <p:sp>
           <p:nvSpPr>
-            <p:cNvPr id="72" name="pt70"/>
-            <p:cNvSpPr/>
-            <p:nvPr/>
-          </p:nvSpPr>
-          <p:spPr>
-            <a:xfrm>
-              <a:off x="4756025" y="4944831"/>
+            <p:cNvPr id="75" name="pt73"/>
+            <p:cNvSpPr/>
+            <p:nvPr/>
+          </p:nvSpPr>
+          <p:spPr>
+            <a:xfrm>
+              <a:off x="4739567" y="4944831"/>
               <a:ext cx="138135" cy="138135"/>
             </a:xfrm>
             <a:prstGeom prst="ellipse">
@@ -6078,13 +6204,13 @@
         </p:sp>
         <p:sp>
           <p:nvSpPr>
-            <p:cNvPr id="73" name="pt71"/>
-            <p:cNvSpPr/>
-            <p:nvPr/>
-          </p:nvSpPr>
-          <p:spPr>
-            <a:xfrm>
-              <a:off x="4722833" y="4944831"/>
+            <p:cNvPr id="76" name="pt74"/>
+            <p:cNvSpPr/>
+            <p:nvPr/>
+          </p:nvSpPr>
+          <p:spPr>
+            <a:xfrm>
+              <a:off x="4706636" y="4944831"/>
               <a:ext cx="138135" cy="138135"/>
             </a:xfrm>
             <a:prstGeom prst="ellipse">
@@ -6113,13 +6239,13 @@
         </p:sp>
         <p:sp>
           <p:nvSpPr>
-            <p:cNvPr id="74" name="pt72"/>
-            <p:cNvSpPr/>
-            <p:nvPr/>
-          </p:nvSpPr>
-          <p:spPr>
-            <a:xfrm>
-              <a:off x="4454943" y="4584255"/>
+            <p:cNvPr id="77" name="pt75"/>
+            <p:cNvSpPr/>
+            <p:nvPr/>
+          </p:nvSpPr>
+          <p:spPr>
+            <a:xfrm>
+              <a:off x="4440856" y="4584255"/>
               <a:ext cx="138135" cy="138135"/>
             </a:xfrm>
             <a:prstGeom prst="ellipse">
@@ -6148,13 +6274,13 @@
         </p:sp>
         <p:sp>
           <p:nvSpPr>
-            <p:cNvPr id="75" name="pt73"/>
-            <p:cNvSpPr/>
-            <p:nvPr/>
-          </p:nvSpPr>
-          <p:spPr>
-            <a:xfrm>
-              <a:off x="3177098" y="4584255"/>
+            <p:cNvPr id="78" name="pt76"/>
+            <p:cNvSpPr/>
+            <p:nvPr/>
+          </p:nvSpPr>
+          <p:spPr>
+            <a:xfrm>
+              <a:off x="3173069" y="4584255"/>
               <a:ext cx="138135" cy="138135"/>
             </a:xfrm>
             <a:prstGeom prst="ellipse">
@@ -6183,7 +6309,7 @@
         </p:sp>
         <p:sp>
           <p:nvSpPr>
-            <p:cNvPr id="76" name="rc74"/>
+            <p:cNvPr id="79" name="rc77"/>
             <p:cNvSpPr/>
             <p:nvPr/>
           </p:nvSpPr>
@@ -6209,7 +6335,7 @@
         </p:sp>
         <p:sp>
           <p:nvSpPr>
-            <p:cNvPr id="77" name="tx75"/>
+            <p:cNvPr id="80" name="tx78"/>
             <p:cNvSpPr/>
             <p:nvPr/>
           </p:nvSpPr>
@@ -6255,7 +6381,7 @@
         </p:sp>
         <p:sp>
           <p:nvSpPr>
-            <p:cNvPr id="78" name="rc76"/>
+            <p:cNvPr id="81" name="rc79"/>
             <p:cNvSpPr/>
             <p:nvPr/>
           </p:nvSpPr>
@@ -6281,7 +6407,7 @@
         </p:sp>
         <p:sp>
           <p:nvSpPr>
-            <p:cNvPr id="79" name="tx77"/>
+            <p:cNvPr id="82" name="tx80"/>
             <p:cNvSpPr/>
             <p:nvPr/>
           </p:nvSpPr>
@@ -6327,7 +6453,7 @@
         </p:sp>
         <p:sp>
           <p:nvSpPr>
-            <p:cNvPr id="80" name="rc78"/>
+            <p:cNvPr id="83" name="rc81"/>
             <p:cNvSpPr/>
             <p:nvPr/>
           </p:nvSpPr>
@@ -6353,7 +6479,7 @@
         </p:sp>
         <p:sp>
           <p:nvSpPr>
-            <p:cNvPr id="81" name="tx79"/>
+            <p:cNvPr id="84" name="tx82"/>
             <p:cNvSpPr/>
             <p:nvPr/>
           </p:nvSpPr>
@@ -6399,7 +6525,7 @@
         </p:sp>
         <p:sp>
           <p:nvSpPr>
-            <p:cNvPr id="82" name="pl80"/>
+            <p:cNvPr id="85" name="pl83"/>
             <p:cNvSpPr/>
             <p:nvPr/>
           </p:nvSpPr>
@@ -6439,7 +6565,7 @@
         </p:sp>
         <p:sp>
           <p:nvSpPr>
-            <p:cNvPr id="83" name="pl81"/>
+            <p:cNvPr id="86" name="pl84"/>
             <p:cNvSpPr/>
             <p:nvPr/>
           </p:nvSpPr>
@@ -6479,13 +6605,13 @@
         </p:sp>
         <p:sp>
           <p:nvSpPr>
-            <p:cNvPr id="84" name="pl82"/>
-            <p:cNvSpPr/>
-            <p:nvPr/>
-          </p:nvSpPr>
-          <p:spPr>
-            <a:xfrm>
-              <a:off x="3313451" y="5590822"/>
+            <p:cNvPr id="87" name="pl85"/>
+            <p:cNvSpPr/>
+            <p:nvPr/>
+          </p:nvSpPr>
+          <p:spPr>
+            <a:xfrm>
+              <a:off x="3308893" y="5590822"/>
               <a:ext cx="0" cy="34794"/>
             </a:xfrm>
             <a:custGeom>
@@ -6519,13 +6645,13 @@
         </p:sp>
         <p:sp>
           <p:nvSpPr>
-            <p:cNvPr id="85" name="pl83"/>
-            <p:cNvSpPr/>
-            <p:nvPr/>
-          </p:nvSpPr>
-          <p:spPr>
-            <a:xfrm>
-              <a:off x="3892505" y="5590822"/>
+            <p:cNvPr id="88" name="pl86"/>
+            <p:cNvSpPr/>
+            <p:nvPr/>
+          </p:nvSpPr>
+          <p:spPr>
+            <a:xfrm>
+              <a:off x="3883388" y="5590822"/>
               <a:ext cx="0" cy="34794"/>
             </a:xfrm>
             <a:custGeom>
@@ -6559,13 +6685,13 @@
         </p:sp>
         <p:sp>
           <p:nvSpPr>
-            <p:cNvPr id="86" name="pl84"/>
-            <p:cNvSpPr/>
-            <p:nvPr/>
-          </p:nvSpPr>
-          <p:spPr>
-            <a:xfrm>
-              <a:off x="4471558" y="5590822"/>
+            <p:cNvPr id="89" name="pl87"/>
+            <p:cNvSpPr/>
+            <p:nvPr/>
+          </p:nvSpPr>
+          <p:spPr>
+            <a:xfrm>
+              <a:off x="4457884" y="5590822"/>
               <a:ext cx="0" cy="34794"/>
             </a:xfrm>
             <a:custGeom>
@@ -6599,13 +6725,13 @@
         </p:sp>
         <p:sp>
           <p:nvSpPr>
-            <p:cNvPr id="87" name="pl85"/>
-            <p:cNvSpPr/>
-            <p:nvPr/>
-          </p:nvSpPr>
-          <p:spPr>
-            <a:xfrm>
-              <a:off x="5050612" y="5590822"/>
+            <p:cNvPr id="90" name="pl88"/>
+            <p:cNvSpPr/>
+            <p:nvPr/>
+          </p:nvSpPr>
+          <p:spPr>
+            <a:xfrm>
+              <a:off x="5032379" y="5590822"/>
               <a:ext cx="0" cy="34794"/>
             </a:xfrm>
             <a:custGeom>
@@ -6639,13 +6765,13 @@
         </p:sp>
         <p:sp>
           <p:nvSpPr>
-            <p:cNvPr id="88" name="pl86"/>
-            <p:cNvSpPr/>
-            <p:nvPr/>
-          </p:nvSpPr>
-          <p:spPr>
-            <a:xfrm>
-              <a:off x="5629665" y="5590822"/>
+            <p:cNvPr id="91" name="pl89"/>
+            <p:cNvSpPr/>
+            <p:nvPr/>
+          </p:nvSpPr>
+          <p:spPr>
+            <a:xfrm>
+              <a:off x="5606874" y="5590822"/>
               <a:ext cx="0" cy="34794"/>
             </a:xfrm>
             <a:custGeom>
@@ -6679,13 +6805,13 @@
         </p:sp>
         <p:sp>
           <p:nvSpPr>
-            <p:cNvPr id="89" name="pl87"/>
-            <p:cNvSpPr/>
-            <p:nvPr/>
-          </p:nvSpPr>
-          <p:spPr>
-            <a:xfrm>
-              <a:off x="6208719" y="5590822"/>
+            <p:cNvPr id="92" name="pl90"/>
+            <p:cNvSpPr/>
+            <p:nvPr/>
+          </p:nvSpPr>
+          <p:spPr>
+            <a:xfrm>
+              <a:off x="6181369" y="5590822"/>
               <a:ext cx="0" cy="34794"/>
             </a:xfrm>
             <a:custGeom>
@@ -6719,13 +6845,13 @@
         </p:sp>
         <p:sp>
           <p:nvSpPr>
-            <p:cNvPr id="90" name="pl88"/>
-            <p:cNvSpPr/>
-            <p:nvPr/>
-          </p:nvSpPr>
-          <p:spPr>
-            <a:xfrm>
-              <a:off x="6787773" y="5590822"/>
+            <p:cNvPr id="93" name="pl91"/>
+            <p:cNvSpPr/>
+            <p:nvPr/>
+          </p:nvSpPr>
+          <p:spPr>
+            <a:xfrm>
+              <a:off x="6755864" y="5590822"/>
               <a:ext cx="0" cy="34794"/>
             </a:xfrm>
             <a:custGeom>
@@ -6759,13 +6885,13 @@
         </p:sp>
         <p:sp>
           <p:nvSpPr>
-            <p:cNvPr id="91" name="pl89"/>
-            <p:cNvSpPr/>
-            <p:nvPr/>
-          </p:nvSpPr>
-          <p:spPr>
-            <a:xfrm>
-              <a:off x="7366826" y="5590822"/>
+            <p:cNvPr id="94" name="pl92"/>
+            <p:cNvSpPr/>
+            <p:nvPr/>
+          </p:nvSpPr>
+          <p:spPr>
+            <a:xfrm>
+              <a:off x="7330360" y="5590822"/>
               <a:ext cx="0" cy="34794"/>
             </a:xfrm>
             <a:custGeom>
@@ -6799,13 +6925,13 @@
         </p:sp>
         <p:sp>
           <p:nvSpPr>
-            <p:cNvPr id="92" name="pl90"/>
-            <p:cNvSpPr/>
-            <p:nvPr/>
-          </p:nvSpPr>
-          <p:spPr>
-            <a:xfrm>
-              <a:off x="7945880" y="5590822"/>
+            <p:cNvPr id="95" name="pl93"/>
+            <p:cNvSpPr/>
+            <p:nvPr/>
+          </p:nvSpPr>
+          <p:spPr>
+            <a:xfrm>
+              <a:off x="7904855" y="5590822"/>
               <a:ext cx="0" cy="34794"/>
             </a:xfrm>
             <a:custGeom>
@@ -6839,13 +6965,13 @@
         </p:sp>
         <p:sp>
           <p:nvSpPr>
-            <p:cNvPr id="93" name="pl91"/>
-            <p:cNvSpPr/>
-            <p:nvPr/>
-          </p:nvSpPr>
-          <p:spPr>
-            <a:xfrm>
-              <a:off x="8524933" y="5590822"/>
+            <p:cNvPr id="96" name="pl94"/>
+            <p:cNvSpPr/>
+            <p:nvPr/>
+          </p:nvSpPr>
+          <p:spPr>
+            <a:xfrm>
+              <a:off x="8479350" y="5590822"/>
               <a:ext cx="0" cy="34794"/>
             </a:xfrm>
             <a:custGeom>
@@ -6879,7 +7005,7 @@
         </p:sp>
         <p:sp>
           <p:nvSpPr>
-            <p:cNvPr id="94" name="tx92"/>
+            <p:cNvPr id="97" name="tx95"/>
             <p:cNvSpPr/>
             <p:nvPr/>
           </p:nvSpPr>
@@ -6925,13 +7051,13 @@
         </p:sp>
         <p:sp>
           <p:nvSpPr>
-            <p:cNvPr id="95" name="tx93"/>
-            <p:cNvSpPr/>
-            <p:nvPr/>
-          </p:nvSpPr>
-          <p:spPr>
-            <a:xfrm>
-              <a:off x="3198696" y="5656918"/>
+            <p:cNvPr id="98" name="tx96"/>
+            <p:cNvSpPr/>
+            <p:nvPr/>
+          </p:nvSpPr>
+          <p:spPr>
+            <a:xfrm>
+              <a:off x="3194137" y="5656918"/>
               <a:ext cx="229511" cy="114957"/>
             </a:xfrm>
             <a:prstGeom prst="rect">
@@ -6971,13 +7097,13 @@
         </p:sp>
         <p:sp>
           <p:nvSpPr>
-            <p:cNvPr id="96" name="tx94"/>
-            <p:cNvSpPr/>
-            <p:nvPr/>
-          </p:nvSpPr>
-          <p:spPr>
-            <a:xfrm>
-              <a:off x="3777749" y="5656032"/>
+            <p:cNvPr id="99" name="tx97"/>
+            <p:cNvSpPr/>
+            <p:nvPr/>
+          </p:nvSpPr>
+          <p:spPr>
+            <a:xfrm>
+              <a:off x="3768632" y="5656032"/>
               <a:ext cx="229511" cy="115844"/>
             </a:xfrm>
             <a:prstGeom prst="rect">
@@ -7017,13 +7143,13 @@
         </p:sp>
         <p:sp>
           <p:nvSpPr>
-            <p:cNvPr id="97" name="tx95"/>
-            <p:cNvSpPr/>
-            <p:nvPr/>
-          </p:nvSpPr>
-          <p:spPr>
-            <a:xfrm>
-              <a:off x="4356803" y="5653129"/>
+            <p:cNvPr id="100" name="tx98"/>
+            <p:cNvSpPr/>
+            <p:nvPr/>
+          </p:nvSpPr>
+          <p:spPr>
+            <a:xfrm>
+              <a:off x="4343128" y="5653129"/>
               <a:ext cx="229511" cy="118746"/>
             </a:xfrm>
             <a:prstGeom prst="rect">
@@ -7063,13 +7189,13 @@
         </p:sp>
         <p:sp>
           <p:nvSpPr>
-            <p:cNvPr id="98" name="tx96"/>
-            <p:cNvSpPr/>
-            <p:nvPr/>
-          </p:nvSpPr>
-          <p:spPr>
-            <a:xfrm>
-              <a:off x="4935856" y="5656112"/>
+            <p:cNvPr id="101" name="tx99"/>
+            <p:cNvSpPr/>
+            <p:nvPr/>
+          </p:nvSpPr>
+          <p:spPr>
+            <a:xfrm>
+              <a:off x="4917623" y="5656112"/>
               <a:ext cx="229511" cy="115763"/>
             </a:xfrm>
             <a:prstGeom prst="rect">
@@ -7109,13 +7235,13 @@
         </p:sp>
         <p:sp>
           <p:nvSpPr>
-            <p:cNvPr id="99" name="tx97"/>
-            <p:cNvSpPr/>
-            <p:nvPr/>
-          </p:nvSpPr>
-          <p:spPr>
-            <a:xfrm>
-              <a:off x="5514910" y="5654016"/>
+            <p:cNvPr id="102" name="tx100"/>
+            <p:cNvSpPr/>
+            <p:nvPr/>
+          </p:nvSpPr>
+          <p:spPr>
+            <a:xfrm>
+              <a:off x="5492118" y="5654016"/>
               <a:ext cx="229511" cy="117859"/>
             </a:xfrm>
             <a:prstGeom prst="rect">
@@ -7155,13 +7281,13 @@
         </p:sp>
         <p:sp>
           <p:nvSpPr>
-            <p:cNvPr id="100" name="tx98"/>
-            <p:cNvSpPr/>
-            <p:nvPr/>
-          </p:nvSpPr>
-          <p:spPr>
-            <a:xfrm>
-              <a:off x="6093963" y="5652968"/>
+            <p:cNvPr id="103" name="tx101"/>
+            <p:cNvSpPr/>
+            <p:nvPr/>
+          </p:nvSpPr>
+          <p:spPr>
+            <a:xfrm>
+              <a:off x="6066613" y="5652968"/>
               <a:ext cx="229511" cy="118907"/>
             </a:xfrm>
             <a:prstGeom prst="rect">
@@ -7201,13 +7327,13 @@
         </p:sp>
         <p:sp>
           <p:nvSpPr>
-            <p:cNvPr id="101" name="tx99"/>
-            <p:cNvSpPr/>
-            <p:nvPr/>
-          </p:nvSpPr>
-          <p:spPr>
-            <a:xfrm>
-              <a:off x="6673017" y="5656918"/>
+            <p:cNvPr id="104" name="tx102"/>
+            <p:cNvSpPr/>
+            <p:nvPr/>
+          </p:nvSpPr>
+          <p:spPr>
+            <a:xfrm>
+              <a:off x="6641109" y="5656918"/>
               <a:ext cx="229511" cy="114957"/>
             </a:xfrm>
             <a:prstGeom prst="rect">
@@ -7247,13 +7373,13 @@
         </p:sp>
         <p:sp>
           <p:nvSpPr>
-            <p:cNvPr id="102" name="tx100"/>
-            <p:cNvSpPr/>
-            <p:nvPr/>
-          </p:nvSpPr>
-          <p:spPr>
-            <a:xfrm>
-              <a:off x="7252070" y="5652807"/>
+            <p:cNvPr id="105" name="tx103"/>
+            <p:cNvSpPr/>
+            <p:nvPr/>
+          </p:nvSpPr>
+          <p:spPr>
+            <a:xfrm>
+              <a:off x="7215604" y="5652807"/>
               <a:ext cx="229511" cy="119068"/>
             </a:xfrm>
             <a:prstGeom prst="rect">
@@ -7293,13 +7419,13 @@
         </p:sp>
         <p:sp>
           <p:nvSpPr>
-            <p:cNvPr id="103" name="tx101"/>
-            <p:cNvSpPr/>
-            <p:nvPr/>
-          </p:nvSpPr>
-          <p:spPr>
-            <a:xfrm>
-              <a:off x="7831124" y="5653049"/>
+            <p:cNvPr id="106" name="tx104"/>
+            <p:cNvSpPr/>
+            <p:nvPr/>
+          </p:nvSpPr>
+          <p:spPr>
+            <a:xfrm>
+              <a:off x="7790099" y="5653049"/>
               <a:ext cx="229511" cy="118826"/>
             </a:xfrm>
             <a:prstGeom prst="rect">
@@ -7339,13 +7465,13 @@
         </p:sp>
         <p:sp>
           <p:nvSpPr>
-            <p:cNvPr id="104" name="tx102"/>
-            <p:cNvSpPr/>
-            <p:nvPr/>
-          </p:nvSpPr>
-          <p:spPr>
-            <a:xfrm>
-              <a:off x="8410177" y="5652888"/>
+            <p:cNvPr id="107" name="tx105"/>
+            <p:cNvSpPr/>
+            <p:nvPr/>
+          </p:nvSpPr>
+          <p:spPr>
+            <a:xfrm>
+              <a:off x="8364594" y="5652888"/>
               <a:ext cx="229511" cy="118988"/>
             </a:xfrm>
             <a:prstGeom prst="rect">
@@ -7385,7 +7511,7 @@
         </p:sp>
         <p:sp>
           <p:nvSpPr>
-            <p:cNvPr id="105" name="tx103"/>
+            <p:cNvPr id="108" name="tx106"/>
             <p:cNvSpPr/>
             <p:nvPr/>
           </p:nvSpPr>
@@ -7431,7 +7557,7 @@
         </p:sp>
         <p:sp>
           <p:nvSpPr>
-            <p:cNvPr id="106" name="tx104"/>
+            <p:cNvPr id="109" name="tx107"/>
             <p:cNvSpPr/>
             <p:nvPr/>
           </p:nvSpPr>
@@ -7477,7 +7603,7 @@
         </p:sp>
         <p:sp>
           <p:nvSpPr>
-            <p:cNvPr id="107" name="tx105"/>
+            <p:cNvPr id="110" name="tx108"/>
             <p:cNvSpPr/>
             <p:nvPr/>
           </p:nvSpPr>
@@ -7523,7 +7649,7 @@
         </p:sp>
         <p:sp>
           <p:nvSpPr>
-            <p:cNvPr id="108" name="tx106"/>
+            <p:cNvPr id="111" name="tx109"/>
             <p:cNvSpPr/>
             <p:nvPr/>
           </p:nvSpPr>
@@ -7569,7 +7695,7 @@
         </p:sp>
         <p:sp>
           <p:nvSpPr>
-            <p:cNvPr id="109" name="tx107"/>
+            <p:cNvPr id="112" name="tx110"/>
             <p:cNvSpPr/>
             <p:nvPr/>
           </p:nvSpPr>
@@ -7615,7 +7741,7 @@
         </p:sp>
         <p:sp>
           <p:nvSpPr>
-            <p:cNvPr id="110" name="tx108"/>
+            <p:cNvPr id="113" name="tx111"/>
             <p:cNvSpPr/>
             <p:nvPr/>
           </p:nvSpPr>
@@ -7661,7 +7787,7 @@
         </p:sp>
         <p:sp>
           <p:nvSpPr>
-            <p:cNvPr id="111" name="tx109"/>
+            <p:cNvPr id="114" name="tx112"/>
             <p:cNvSpPr/>
             <p:nvPr/>
           </p:nvSpPr>
@@ -7707,7 +7833,7 @@
         </p:sp>
         <p:sp>
           <p:nvSpPr>
-            <p:cNvPr id="112" name="tx110"/>
+            <p:cNvPr id="115" name="tx113"/>
             <p:cNvSpPr/>
             <p:nvPr/>
           </p:nvSpPr>
@@ -7753,7 +7879,7 @@
         </p:sp>
         <p:sp>
           <p:nvSpPr>
-            <p:cNvPr id="113" name="tx111"/>
+            <p:cNvPr id="116" name="tx114"/>
             <p:cNvSpPr/>
             <p:nvPr/>
           </p:nvSpPr>
@@ -7799,7 +7925,7 @@
         </p:sp>
         <p:sp>
           <p:nvSpPr>
-            <p:cNvPr id="114" name="tx112"/>
+            <p:cNvPr id="117" name="tx115"/>
             <p:cNvSpPr/>
             <p:nvPr/>
           </p:nvSpPr>
@@ -7845,7 +7971,7 @@
         </p:sp>
         <p:sp>
           <p:nvSpPr>
-            <p:cNvPr id="115" name="rc113"/>
+            <p:cNvPr id="118" name="rc116"/>
             <p:cNvSpPr/>
             <p:nvPr/>
           </p:nvSpPr>
@@ -7871,7 +7997,7 @@
         </p:sp>
         <p:sp>
           <p:nvSpPr>
-            <p:cNvPr id="116" name="tx114"/>
+            <p:cNvPr id="119" name="tx117"/>
             <p:cNvSpPr/>
             <p:nvPr/>
           </p:nvSpPr>
@@ -7917,7 +8043,7 @@
         </p:sp>
         <p:sp>
           <p:nvSpPr>
-            <p:cNvPr id="117" name="rc115"/>
+            <p:cNvPr id="120" name="rc118"/>
             <p:cNvSpPr/>
             <p:nvPr/>
           </p:nvSpPr>
@@ -7938,7 +8064,7 @@
         </p:sp>
         <p:sp>
           <p:nvSpPr>
-            <p:cNvPr id="118" name="pt116"/>
+            <p:cNvPr id="121" name="pt119"/>
             <p:cNvSpPr/>
             <p:nvPr/>
           </p:nvSpPr>
@@ -7973,7 +8099,7 @@
         </p:sp>
         <p:sp>
           <p:nvSpPr>
-            <p:cNvPr id="119" name="rc117"/>
+            <p:cNvPr id="122" name="rc120"/>
             <p:cNvSpPr/>
             <p:nvPr/>
           </p:nvSpPr>
@@ -7994,7 +8120,7 @@
         </p:sp>
         <p:sp>
           <p:nvSpPr>
-            <p:cNvPr id="120" name="pt118"/>
+            <p:cNvPr id="123" name="pt121"/>
             <p:cNvSpPr/>
             <p:nvPr/>
           </p:nvSpPr>
@@ -8029,7 +8155,7 @@
         </p:sp>
         <p:sp>
           <p:nvSpPr>
-            <p:cNvPr id="121" name="tx119"/>
+            <p:cNvPr id="124" name="tx122"/>
             <p:cNvSpPr/>
             <p:nvPr/>
           </p:nvSpPr>
@@ -8075,7 +8201,7 @@
         </p:sp>
         <p:sp>
           <p:nvSpPr>
-            <p:cNvPr id="122" name="tx120"/>
+            <p:cNvPr id="125" name="tx123"/>
             <p:cNvSpPr/>
             <p:nvPr/>
           </p:nvSpPr>
@@ -8121,7 +8247,7 @@
         </p:sp>
         <p:sp>
           <p:nvSpPr>
-            <p:cNvPr id="123" name="rc121"/>
+            <p:cNvPr id="126" name="rc124"/>
             <p:cNvSpPr/>
             <p:nvPr/>
           </p:nvSpPr>
@@ -8147,7 +8273,7 @@
         </p:sp>
         <p:sp>
           <p:nvSpPr>
-            <p:cNvPr id="124" name="tx122"/>
+            <p:cNvPr id="127" name="tx125"/>
             <p:cNvSpPr/>
             <p:nvPr/>
           </p:nvSpPr>
@@ -8193,7 +8319,7 @@
         </p:sp>
         <p:sp>
           <p:nvSpPr>
-            <p:cNvPr id="125" name="rc123"/>
+            <p:cNvPr id="128" name="rc126"/>
             <p:cNvSpPr/>
             <p:nvPr/>
           </p:nvSpPr>
@@ -8214,7 +8340,7 @@
         </p:sp>
         <p:sp>
           <p:nvSpPr>
-            <p:cNvPr id="126" name="pl124"/>
+            <p:cNvPr id="129" name="pl127"/>
             <p:cNvSpPr/>
             <p:nvPr/>
           </p:nvSpPr>
@@ -8254,7 +8380,7 @@
         </p:sp>
         <p:sp>
           <p:nvSpPr>
-            <p:cNvPr id="127" name="rc125"/>
+            <p:cNvPr id="130" name="rc128"/>
             <p:cNvSpPr/>
             <p:nvPr/>
           </p:nvSpPr>
@@ -8275,7 +8401,7 @@
         </p:sp>
         <p:sp>
           <p:nvSpPr>
-            <p:cNvPr id="128" name="pl126"/>
+            <p:cNvPr id="131" name="pl129"/>
             <p:cNvSpPr/>
             <p:nvPr/>
           </p:nvSpPr>
@@ -8315,7 +8441,7 @@
         </p:sp>
         <p:sp>
           <p:nvSpPr>
-            <p:cNvPr id="129" name="tx127"/>
+            <p:cNvPr id="132" name="tx130"/>
             <p:cNvSpPr/>
             <p:nvPr/>
           </p:nvSpPr>
@@ -8361,7 +8487,7 @@
         </p:sp>
         <p:sp>
           <p:nvSpPr>
-            <p:cNvPr id="130" name="tx128"/>
+            <p:cNvPr id="133" name="tx131"/>
             <p:cNvSpPr/>
             <p:nvPr/>
           </p:nvSpPr>

</xml_diff>

<commit_message>
Added different colours for each of the segments for different gene types
</commit_message>
<xml_diff>
--- a/Ball_and_stick_graph/Presentation.pptx
+++ b/Ball_and_stick_graph/Presentation.pptx
@@ -3490,7 +3490,7 @@
           <p:spPr>
             <a:xfrm>
               <a:off x="2447150" y="1825625"/>
-              <a:ext cx="6319447" cy="793268"/>
+              <a:ext cx="6573813" cy="3765197"/>
             </a:xfrm>
             <a:prstGeom prst="rect">
               <a:avLst/>
@@ -3510,21 +3510,64 @@
           </p:nvSpPr>
           <p:spPr>
             <a:xfrm>
-              <a:off x="2447150" y="2402547"/>
-              <a:ext cx="6319447" cy="0"/>
+              <a:off x="2447150" y="5345265"/>
+              <a:ext cx="6573813" cy="0"/>
             </a:xfrm>
             <a:custGeom>
               <a:avLst/>
               <a:pathLst>
-                <a:path w="6319447" h="0">
+                <a:path w="6573813" h="0">
                   <a:moveTo>
                     <a:pt x="0" y="0"/>
                   </a:moveTo>
                   <a:lnTo>
-                    <a:pt x="6319447" y="0"/>
+                    <a:pt x="6573813" y="0"/>
                   </a:lnTo>
                   <a:lnTo>
-                    <a:pt x="6319447" y="0"/>
+                    <a:pt x="6573813" y="0"/>
+                  </a:lnTo>
+                </a:path>
+              </a:pathLst>
+            </a:custGeom>
+            <a:ln w="108405" cap="flat">
+              <a:solidFill>
+                <a:srgbClr val="BBBBBB">
+                  <a:alpha val="100000"/>
+                </a:srgbClr>
+              </a:solidFill>
+              <a:prstDash val="solid"/>
+              <a:round/>
+            </a:ln>
+          </p:spPr>
+          <p:txBody>
+            <a:bodyPr/>
+            <a:lstStyle/>
+            <a:p/>
+          </p:txBody>
+        </p:sp>
+        <p:sp>
+          <p:nvSpPr>
+            <p:cNvPr id="9" name="pl7"/>
+            <p:cNvSpPr/>
+            <p:nvPr/>
+          </p:nvSpPr>
+          <p:spPr>
+            <a:xfrm>
+              <a:off x="2447150" y="4936005"/>
+              <a:ext cx="6573813" cy="0"/>
+            </a:xfrm>
+            <a:custGeom>
+              <a:avLst/>
+              <a:pathLst>
+                <a:path w="6573813" h="0">
+                  <a:moveTo>
+                    <a:pt x="0" y="0"/>
+                  </a:moveTo>
+                  <a:lnTo>
+                    <a:pt x="6573813" y="0"/>
+                  </a:lnTo>
+                  <a:lnTo>
+                    <a:pt x="6573813" y="0"/>
                   </a:lnTo>
                 </a:path>
               </a:pathLst>
@@ -3547,27 +3590,27 @@
         </p:sp>
         <p:sp>
           <p:nvSpPr>
-            <p:cNvPr id="9" name="pl7"/>
-            <p:cNvSpPr/>
-            <p:nvPr/>
-          </p:nvSpPr>
-          <p:spPr>
-            <a:xfrm>
-              <a:off x="2447150" y="2041971"/>
-              <a:ext cx="6319447" cy="0"/>
+            <p:cNvPr id="10" name="pl8"/>
+            <p:cNvSpPr/>
+            <p:nvPr/>
+          </p:nvSpPr>
+          <p:spPr>
+            <a:xfrm>
+              <a:off x="2447150" y="4526744"/>
+              <a:ext cx="6573813" cy="0"/>
             </a:xfrm>
             <a:custGeom>
               <a:avLst/>
               <a:pathLst>
-                <a:path w="6319447" h="0">
+                <a:path w="6573813" h="0">
                   <a:moveTo>
                     <a:pt x="0" y="0"/>
                   </a:moveTo>
                   <a:lnTo>
-                    <a:pt x="6319447" y="0"/>
+                    <a:pt x="6573813" y="0"/>
                   </a:lnTo>
                   <a:lnTo>
-                    <a:pt x="6319447" y="0"/>
+                    <a:pt x="6573813" y="0"/>
                   </a:lnTo>
                 </a:path>
               </a:pathLst>
@@ -3590,21 +3633,279 @@
         </p:sp>
         <p:sp>
           <p:nvSpPr>
-            <p:cNvPr id="10" name="pl8"/>
-            <p:cNvSpPr/>
-            <p:nvPr/>
-          </p:nvSpPr>
-          <p:spPr>
-            <a:xfrm>
-              <a:off x="5134043" y="2402547"/>
-              <a:ext cx="2257894" cy="0"/>
+            <p:cNvPr id="11" name="pl9"/>
+            <p:cNvSpPr/>
+            <p:nvPr/>
+          </p:nvSpPr>
+          <p:spPr>
+            <a:xfrm>
+              <a:off x="2447150" y="4117484"/>
+              <a:ext cx="6573813" cy="0"/>
             </a:xfrm>
             <a:custGeom>
               <a:avLst/>
               <a:pathLst>
-                <a:path w="2257894" h="0">
+                <a:path w="6573813" h="0">
                   <a:moveTo>
-                    <a:pt x="2257894" y="0"/>
+                    <a:pt x="0" y="0"/>
+                  </a:moveTo>
+                  <a:lnTo>
+                    <a:pt x="6573813" y="0"/>
+                  </a:lnTo>
+                  <a:lnTo>
+                    <a:pt x="6573813" y="0"/>
+                  </a:lnTo>
+                </a:path>
+              </a:pathLst>
+            </a:custGeom>
+            <a:ln w="108405" cap="flat">
+              <a:solidFill>
+                <a:srgbClr val="EEEEEE">
+                  <a:alpha val="100000"/>
+                </a:srgbClr>
+              </a:solidFill>
+              <a:prstDash val="solid"/>
+              <a:round/>
+            </a:ln>
+          </p:spPr>
+          <p:txBody>
+            <a:bodyPr/>
+            <a:lstStyle/>
+            <a:p/>
+          </p:txBody>
+        </p:sp>
+        <p:sp>
+          <p:nvSpPr>
+            <p:cNvPr id="12" name="pl10"/>
+            <p:cNvSpPr/>
+            <p:nvPr/>
+          </p:nvSpPr>
+          <p:spPr>
+            <a:xfrm>
+              <a:off x="2447150" y="3708223"/>
+              <a:ext cx="6573813" cy="0"/>
+            </a:xfrm>
+            <a:custGeom>
+              <a:avLst/>
+              <a:pathLst>
+                <a:path w="6573813" h="0">
+                  <a:moveTo>
+                    <a:pt x="0" y="0"/>
+                  </a:moveTo>
+                  <a:lnTo>
+                    <a:pt x="6573813" y="0"/>
+                  </a:lnTo>
+                  <a:lnTo>
+                    <a:pt x="6573813" y="0"/>
+                  </a:lnTo>
+                </a:path>
+              </a:pathLst>
+            </a:custGeom>
+            <a:ln w="108405" cap="flat">
+              <a:solidFill>
+                <a:srgbClr val="EEEEEE">
+                  <a:alpha val="100000"/>
+                </a:srgbClr>
+              </a:solidFill>
+              <a:prstDash val="solid"/>
+              <a:round/>
+            </a:ln>
+          </p:spPr>
+          <p:txBody>
+            <a:bodyPr/>
+            <a:lstStyle/>
+            <a:p/>
+          </p:txBody>
+        </p:sp>
+        <p:sp>
+          <p:nvSpPr>
+            <p:cNvPr id="13" name="pl11"/>
+            <p:cNvSpPr/>
+            <p:nvPr/>
+          </p:nvSpPr>
+          <p:spPr>
+            <a:xfrm>
+              <a:off x="2447150" y="3298963"/>
+              <a:ext cx="6573813" cy="0"/>
+            </a:xfrm>
+            <a:custGeom>
+              <a:avLst/>
+              <a:pathLst>
+                <a:path w="6573813" h="0">
+                  <a:moveTo>
+                    <a:pt x="0" y="0"/>
+                  </a:moveTo>
+                  <a:lnTo>
+                    <a:pt x="6573813" y="0"/>
+                  </a:lnTo>
+                  <a:lnTo>
+                    <a:pt x="6573813" y="0"/>
+                  </a:lnTo>
+                </a:path>
+              </a:pathLst>
+            </a:custGeom>
+            <a:ln w="108405" cap="flat">
+              <a:solidFill>
+                <a:srgbClr val="BBBBBB">
+                  <a:alpha val="100000"/>
+                </a:srgbClr>
+              </a:solidFill>
+              <a:prstDash val="solid"/>
+              <a:round/>
+            </a:ln>
+          </p:spPr>
+          <p:txBody>
+            <a:bodyPr/>
+            <a:lstStyle/>
+            <a:p/>
+          </p:txBody>
+        </p:sp>
+        <p:sp>
+          <p:nvSpPr>
+            <p:cNvPr id="14" name="pl12"/>
+            <p:cNvSpPr/>
+            <p:nvPr/>
+          </p:nvSpPr>
+          <p:spPr>
+            <a:xfrm>
+              <a:off x="2447150" y="2889702"/>
+              <a:ext cx="6573813" cy="0"/>
+            </a:xfrm>
+            <a:custGeom>
+              <a:avLst/>
+              <a:pathLst>
+                <a:path w="6573813" h="0">
+                  <a:moveTo>
+                    <a:pt x="0" y="0"/>
+                  </a:moveTo>
+                  <a:lnTo>
+                    <a:pt x="6573813" y="0"/>
+                  </a:lnTo>
+                  <a:lnTo>
+                    <a:pt x="6573813" y="0"/>
+                  </a:lnTo>
+                </a:path>
+              </a:pathLst>
+            </a:custGeom>
+            <a:ln w="108405" cap="flat">
+              <a:solidFill>
+                <a:srgbClr val="BBBBBB">
+                  <a:alpha val="100000"/>
+                </a:srgbClr>
+              </a:solidFill>
+              <a:prstDash val="solid"/>
+              <a:round/>
+            </a:ln>
+          </p:spPr>
+          <p:txBody>
+            <a:bodyPr/>
+            <a:lstStyle/>
+            <a:p/>
+          </p:txBody>
+        </p:sp>
+        <p:sp>
+          <p:nvSpPr>
+            <p:cNvPr id="15" name="pl13"/>
+            <p:cNvSpPr/>
+            <p:nvPr/>
+          </p:nvSpPr>
+          <p:spPr>
+            <a:xfrm>
+              <a:off x="2447150" y="2480441"/>
+              <a:ext cx="6573813" cy="0"/>
+            </a:xfrm>
+            <a:custGeom>
+              <a:avLst/>
+              <a:pathLst>
+                <a:path w="6573813" h="0">
+                  <a:moveTo>
+                    <a:pt x="0" y="0"/>
+                  </a:moveTo>
+                  <a:lnTo>
+                    <a:pt x="6573813" y="0"/>
+                  </a:lnTo>
+                  <a:lnTo>
+                    <a:pt x="6573813" y="0"/>
+                  </a:lnTo>
+                </a:path>
+              </a:pathLst>
+            </a:custGeom>
+            <a:ln w="108405" cap="flat">
+              <a:solidFill>
+                <a:srgbClr val="EEEEEE">
+                  <a:alpha val="100000"/>
+                </a:srgbClr>
+              </a:solidFill>
+              <a:prstDash val="solid"/>
+              <a:round/>
+            </a:ln>
+          </p:spPr>
+          <p:txBody>
+            <a:bodyPr/>
+            <a:lstStyle/>
+            <a:p/>
+          </p:txBody>
+        </p:sp>
+        <p:sp>
+          <p:nvSpPr>
+            <p:cNvPr id="16" name="pl14"/>
+            <p:cNvSpPr/>
+            <p:nvPr/>
+          </p:nvSpPr>
+          <p:spPr>
+            <a:xfrm>
+              <a:off x="2447150" y="2071181"/>
+              <a:ext cx="6573813" cy="0"/>
+            </a:xfrm>
+            <a:custGeom>
+              <a:avLst/>
+              <a:pathLst>
+                <a:path w="6573813" h="0">
+                  <a:moveTo>
+                    <a:pt x="0" y="0"/>
+                  </a:moveTo>
+                  <a:lnTo>
+                    <a:pt x="6573813" y="0"/>
+                  </a:lnTo>
+                  <a:lnTo>
+                    <a:pt x="6573813" y="0"/>
+                  </a:lnTo>
+                </a:path>
+              </a:pathLst>
+            </a:custGeom>
+            <a:ln w="108405" cap="flat">
+              <a:solidFill>
+                <a:srgbClr val="BBBBBB">
+                  <a:alpha val="100000"/>
+                </a:srgbClr>
+              </a:solidFill>
+              <a:prstDash val="solid"/>
+              <a:round/>
+            </a:ln>
+          </p:spPr>
+          <p:txBody>
+            <a:bodyPr/>
+            <a:lstStyle/>
+            <a:p/>
+          </p:txBody>
+        </p:sp>
+        <p:sp>
+          <p:nvSpPr>
+            <p:cNvPr id="17" name="pl15"/>
+            <p:cNvSpPr/>
+            <p:nvPr/>
+          </p:nvSpPr>
+          <p:spPr>
+            <a:xfrm>
+              <a:off x="4438564" y="5345265"/>
+              <a:ext cx="1087139" cy="0"/>
+            </a:xfrm>
+            <a:custGeom>
+              <a:avLst/>
+              <a:pathLst>
+                <a:path w="1087139" h="0">
+                  <a:moveTo>
+                    <a:pt x="1087139" y="0"/>
                   </a:moveTo>
                   <a:lnTo>
                     <a:pt x="0" y="0"/>
@@ -3614,7 +3915,7 @@
             </a:custGeom>
             <a:ln w="108405" cap="flat">
               <a:solidFill>
-                <a:srgbClr val="1952A8">
+                <a:srgbClr val="F8766D">
                   <a:alpha val="100000"/>
                 </a:srgbClr>
               </a:solidFill>
@@ -3630,31 +3931,31 @@
         </p:sp>
         <p:sp>
           <p:nvSpPr>
-            <p:cNvPr id="11" name="pl9"/>
-            <p:cNvSpPr/>
-            <p:nvPr/>
-          </p:nvSpPr>
-          <p:spPr>
-            <a:xfrm>
-              <a:off x="6164362" y="2041971"/>
-              <a:ext cx="550947" cy="0"/>
+            <p:cNvPr id="18" name="pl16"/>
+            <p:cNvSpPr/>
+            <p:nvPr/>
+          </p:nvSpPr>
+          <p:spPr>
+            <a:xfrm>
+              <a:off x="3637305" y="4936005"/>
+              <a:ext cx="1724101" cy="0"/>
             </a:xfrm>
             <a:custGeom>
               <a:avLst/>
               <a:pathLst>
-                <a:path w="550947" h="0">
+                <a:path w="1724101" h="0">
                   <a:moveTo>
                     <a:pt x="0" y="0"/>
                   </a:moveTo>
                   <a:lnTo>
-                    <a:pt x="550947" y="0"/>
+                    <a:pt x="1724101" y="0"/>
                   </a:lnTo>
                 </a:path>
               </a:pathLst>
             </a:custGeom>
             <a:ln w="108405" cap="flat">
               <a:solidFill>
-                <a:srgbClr val="1952A8">
+                <a:srgbClr val="F8766D">
                   <a:alpha val="100000"/>
                 </a:srgbClr>
               </a:solidFill>
@@ -3670,21 +3971,301 @@
         </p:sp>
         <p:sp>
           <p:nvSpPr>
-            <p:cNvPr id="12" name="pl10"/>
-            <p:cNvSpPr/>
-            <p:nvPr/>
-          </p:nvSpPr>
-          <p:spPr>
-            <a:xfrm>
-              <a:off x="2734398" y="1825625"/>
-              <a:ext cx="0" cy="793268"/>
+            <p:cNvPr id="19" name="pl17"/>
+            <p:cNvSpPr/>
+            <p:nvPr/>
+          </p:nvSpPr>
+          <p:spPr>
+            <a:xfrm>
+              <a:off x="4560870" y="4526744"/>
+              <a:ext cx="496623" cy="0"/>
             </a:xfrm>
             <a:custGeom>
               <a:avLst/>
               <a:pathLst>
-                <a:path w="0" h="793268">
+                <a:path w="496623" h="0">
                   <a:moveTo>
-                    <a:pt x="0" y="793268"/>
+                    <a:pt x="0" y="0"/>
+                  </a:moveTo>
+                  <a:lnTo>
+                    <a:pt x="496623" y="0"/>
+                  </a:lnTo>
+                </a:path>
+              </a:pathLst>
+            </a:custGeom>
+            <a:ln w="108405" cap="flat">
+              <a:solidFill>
+                <a:srgbClr val="F8766D">
+                  <a:alpha val="100000"/>
+                </a:srgbClr>
+              </a:solidFill>
+              <a:prstDash val="solid"/>
+              <a:round/>
+            </a:ln>
+          </p:spPr>
+          <p:txBody>
+            <a:bodyPr/>
+            <a:lstStyle/>
+            <a:p/>
+          </p:txBody>
+        </p:sp>
+        <p:sp>
+          <p:nvSpPr>
+            <p:cNvPr id="20" name="pl18"/>
+            <p:cNvSpPr/>
+            <p:nvPr/>
+          </p:nvSpPr>
+          <p:spPr>
+            <a:xfrm>
+              <a:off x="4277306" y="4117484"/>
+              <a:ext cx="2640346" cy="0"/>
+            </a:xfrm>
+            <a:custGeom>
+              <a:avLst/>
+              <a:pathLst>
+                <a:path w="2640346" h="0">
+                  <a:moveTo>
+                    <a:pt x="0" y="0"/>
+                  </a:moveTo>
+                  <a:lnTo>
+                    <a:pt x="2640346" y="0"/>
+                  </a:lnTo>
+                </a:path>
+              </a:pathLst>
+            </a:custGeom>
+            <a:ln w="108405" cap="flat">
+              <a:solidFill>
+                <a:srgbClr val="F8766D">
+                  <a:alpha val="100000"/>
+                </a:srgbClr>
+              </a:solidFill>
+              <a:prstDash val="solid"/>
+              <a:round/>
+            </a:ln>
+          </p:spPr>
+          <p:txBody>
+            <a:bodyPr/>
+            <a:lstStyle/>
+            <a:p/>
+          </p:txBody>
+        </p:sp>
+        <p:sp>
+          <p:nvSpPr>
+            <p:cNvPr id="21" name="pl19"/>
+            <p:cNvSpPr/>
+            <p:nvPr/>
+          </p:nvSpPr>
+          <p:spPr>
+            <a:xfrm>
+              <a:off x="3483886" y="3708223"/>
+              <a:ext cx="2638325" cy="0"/>
+            </a:xfrm>
+            <a:custGeom>
+              <a:avLst/>
+              <a:pathLst>
+                <a:path w="2638325" h="0">
+                  <a:moveTo>
+                    <a:pt x="2638325" y="0"/>
+                  </a:moveTo>
+                  <a:lnTo>
+                    <a:pt x="0" y="0"/>
+                  </a:lnTo>
+                </a:path>
+              </a:pathLst>
+            </a:custGeom>
+            <a:ln w="108405" cap="flat">
+              <a:solidFill>
+                <a:srgbClr val="F8766D">
+                  <a:alpha val="100000"/>
+                </a:srgbClr>
+              </a:solidFill>
+              <a:prstDash val="solid"/>
+              <a:round/>
+            </a:ln>
+          </p:spPr>
+          <p:txBody>
+            <a:bodyPr/>
+            <a:lstStyle/>
+            <a:p/>
+          </p:txBody>
+        </p:sp>
+        <p:sp>
+          <p:nvSpPr>
+            <p:cNvPr id="22" name="pl20"/>
+            <p:cNvSpPr/>
+            <p:nvPr/>
+          </p:nvSpPr>
+          <p:spPr>
+            <a:xfrm>
+              <a:off x="7141868" y="3298963"/>
+              <a:ext cx="573671" cy="0"/>
+            </a:xfrm>
+            <a:custGeom>
+              <a:avLst/>
+              <a:pathLst>
+                <a:path w="573671" h="0">
+                  <a:moveTo>
+                    <a:pt x="0" y="0"/>
+                  </a:moveTo>
+                  <a:lnTo>
+                    <a:pt x="573671" y="0"/>
+                  </a:lnTo>
+                </a:path>
+              </a:pathLst>
+            </a:custGeom>
+            <a:ln w="108405" cap="flat">
+              <a:solidFill>
+                <a:srgbClr val="F8766D">
+                  <a:alpha val="100000"/>
+                </a:srgbClr>
+              </a:solidFill>
+              <a:prstDash val="solid"/>
+              <a:round/>
+            </a:ln>
+          </p:spPr>
+          <p:txBody>
+            <a:bodyPr/>
+            <a:lstStyle/>
+            <a:p/>
+          </p:txBody>
+        </p:sp>
+        <p:sp>
+          <p:nvSpPr>
+            <p:cNvPr id="23" name="pl21"/>
+            <p:cNvSpPr/>
+            <p:nvPr/>
+          </p:nvSpPr>
+          <p:spPr>
+            <a:xfrm>
+              <a:off x="4696950" y="2889702"/>
+              <a:ext cx="1203323" cy="0"/>
+            </a:xfrm>
+            <a:custGeom>
+              <a:avLst/>
+              <a:pathLst>
+                <a:path w="1203323" h="0">
+                  <a:moveTo>
+                    <a:pt x="1203323" y="0"/>
+                  </a:moveTo>
+                  <a:lnTo>
+                    <a:pt x="0" y="0"/>
+                  </a:lnTo>
+                </a:path>
+              </a:pathLst>
+            </a:custGeom>
+            <a:ln w="108405" cap="flat">
+              <a:solidFill>
+                <a:srgbClr val="F8766D">
+                  <a:alpha val="100000"/>
+                </a:srgbClr>
+              </a:solidFill>
+              <a:prstDash val="solid"/>
+              <a:round/>
+            </a:ln>
+          </p:spPr>
+          <p:txBody>
+            <a:bodyPr/>
+            <a:lstStyle/>
+            <a:p/>
+          </p:txBody>
+        </p:sp>
+        <p:sp>
+          <p:nvSpPr>
+            <p:cNvPr id="24" name="pl22"/>
+            <p:cNvSpPr/>
+            <p:nvPr/>
+          </p:nvSpPr>
+          <p:spPr>
+            <a:xfrm>
+              <a:off x="7996935" y="2480441"/>
+              <a:ext cx="254501" cy="0"/>
+            </a:xfrm>
+            <a:custGeom>
+              <a:avLst/>
+              <a:pathLst>
+                <a:path w="254501" h="0">
+                  <a:moveTo>
+                    <a:pt x="254501" y="0"/>
+                  </a:moveTo>
+                  <a:lnTo>
+                    <a:pt x="0" y="0"/>
+                  </a:lnTo>
+                </a:path>
+              </a:pathLst>
+            </a:custGeom>
+            <a:ln w="108405" cap="flat">
+              <a:solidFill>
+                <a:srgbClr val="F8766D">
+                  <a:alpha val="100000"/>
+                </a:srgbClr>
+              </a:solidFill>
+              <a:prstDash val="solid"/>
+              <a:round/>
+            </a:ln>
+          </p:spPr>
+          <p:txBody>
+            <a:bodyPr/>
+            <a:lstStyle/>
+            <a:p/>
+          </p:txBody>
+        </p:sp>
+        <p:sp>
+          <p:nvSpPr>
+            <p:cNvPr id="25" name="pl23"/>
+            <p:cNvSpPr/>
+            <p:nvPr/>
+          </p:nvSpPr>
+          <p:spPr>
+            <a:xfrm>
+              <a:off x="6219784" y="2071181"/>
+              <a:ext cx="512365" cy="0"/>
+            </a:xfrm>
+            <a:custGeom>
+              <a:avLst/>
+              <a:pathLst>
+                <a:path w="512365" h="0">
+                  <a:moveTo>
+                    <a:pt x="512365" y="0"/>
+                  </a:moveTo>
+                  <a:lnTo>
+                    <a:pt x="0" y="0"/>
+                  </a:lnTo>
+                </a:path>
+              </a:pathLst>
+            </a:custGeom>
+            <a:ln w="108405" cap="flat">
+              <a:solidFill>
+                <a:srgbClr val="F8766D">
+                  <a:alpha val="100000"/>
+                </a:srgbClr>
+              </a:solidFill>
+              <a:prstDash val="solid"/>
+              <a:round/>
+            </a:ln>
+          </p:spPr>
+          <p:txBody>
+            <a:bodyPr/>
+            <a:lstStyle/>
+            <a:p/>
+          </p:txBody>
+        </p:sp>
+        <p:sp>
+          <p:nvSpPr>
+            <p:cNvPr id="26" name="pl24"/>
+            <p:cNvSpPr/>
+            <p:nvPr/>
+          </p:nvSpPr>
+          <p:spPr>
+            <a:xfrm>
+              <a:off x="2745960" y="1825625"/>
+              <a:ext cx="0" cy="3765197"/>
+            </a:xfrm>
+            <a:custGeom>
+              <a:avLst/>
+              <a:pathLst>
+                <a:path w="0" h="3765197">
+                  <a:moveTo>
+                    <a:pt x="0" y="3765197"/>
                   </a:moveTo>
                   <a:lnTo>
                     <a:pt x="0" y="0"/>
@@ -3710,21 +4291,21 @@
         </p:sp>
         <p:sp>
           <p:nvSpPr>
-            <p:cNvPr id="13" name="pl11"/>
-            <p:cNvSpPr/>
-            <p:nvPr/>
-          </p:nvSpPr>
-          <p:spPr>
-            <a:xfrm>
-              <a:off x="3308893" y="1825625"/>
-              <a:ext cx="0" cy="793268"/>
+            <p:cNvPr id="27" name="pl25"/>
+            <p:cNvSpPr/>
+            <p:nvPr/>
+          </p:nvSpPr>
+          <p:spPr>
+            <a:xfrm>
+              <a:off x="3343579" y="1825625"/>
+              <a:ext cx="0" cy="3765197"/>
             </a:xfrm>
             <a:custGeom>
               <a:avLst/>
               <a:pathLst>
-                <a:path w="0" h="793268">
+                <a:path w="0" h="3765197">
                   <a:moveTo>
-                    <a:pt x="0" y="793268"/>
+                    <a:pt x="0" y="3765197"/>
                   </a:moveTo>
                   <a:lnTo>
                     <a:pt x="0" y="0"/>
@@ -3750,21 +4331,21 @@
         </p:sp>
         <p:sp>
           <p:nvSpPr>
-            <p:cNvPr id="14" name="pl12"/>
-            <p:cNvSpPr/>
-            <p:nvPr/>
-          </p:nvSpPr>
-          <p:spPr>
-            <a:xfrm>
-              <a:off x="3883388" y="1825625"/>
-              <a:ext cx="0" cy="793268"/>
+            <p:cNvPr id="28" name="pl26"/>
+            <p:cNvSpPr/>
+            <p:nvPr/>
+          </p:nvSpPr>
+          <p:spPr>
+            <a:xfrm>
+              <a:off x="3941199" y="1825625"/>
+              <a:ext cx="0" cy="3765197"/>
             </a:xfrm>
             <a:custGeom>
               <a:avLst/>
               <a:pathLst>
-                <a:path w="0" h="793268">
+                <a:path w="0" h="3765197">
                   <a:moveTo>
-                    <a:pt x="0" y="793268"/>
+                    <a:pt x="0" y="3765197"/>
                   </a:moveTo>
                   <a:lnTo>
                     <a:pt x="0" y="0"/>
@@ -3790,21 +4371,21 @@
         </p:sp>
         <p:sp>
           <p:nvSpPr>
-            <p:cNvPr id="15" name="pl13"/>
-            <p:cNvSpPr/>
-            <p:nvPr/>
-          </p:nvSpPr>
-          <p:spPr>
-            <a:xfrm>
-              <a:off x="4457884" y="1825625"/>
-              <a:ext cx="0" cy="793268"/>
+            <p:cNvPr id="29" name="pl27"/>
+            <p:cNvSpPr/>
+            <p:nvPr/>
+          </p:nvSpPr>
+          <p:spPr>
+            <a:xfrm>
+              <a:off x="4538818" y="1825625"/>
+              <a:ext cx="0" cy="3765197"/>
             </a:xfrm>
             <a:custGeom>
               <a:avLst/>
               <a:pathLst>
-                <a:path w="0" h="793268">
+                <a:path w="0" h="3765197">
                   <a:moveTo>
-                    <a:pt x="0" y="793268"/>
+                    <a:pt x="0" y="3765197"/>
                   </a:moveTo>
                   <a:lnTo>
                     <a:pt x="0" y="0"/>
@@ -3830,21 +4411,21 @@
         </p:sp>
         <p:sp>
           <p:nvSpPr>
-            <p:cNvPr id="16" name="pl14"/>
-            <p:cNvSpPr/>
-            <p:nvPr/>
-          </p:nvSpPr>
-          <p:spPr>
-            <a:xfrm>
-              <a:off x="5032379" y="1825625"/>
-              <a:ext cx="0" cy="793268"/>
+            <p:cNvPr id="30" name="pl28"/>
+            <p:cNvSpPr/>
+            <p:nvPr/>
+          </p:nvSpPr>
+          <p:spPr>
+            <a:xfrm>
+              <a:off x="5136438" y="1825625"/>
+              <a:ext cx="0" cy="3765197"/>
             </a:xfrm>
             <a:custGeom>
               <a:avLst/>
               <a:pathLst>
-                <a:path w="0" h="793268">
+                <a:path w="0" h="3765197">
                   <a:moveTo>
-                    <a:pt x="0" y="793268"/>
+                    <a:pt x="0" y="3765197"/>
                   </a:moveTo>
                   <a:lnTo>
                     <a:pt x="0" y="0"/>
@@ -3870,21 +4451,21 @@
         </p:sp>
         <p:sp>
           <p:nvSpPr>
-            <p:cNvPr id="17" name="pl15"/>
-            <p:cNvSpPr/>
-            <p:nvPr/>
-          </p:nvSpPr>
-          <p:spPr>
-            <a:xfrm>
-              <a:off x="5606874" y="1825625"/>
-              <a:ext cx="0" cy="793268"/>
+            <p:cNvPr id="31" name="pl29"/>
+            <p:cNvSpPr/>
+            <p:nvPr/>
+          </p:nvSpPr>
+          <p:spPr>
+            <a:xfrm>
+              <a:off x="5734057" y="1825625"/>
+              <a:ext cx="0" cy="3765197"/>
             </a:xfrm>
             <a:custGeom>
               <a:avLst/>
               <a:pathLst>
-                <a:path w="0" h="793268">
+                <a:path w="0" h="3765197">
                   <a:moveTo>
-                    <a:pt x="0" y="793268"/>
+                    <a:pt x="0" y="3765197"/>
                   </a:moveTo>
                   <a:lnTo>
                     <a:pt x="0" y="0"/>
@@ -3910,21 +4491,21 @@
         </p:sp>
         <p:sp>
           <p:nvSpPr>
-            <p:cNvPr id="18" name="pl16"/>
-            <p:cNvSpPr/>
-            <p:nvPr/>
-          </p:nvSpPr>
-          <p:spPr>
-            <a:xfrm>
-              <a:off x="6181369" y="1825625"/>
-              <a:ext cx="0" cy="793268"/>
+            <p:cNvPr id="32" name="pl30"/>
+            <p:cNvSpPr/>
+            <p:nvPr/>
+          </p:nvSpPr>
+          <p:spPr>
+            <a:xfrm>
+              <a:off x="6331677" y="1825625"/>
+              <a:ext cx="0" cy="3765197"/>
             </a:xfrm>
             <a:custGeom>
               <a:avLst/>
               <a:pathLst>
-                <a:path w="0" h="793268">
+                <a:path w="0" h="3765197">
                   <a:moveTo>
-                    <a:pt x="0" y="793268"/>
+                    <a:pt x="0" y="3765197"/>
                   </a:moveTo>
                   <a:lnTo>
                     <a:pt x="0" y="0"/>
@@ -3950,21 +4531,21 @@
         </p:sp>
         <p:sp>
           <p:nvSpPr>
-            <p:cNvPr id="19" name="pl17"/>
-            <p:cNvSpPr/>
-            <p:nvPr/>
-          </p:nvSpPr>
-          <p:spPr>
-            <a:xfrm>
-              <a:off x="6755864" y="1825625"/>
-              <a:ext cx="0" cy="793268"/>
+            <p:cNvPr id="33" name="pl31"/>
+            <p:cNvSpPr/>
+            <p:nvPr/>
+          </p:nvSpPr>
+          <p:spPr>
+            <a:xfrm>
+              <a:off x="6929296" y="1825625"/>
+              <a:ext cx="0" cy="3765197"/>
             </a:xfrm>
             <a:custGeom>
               <a:avLst/>
               <a:pathLst>
-                <a:path w="0" h="793268">
+                <a:path w="0" h="3765197">
                   <a:moveTo>
-                    <a:pt x="0" y="793268"/>
+                    <a:pt x="0" y="3765197"/>
                   </a:moveTo>
                   <a:lnTo>
                     <a:pt x="0" y="0"/>
@@ -3990,21 +4571,21 @@
         </p:sp>
         <p:sp>
           <p:nvSpPr>
-            <p:cNvPr id="20" name="pl18"/>
-            <p:cNvSpPr/>
-            <p:nvPr/>
-          </p:nvSpPr>
-          <p:spPr>
-            <a:xfrm>
-              <a:off x="7330360" y="1825625"/>
-              <a:ext cx="0" cy="793268"/>
+            <p:cNvPr id="34" name="pl32"/>
+            <p:cNvSpPr/>
+            <p:nvPr/>
+          </p:nvSpPr>
+          <p:spPr>
+            <a:xfrm>
+              <a:off x="7526915" y="1825625"/>
+              <a:ext cx="0" cy="3765197"/>
             </a:xfrm>
             <a:custGeom>
               <a:avLst/>
               <a:pathLst>
-                <a:path w="0" h="793268">
+                <a:path w="0" h="3765197">
                   <a:moveTo>
-                    <a:pt x="0" y="793268"/>
+                    <a:pt x="0" y="3765197"/>
                   </a:moveTo>
                   <a:lnTo>
                     <a:pt x="0" y="0"/>
@@ -4030,21 +4611,21 @@
         </p:sp>
         <p:sp>
           <p:nvSpPr>
-            <p:cNvPr id="21" name="pl19"/>
-            <p:cNvSpPr/>
-            <p:nvPr/>
-          </p:nvSpPr>
-          <p:spPr>
-            <a:xfrm>
-              <a:off x="7904855" y="1825625"/>
-              <a:ext cx="0" cy="793268"/>
+            <p:cNvPr id="35" name="pl33"/>
+            <p:cNvSpPr/>
+            <p:nvPr/>
+          </p:nvSpPr>
+          <p:spPr>
+            <a:xfrm>
+              <a:off x="8124535" y="1825625"/>
+              <a:ext cx="0" cy="3765197"/>
             </a:xfrm>
             <a:custGeom>
               <a:avLst/>
               <a:pathLst>
-                <a:path w="0" h="793268">
+                <a:path w="0" h="3765197">
                   <a:moveTo>
-                    <a:pt x="0" y="793268"/>
+                    <a:pt x="0" y="3765197"/>
                   </a:moveTo>
                   <a:lnTo>
                     <a:pt x="0" y="0"/>
@@ -4070,21 +4651,21 @@
         </p:sp>
         <p:sp>
           <p:nvSpPr>
-            <p:cNvPr id="22" name="pl20"/>
-            <p:cNvSpPr/>
-            <p:nvPr/>
-          </p:nvSpPr>
-          <p:spPr>
-            <a:xfrm>
-              <a:off x="8479350" y="1825625"/>
-              <a:ext cx="0" cy="793268"/>
+            <p:cNvPr id="36" name="pl34"/>
+            <p:cNvSpPr/>
+            <p:nvPr/>
+          </p:nvSpPr>
+          <p:spPr>
+            <a:xfrm>
+              <a:off x="8722154" y="1825625"/>
+              <a:ext cx="0" cy="3765197"/>
             </a:xfrm>
             <a:custGeom>
               <a:avLst/>
               <a:pathLst>
-                <a:path w="0" h="793268">
+                <a:path w="0" h="3765197">
                   <a:moveTo>
-                    <a:pt x="0" y="793268"/>
+                    <a:pt x="0" y="3765197"/>
                   </a:moveTo>
                   <a:lnTo>
                     <a:pt x="0" y="0"/>
@@ -4110,13 +4691,13 @@
         </p:sp>
         <p:sp>
           <p:nvSpPr>
-            <p:cNvPr id="23" name="pt21"/>
-            <p:cNvSpPr/>
-            <p:nvPr/>
-          </p:nvSpPr>
-          <p:spPr>
-            <a:xfrm>
-              <a:off x="6095294" y="1972903"/>
+            <p:cNvPr id="37" name="pt35"/>
+            <p:cNvSpPr/>
+            <p:nvPr/>
+          </p:nvSpPr>
+          <p:spPr>
+            <a:xfrm>
+              <a:off x="5456636" y="5276198"/>
               <a:ext cx="138135" cy="138135"/>
             </a:xfrm>
             <a:prstGeom prst="ellipse">
@@ -4145,13 +4726,13 @@
         </p:sp>
         <p:sp>
           <p:nvSpPr>
-            <p:cNvPr id="24" name="pt22"/>
-            <p:cNvSpPr/>
-            <p:nvPr/>
-          </p:nvSpPr>
-          <p:spPr>
-            <a:xfrm>
-              <a:off x="6646242" y="1972903"/>
+            <p:cNvPr id="38" name="pt36"/>
+            <p:cNvSpPr/>
+            <p:nvPr/>
+          </p:nvSpPr>
+          <p:spPr>
+            <a:xfrm>
+              <a:off x="4369497" y="5276198"/>
               <a:ext cx="138135" cy="138135"/>
             </a:xfrm>
             <a:prstGeom prst="ellipse">
@@ -4180,13 +4761,13 @@
         </p:sp>
         <p:sp>
           <p:nvSpPr>
-            <p:cNvPr id="25" name="pt23"/>
-            <p:cNvSpPr/>
-            <p:nvPr/>
-          </p:nvSpPr>
-          <p:spPr>
-            <a:xfrm>
-              <a:off x="7322870" y="2333479"/>
+            <p:cNvPr id="39" name="pt37"/>
+            <p:cNvSpPr/>
+            <p:nvPr/>
+          </p:nvSpPr>
+          <p:spPr>
+            <a:xfrm>
+              <a:off x="6053145" y="3639155"/>
               <a:ext cx="138135" cy="138135"/>
             </a:xfrm>
             <a:prstGeom prst="ellipse">
@@ -4215,13 +4796,13 @@
         </p:sp>
         <p:sp>
           <p:nvSpPr>
-            <p:cNvPr id="26" name="pt24"/>
-            <p:cNvSpPr/>
-            <p:nvPr/>
-          </p:nvSpPr>
-          <p:spPr>
-            <a:xfrm>
-              <a:off x="5064975" y="2333479"/>
+            <p:cNvPr id="40" name="pt38"/>
+            <p:cNvSpPr/>
+            <p:nvPr/>
+          </p:nvSpPr>
+          <p:spPr>
+            <a:xfrm>
+              <a:off x="3414819" y="3639155"/>
               <a:ext cx="138135" cy="138135"/>
             </a:xfrm>
             <a:prstGeom prst="ellipse">
@@ -4250,839 +4831,13 @@
         </p:sp>
         <p:sp>
           <p:nvSpPr>
-            <p:cNvPr id="27" name="rc25"/>
-            <p:cNvSpPr/>
-            <p:nvPr/>
-          </p:nvSpPr>
-          <p:spPr>
-            <a:xfrm>
-              <a:off x="2447150" y="2770724"/>
-              <a:ext cx="6319447" cy="1514422"/>
-            </a:xfrm>
-            <a:prstGeom prst="rect">
-              <a:avLst/>
-            </a:prstGeom>
-          </p:spPr>
-          <p:txBody>
-            <a:bodyPr/>
-            <a:lstStyle/>
-            <a:p/>
-          </p:txBody>
-        </p:sp>
-        <p:sp>
-          <p:nvSpPr>
-            <p:cNvPr id="28" name="pl26"/>
-            <p:cNvSpPr/>
-            <p:nvPr/>
-          </p:nvSpPr>
-          <p:spPr>
-            <a:xfrm>
-              <a:off x="2447150" y="4068800"/>
-              <a:ext cx="6319447" cy="0"/>
-            </a:xfrm>
-            <a:custGeom>
-              <a:avLst/>
-              <a:pathLst>
-                <a:path w="6319447" h="0">
-                  <a:moveTo>
-                    <a:pt x="0" y="0"/>
-                  </a:moveTo>
-                  <a:lnTo>
-                    <a:pt x="6319447" y="0"/>
-                  </a:lnTo>
-                  <a:lnTo>
-                    <a:pt x="6319447" y="0"/>
-                  </a:lnTo>
-                </a:path>
-              </a:pathLst>
-            </a:custGeom>
-            <a:ln w="108405" cap="flat">
-              <a:solidFill>
-                <a:srgbClr val="BBBBBB">
-                  <a:alpha val="100000"/>
-                </a:srgbClr>
-              </a:solidFill>
-              <a:prstDash val="solid"/>
-              <a:round/>
-            </a:ln>
-          </p:spPr>
-          <p:txBody>
-            <a:bodyPr/>
-            <a:lstStyle/>
-            <a:p/>
-          </p:txBody>
-        </p:sp>
-        <p:sp>
-          <p:nvSpPr>
-            <p:cNvPr id="29" name="pl27"/>
-            <p:cNvSpPr/>
-            <p:nvPr/>
-          </p:nvSpPr>
-          <p:spPr>
-            <a:xfrm>
-              <a:off x="2447150" y="3708223"/>
-              <a:ext cx="6319447" cy="0"/>
-            </a:xfrm>
-            <a:custGeom>
-              <a:avLst/>
-              <a:pathLst>
-                <a:path w="6319447" h="0">
-                  <a:moveTo>
-                    <a:pt x="0" y="0"/>
-                  </a:moveTo>
-                  <a:lnTo>
-                    <a:pt x="6319447" y="0"/>
-                  </a:lnTo>
-                  <a:lnTo>
-                    <a:pt x="6319447" y="0"/>
-                  </a:lnTo>
-                </a:path>
-              </a:pathLst>
-            </a:custGeom>
-            <a:ln w="108405" cap="flat">
-              <a:solidFill>
-                <a:srgbClr val="EEEEEE">
-                  <a:alpha val="100000"/>
-                </a:srgbClr>
-              </a:solidFill>
-              <a:prstDash val="solid"/>
-              <a:round/>
-            </a:ln>
-          </p:spPr>
-          <p:txBody>
-            <a:bodyPr/>
-            <a:lstStyle/>
-            <a:p/>
-          </p:txBody>
-        </p:sp>
-        <p:sp>
-          <p:nvSpPr>
-            <p:cNvPr id="30" name="pl28"/>
-            <p:cNvSpPr/>
-            <p:nvPr/>
-          </p:nvSpPr>
-          <p:spPr>
-            <a:xfrm>
-              <a:off x="2447150" y="3347646"/>
-              <a:ext cx="6319447" cy="0"/>
-            </a:xfrm>
-            <a:custGeom>
-              <a:avLst/>
-              <a:pathLst>
-                <a:path w="6319447" h="0">
-                  <a:moveTo>
-                    <a:pt x="0" y="0"/>
-                  </a:moveTo>
-                  <a:lnTo>
-                    <a:pt x="6319447" y="0"/>
-                  </a:lnTo>
-                  <a:lnTo>
-                    <a:pt x="6319447" y="0"/>
-                  </a:lnTo>
-                </a:path>
-              </a:pathLst>
-            </a:custGeom>
-            <a:ln w="108405" cap="flat">
-              <a:solidFill>
-                <a:srgbClr val="EEEEEE">
-                  <a:alpha val="100000"/>
-                </a:srgbClr>
-              </a:solidFill>
-              <a:prstDash val="solid"/>
-              <a:round/>
-            </a:ln>
-          </p:spPr>
-          <p:txBody>
-            <a:bodyPr/>
-            <a:lstStyle/>
-            <a:p/>
-          </p:txBody>
-        </p:sp>
-        <p:sp>
-          <p:nvSpPr>
-            <p:cNvPr id="31" name="pl29"/>
-            <p:cNvSpPr/>
-            <p:nvPr/>
-          </p:nvSpPr>
-          <p:spPr>
-            <a:xfrm>
-              <a:off x="2447150" y="2987070"/>
-              <a:ext cx="6319447" cy="0"/>
-            </a:xfrm>
-            <a:custGeom>
-              <a:avLst/>
-              <a:pathLst>
-                <a:path w="6319447" h="0">
-                  <a:moveTo>
-                    <a:pt x="0" y="0"/>
-                  </a:moveTo>
-                  <a:lnTo>
-                    <a:pt x="6319447" y="0"/>
-                  </a:lnTo>
-                  <a:lnTo>
-                    <a:pt x="6319447" y="0"/>
-                  </a:lnTo>
-                </a:path>
-              </a:pathLst>
-            </a:custGeom>
-            <a:ln w="108405" cap="flat">
-              <a:solidFill>
-                <a:srgbClr val="BBBBBB">
-                  <a:alpha val="100000"/>
-                </a:srgbClr>
-              </a:solidFill>
-              <a:prstDash val="solid"/>
-              <a:round/>
-            </a:ln>
-          </p:spPr>
-          <p:txBody>
-            <a:bodyPr/>
-            <a:lstStyle/>
-            <a:p/>
-          </p:txBody>
-        </p:sp>
-        <p:sp>
-          <p:nvSpPr>
-            <p:cNvPr id="32" name="pl30"/>
-            <p:cNvSpPr/>
-            <p:nvPr/>
-          </p:nvSpPr>
-          <p:spPr>
-            <a:xfrm>
-              <a:off x="3378150" y="4068800"/>
-              <a:ext cx="4267839" cy="0"/>
-            </a:xfrm>
-            <a:custGeom>
-              <a:avLst/>
-              <a:pathLst>
-                <a:path w="4267839" h="0">
-                  <a:moveTo>
-                    <a:pt x="4267839" y="0"/>
-                  </a:moveTo>
-                  <a:lnTo>
-                    <a:pt x="0" y="0"/>
-                  </a:lnTo>
-                </a:path>
-              </a:pathLst>
-            </a:custGeom>
-            <a:ln w="108405" cap="flat">
-              <a:solidFill>
-                <a:srgbClr val="1952A8">
-                  <a:alpha val="100000"/>
-                </a:srgbClr>
-              </a:solidFill>
-              <a:prstDash val="solid"/>
-              <a:round/>
-            </a:ln>
-          </p:spPr>
-          <p:txBody>
-            <a:bodyPr/>
-            <a:lstStyle/>
-            <a:p/>
-          </p:txBody>
-        </p:sp>
-        <p:sp>
-          <p:nvSpPr>
-            <p:cNvPr id="33" name="pl31"/>
-            <p:cNvSpPr/>
-            <p:nvPr/>
-          </p:nvSpPr>
-          <p:spPr>
-            <a:xfrm>
-              <a:off x="5260503" y="3708223"/>
-              <a:ext cx="3126152" cy="0"/>
-            </a:xfrm>
-            <a:custGeom>
-              <a:avLst/>
-              <a:pathLst>
-                <a:path w="3126152" h="0">
-                  <a:moveTo>
-                    <a:pt x="0" y="0"/>
-                  </a:moveTo>
-                  <a:lnTo>
-                    <a:pt x="3126152" y="0"/>
-                  </a:lnTo>
-                </a:path>
-              </a:pathLst>
-            </a:custGeom>
-            <a:ln w="108405" cap="flat">
-              <a:solidFill>
-                <a:srgbClr val="1952A8">
-                  <a:alpha val="100000"/>
-                </a:srgbClr>
-              </a:solidFill>
-              <a:prstDash val="solid"/>
-              <a:round/>
-            </a:ln>
-          </p:spPr>
-          <p:txBody>
-            <a:bodyPr/>
-            <a:lstStyle/>
-            <a:p/>
-          </p:txBody>
-        </p:sp>
-        <p:sp>
-          <p:nvSpPr>
-            <p:cNvPr id="34" name="pl32"/>
-            <p:cNvSpPr/>
-            <p:nvPr/>
-          </p:nvSpPr>
-          <p:spPr>
-            <a:xfrm>
-              <a:off x="4734493" y="3347646"/>
-              <a:ext cx="2481408" cy="0"/>
-            </a:xfrm>
-            <a:custGeom>
-              <a:avLst/>
-              <a:pathLst>
-                <a:path w="2481408" h="0">
-                  <a:moveTo>
-                    <a:pt x="2481408" y="0"/>
-                  </a:moveTo>
-                  <a:lnTo>
-                    <a:pt x="0" y="0"/>
-                  </a:lnTo>
-                </a:path>
-              </a:pathLst>
-            </a:custGeom>
-            <a:ln w="108405" cap="flat">
-              <a:solidFill>
-                <a:srgbClr val="1952A8">
-                  <a:alpha val="100000"/>
-                </a:srgbClr>
-              </a:solidFill>
-              <a:prstDash val="solid"/>
-              <a:round/>
-            </a:ln>
-          </p:spPr>
-          <p:txBody>
-            <a:bodyPr/>
-            <a:lstStyle/>
-            <a:p/>
-          </p:txBody>
-        </p:sp>
-        <p:sp>
-          <p:nvSpPr>
-            <p:cNvPr id="35" name="pl33"/>
-            <p:cNvSpPr/>
-            <p:nvPr/>
-          </p:nvSpPr>
-          <p:spPr>
-            <a:xfrm>
-              <a:off x="5319562" y="2987070"/>
-              <a:ext cx="3114564" cy="0"/>
-            </a:xfrm>
-            <a:custGeom>
-              <a:avLst/>
-              <a:pathLst>
-                <a:path w="3114564" h="0">
-                  <a:moveTo>
-                    <a:pt x="0" y="0"/>
-                  </a:moveTo>
-                  <a:lnTo>
-                    <a:pt x="3114564" y="0"/>
-                  </a:lnTo>
-                </a:path>
-              </a:pathLst>
-            </a:custGeom>
-            <a:ln w="108405" cap="flat">
-              <a:solidFill>
-                <a:srgbClr val="1952A8">
-                  <a:alpha val="100000"/>
-                </a:srgbClr>
-              </a:solidFill>
-              <a:prstDash val="solid"/>
-              <a:round/>
-            </a:ln>
-          </p:spPr>
-          <p:txBody>
-            <a:bodyPr/>
-            <a:lstStyle/>
-            <a:p/>
-          </p:txBody>
-        </p:sp>
-        <p:sp>
-          <p:nvSpPr>
-            <p:cNvPr id="36" name="pl34"/>
-            <p:cNvSpPr/>
-            <p:nvPr/>
-          </p:nvSpPr>
-          <p:spPr>
-            <a:xfrm>
-              <a:off x="2734398" y="2770724"/>
-              <a:ext cx="0" cy="1514422"/>
-            </a:xfrm>
-            <a:custGeom>
-              <a:avLst/>
-              <a:pathLst>
-                <a:path w="0" h="1514422">
-                  <a:moveTo>
-                    <a:pt x="0" y="1514422"/>
-                  </a:moveTo>
-                  <a:lnTo>
-                    <a:pt x="0" y="0"/>
-                  </a:lnTo>
-                  <a:lnTo>
-                    <a:pt x="0" y="0"/>
-                  </a:lnTo>
-                </a:path>
-              </a:pathLst>
-            </a:custGeom>
-            <a:ln w="13550" cap="flat">
-              <a:solidFill>
-                <a:srgbClr val="FFFFFF">
-                  <a:alpha val="100000"/>
-                </a:srgbClr>
-              </a:solidFill>
-              <a:prstDash val="solid"/>
-              <a:round/>
-            </a:ln>
-          </p:spPr>
-          <p:txBody>
-            <a:bodyPr/>
-            <a:lstStyle/>
-            <a:p/>
-          </p:txBody>
-        </p:sp>
-        <p:sp>
-          <p:nvSpPr>
-            <p:cNvPr id="37" name="pl35"/>
-            <p:cNvSpPr/>
-            <p:nvPr/>
-          </p:nvSpPr>
-          <p:spPr>
-            <a:xfrm>
-              <a:off x="3308893" y="2770724"/>
-              <a:ext cx="0" cy="1514422"/>
-            </a:xfrm>
-            <a:custGeom>
-              <a:avLst/>
-              <a:pathLst>
-                <a:path w="0" h="1514422">
-                  <a:moveTo>
-                    <a:pt x="0" y="1514422"/>
-                  </a:moveTo>
-                  <a:lnTo>
-                    <a:pt x="0" y="0"/>
-                  </a:lnTo>
-                  <a:lnTo>
-                    <a:pt x="0" y="0"/>
-                  </a:lnTo>
-                </a:path>
-              </a:pathLst>
-            </a:custGeom>
-            <a:ln w="13550" cap="flat">
-              <a:solidFill>
-                <a:srgbClr val="FFFFFF">
-                  <a:alpha val="100000"/>
-                </a:srgbClr>
-              </a:solidFill>
-              <a:prstDash val="solid"/>
-              <a:round/>
-            </a:ln>
-          </p:spPr>
-          <p:txBody>
-            <a:bodyPr/>
-            <a:lstStyle/>
-            <a:p/>
-          </p:txBody>
-        </p:sp>
-        <p:sp>
-          <p:nvSpPr>
-            <p:cNvPr id="38" name="pl36"/>
-            <p:cNvSpPr/>
-            <p:nvPr/>
-          </p:nvSpPr>
-          <p:spPr>
-            <a:xfrm>
-              <a:off x="3883388" y="2770724"/>
-              <a:ext cx="0" cy="1514422"/>
-            </a:xfrm>
-            <a:custGeom>
-              <a:avLst/>
-              <a:pathLst>
-                <a:path w="0" h="1514422">
-                  <a:moveTo>
-                    <a:pt x="0" y="1514422"/>
-                  </a:moveTo>
-                  <a:lnTo>
-                    <a:pt x="0" y="0"/>
-                  </a:lnTo>
-                  <a:lnTo>
-                    <a:pt x="0" y="0"/>
-                  </a:lnTo>
-                </a:path>
-              </a:pathLst>
-            </a:custGeom>
-            <a:ln w="13550" cap="flat">
-              <a:solidFill>
-                <a:srgbClr val="FFFFFF">
-                  <a:alpha val="100000"/>
-                </a:srgbClr>
-              </a:solidFill>
-              <a:prstDash val="solid"/>
-              <a:round/>
-            </a:ln>
-          </p:spPr>
-          <p:txBody>
-            <a:bodyPr/>
-            <a:lstStyle/>
-            <a:p/>
-          </p:txBody>
-        </p:sp>
-        <p:sp>
-          <p:nvSpPr>
-            <p:cNvPr id="39" name="pl37"/>
-            <p:cNvSpPr/>
-            <p:nvPr/>
-          </p:nvSpPr>
-          <p:spPr>
-            <a:xfrm>
-              <a:off x="4457884" y="2770724"/>
-              <a:ext cx="0" cy="1514422"/>
-            </a:xfrm>
-            <a:custGeom>
-              <a:avLst/>
-              <a:pathLst>
-                <a:path w="0" h="1514422">
-                  <a:moveTo>
-                    <a:pt x="0" y="1514422"/>
-                  </a:moveTo>
-                  <a:lnTo>
-                    <a:pt x="0" y="0"/>
-                  </a:lnTo>
-                  <a:lnTo>
-                    <a:pt x="0" y="0"/>
-                  </a:lnTo>
-                </a:path>
-              </a:pathLst>
-            </a:custGeom>
-            <a:ln w="13550" cap="flat">
-              <a:solidFill>
-                <a:srgbClr val="FFFFFF">
-                  <a:alpha val="100000"/>
-                </a:srgbClr>
-              </a:solidFill>
-              <a:prstDash val="solid"/>
-              <a:round/>
-            </a:ln>
-          </p:spPr>
-          <p:txBody>
-            <a:bodyPr/>
-            <a:lstStyle/>
-            <a:p/>
-          </p:txBody>
-        </p:sp>
-        <p:sp>
-          <p:nvSpPr>
-            <p:cNvPr id="40" name="pl38"/>
-            <p:cNvSpPr/>
-            <p:nvPr/>
-          </p:nvSpPr>
-          <p:spPr>
-            <a:xfrm>
-              <a:off x="5032379" y="2770724"/>
-              <a:ext cx="0" cy="1514422"/>
-            </a:xfrm>
-            <a:custGeom>
-              <a:avLst/>
-              <a:pathLst>
-                <a:path w="0" h="1514422">
-                  <a:moveTo>
-                    <a:pt x="0" y="1514422"/>
-                  </a:moveTo>
-                  <a:lnTo>
-                    <a:pt x="0" y="0"/>
-                  </a:lnTo>
-                  <a:lnTo>
-                    <a:pt x="0" y="0"/>
-                  </a:lnTo>
-                </a:path>
-              </a:pathLst>
-            </a:custGeom>
-            <a:ln w="13550" cap="flat">
-              <a:solidFill>
-                <a:srgbClr val="FFFFFF">
-                  <a:alpha val="100000"/>
-                </a:srgbClr>
-              </a:solidFill>
-              <a:prstDash val="solid"/>
-              <a:round/>
-            </a:ln>
-          </p:spPr>
-          <p:txBody>
-            <a:bodyPr/>
-            <a:lstStyle/>
-            <a:p/>
-          </p:txBody>
-        </p:sp>
-        <p:sp>
-          <p:nvSpPr>
-            <p:cNvPr id="41" name="pl39"/>
-            <p:cNvSpPr/>
-            <p:nvPr/>
-          </p:nvSpPr>
-          <p:spPr>
-            <a:xfrm>
-              <a:off x="5606874" y="2770724"/>
-              <a:ext cx="0" cy="1514422"/>
-            </a:xfrm>
-            <a:custGeom>
-              <a:avLst/>
-              <a:pathLst>
-                <a:path w="0" h="1514422">
-                  <a:moveTo>
-                    <a:pt x="0" y="1514422"/>
-                  </a:moveTo>
-                  <a:lnTo>
-                    <a:pt x="0" y="0"/>
-                  </a:lnTo>
-                  <a:lnTo>
-                    <a:pt x="0" y="0"/>
-                  </a:lnTo>
-                </a:path>
-              </a:pathLst>
-            </a:custGeom>
-            <a:ln w="13550" cap="flat">
-              <a:solidFill>
-                <a:srgbClr val="FFFFFF">
-                  <a:alpha val="100000"/>
-                </a:srgbClr>
-              </a:solidFill>
-              <a:prstDash val="solid"/>
-              <a:round/>
-            </a:ln>
-          </p:spPr>
-          <p:txBody>
-            <a:bodyPr/>
-            <a:lstStyle/>
-            <a:p/>
-          </p:txBody>
-        </p:sp>
-        <p:sp>
-          <p:nvSpPr>
-            <p:cNvPr id="42" name="pl40"/>
-            <p:cNvSpPr/>
-            <p:nvPr/>
-          </p:nvSpPr>
-          <p:spPr>
-            <a:xfrm>
-              <a:off x="6181369" y="2770724"/>
-              <a:ext cx="0" cy="1514422"/>
-            </a:xfrm>
-            <a:custGeom>
-              <a:avLst/>
-              <a:pathLst>
-                <a:path w="0" h="1514422">
-                  <a:moveTo>
-                    <a:pt x="0" y="1514422"/>
-                  </a:moveTo>
-                  <a:lnTo>
-                    <a:pt x="0" y="0"/>
-                  </a:lnTo>
-                  <a:lnTo>
-                    <a:pt x="0" y="0"/>
-                  </a:lnTo>
-                </a:path>
-              </a:pathLst>
-            </a:custGeom>
-            <a:ln w="13550" cap="flat">
-              <a:solidFill>
-                <a:srgbClr val="FFFFFF">
-                  <a:alpha val="100000"/>
-                </a:srgbClr>
-              </a:solidFill>
-              <a:prstDash val="solid"/>
-              <a:round/>
-            </a:ln>
-          </p:spPr>
-          <p:txBody>
-            <a:bodyPr/>
-            <a:lstStyle/>
-            <a:p/>
-          </p:txBody>
-        </p:sp>
-        <p:sp>
-          <p:nvSpPr>
-            <p:cNvPr id="43" name="pl41"/>
-            <p:cNvSpPr/>
-            <p:nvPr/>
-          </p:nvSpPr>
-          <p:spPr>
-            <a:xfrm>
-              <a:off x="6755864" y="2770724"/>
-              <a:ext cx="0" cy="1514422"/>
-            </a:xfrm>
-            <a:custGeom>
-              <a:avLst/>
-              <a:pathLst>
-                <a:path w="0" h="1514422">
-                  <a:moveTo>
-                    <a:pt x="0" y="1514422"/>
-                  </a:moveTo>
-                  <a:lnTo>
-                    <a:pt x="0" y="0"/>
-                  </a:lnTo>
-                  <a:lnTo>
-                    <a:pt x="0" y="0"/>
-                  </a:lnTo>
-                </a:path>
-              </a:pathLst>
-            </a:custGeom>
-            <a:ln w="13550" cap="flat">
-              <a:solidFill>
-                <a:srgbClr val="FFFFFF">
-                  <a:alpha val="100000"/>
-                </a:srgbClr>
-              </a:solidFill>
-              <a:prstDash val="solid"/>
-              <a:round/>
-            </a:ln>
-          </p:spPr>
-          <p:txBody>
-            <a:bodyPr/>
-            <a:lstStyle/>
-            <a:p/>
-          </p:txBody>
-        </p:sp>
-        <p:sp>
-          <p:nvSpPr>
-            <p:cNvPr id="44" name="pl42"/>
-            <p:cNvSpPr/>
-            <p:nvPr/>
-          </p:nvSpPr>
-          <p:spPr>
-            <a:xfrm>
-              <a:off x="7330360" y="2770724"/>
-              <a:ext cx="0" cy="1514422"/>
-            </a:xfrm>
-            <a:custGeom>
-              <a:avLst/>
-              <a:pathLst>
-                <a:path w="0" h="1514422">
-                  <a:moveTo>
-                    <a:pt x="0" y="1514422"/>
-                  </a:moveTo>
-                  <a:lnTo>
-                    <a:pt x="0" y="0"/>
-                  </a:lnTo>
-                  <a:lnTo>
-                    <a:pt x="0" y="0"/>
-                  </a:lnTo>
-                </a:path>
-              </a:pathLst>
-            </a:custGeom>
-            <a:ln w="13550" cap="flat">
-              <a:solidFill>
-                <a:srgbClr val="FFFFFF">
-                  <a:alpha val="100000"/>
-                </a:srgbClr>
-              </a:solidFill>
-              <a:prstDash val="solid"/>
-              <a:round/>
-            </a:ln>
-          </p:spPr>
-          <p:txBody>
-            <a:bodyPr/>
-            <a:lstStyle/>
-            <a:p/>
-          </p:txBody>
-        </p:sp>
-        <p:sp>
-          <p:nvSpPr>
-            <p:cNvPr id="45" name="pl43"/>
-            <p:cNvSpPr/>
-            <p:nvPr/>
-          </p:nvSpPr>
-          <p:spPr>
-            <a:xfrm>
-              <a:off x="7904855" y="2770724"/>
-              <a:ext cx="0" cy="1514422"/>
-            </a:xfrm>
-            <a:custGeom>
-              <a:avLst/>
-              <a:pathLst>
-                <a:path w="0" h="1514422">
-                  <a:moveTo>
-                    <a:pt x="0" y="1514422"/>
-                  </a:moveTo>
-                  <a:lnTo>
-                    <a:pt x="0" y="0"/>
-                  </a:lnTo>
-                  <a:lnTo>
-                    <a:pt x="0" y="0"/>
-                  </a:lnTo>
-                </a:path>
-              </a:pathLst>
-            </a:custGeom>
-            <a:ln w="13550" cap="flat">
-              <a:solidFill>
-                <a:srgbClr val="FFFFFF">
-                  <a:alpha val="100000"/>
-                </a:srgbClr>
-              </a:solidFill>
-              <a:prstDash val="solid"/>
-              <a:round/>
-            </a:ln>
-          </p:spPr>
-          <p:txBody>
-            <a:bodyPr/>
-            <a:lstStyle/>
-            <a:p/>
-          </p:txBody>
-        </p:sp>
-        <p:sp>
-          <p:nvSpPr>
-            <p:cNvPr id="46" name="pl44"/>
-            <p:cNvSpPr/>
-            <p:nvPr/>
-          </p:nvSpPr>
-          <p:spPr>
-            <a:xfrm>
-              <a:off x="8479350" y="2770724"/>
-              <a:ext cx="0" cy="1514422"/>
-            </a:xfrm>
-            <a:custGeom>
-              <a:avLst/>
-              <a:pathLst>
-                <a:path w="0" h="1514422">
-                  <a:moveTo>
-                    <a:pt x="0" y="1514422"/>
-                  </a:moveTo>
-                  <a:lnTo>
-                    <a:pt x="0" y="0"/>
-                  </a:lnTo>
-                  <a:lnTo>
-                    <a:pt x="0" y="0"/>
-                  </a:lnTo>
-                </a:path>
-              </a:pathLst>
-            </a:custGeom>
-            <a:ln w="13550" cap="flat">
-              <a:solidFill>
-                <a:srgbClr val="FFFFFF">
-                  <a:alpha val="100000"/>
-                </a:srgbClr>
-              </a:solidFill>
-              <a:prstDash val="solid"/>
-              <a:round/>
-            </a:ln>
-          </p:spPr>
-          <p:txBody>
-            <a:bodyPr/>
-            <a:lstStyle/>
-            <a:p/>
-          </p:txBody>
-        </p:sp>
-        <p:sp>
-          <p:nvSpPr>
-            <p:cNvPr id="47" name="pt45"/>
-            <p:cNvSpPr/>
-            <p:nvPr/>
-          </p:nvSpPr>
-          <p:spPr>
-            <a:xfrm>
-              <a:off x="7146834" y="3278579"/>
+            <p:cNvPr id="41" name="pt39"/>
+            <p:cNvSpPr/>
+            <p:nvPr/>
+          </p:nvSpPr>
+          <p:spPr>
+            <a:xfrm>
+              <a:off x="5831206" y="2820634"/>
               <a:ext cx="138135" cy="138135"/>
             </a:xfrm>
             <a:prstGeom prst="ellipse">
@@ -5111,13 +4866,13 @@
         </p:sp>
         <p:sp>
           <p:nvSpPr>
-            <p:cNvPr id="48" name="pt46"/>
-            <p:cNvSpPr/>
-            <p:nvPr/>
-          </p:nvSpPr>
-          <p:spPr>
-            <a:xfrm>
-              <a:off x="4665426" y="3278579"/>
+            <p:cNvPr id="42" name="pt40"/>
+            <p:cNvSpPr/>
+            <p:nvPr/>
+          </p:nvSpPr>
+          <p:spPr>
+            <a:xfrm>
+              <a:off x="4627882" y="2820634"/>
               <a:ext cx="138135" cy="138135"/>
             </a:xfrm>
             <a:prstGeom prst="ellipse">
@@ -5146,13 +4901,13 @@
         </p:sp>
         <p:sp>
           <p:nvSpPr>
-            <p:cNvPr id="49" name="pt47"/>
-            <p:cNvSpPr/>
-            <p:nvPr/>
-          </p:nvSpPr>
-          <p:spPr>
-            <a:xfrm>
-              <a:off x="5250494" y="2918002"/>
+            <p:cNvPr id="43" name="pt41"/>
+            <p:cNvSpPr/>
+            <p:nvPr/>
+          </p:nvSpPr>
+          <p:spPr>
+            <a:xfrm>
+              <a:off x="8182369" y="2411374"/>
               <a:ext cx="138135" cy="138135"/>
             </a:xfrm>
             <a:prstGeom prst="ellipse">
@@ -5181,13 +4936,13 @@
         </p:sp>
         <p:sp>
           <p:nvSpPr>
-            <p:cNvPr id="50" name="pt48"/>
-            <p:cNvSpPr/>
-            <p:nvPr/>
-          </p:nvSpPr>
-          <p:spPr>
-            <a:xfrm>
-              <a:off x="8365058" y="2918002"/>
+            <p:cNvPr id="44" name="pt42"/>
+            <p:cNvSpPr/>
+            <p:nvPr/>
+          </p:nvSpPr>
+          <p:spPr>
+            <a:xfrm>
+              <a:off x="7927867" y="2411374"/>
               <a:ext cx="138135" cy="138135"/>
             </a:xfrm>
             <a:prstGeom prst="ellipse">
@@ -5216,13 +4971,13 @@
         </p:sp>
         <p:sp>
           <p:nvSpPr>
-            <p:cNvPr id="51" name="pt49"/>
-            <p:cNvSpPr/>
-            <p:nvPr/>
-          </p:nvSpPr>
-          <p:spPr>
-            <a:xfrm>
-              <a:off x="7576922" y="3999732"/>
+            <p:cNvPr id="45" name="pt43"/>
+            <p:cNvSpPr/>
+            <p:nvPr/>
+          </p:nvSpPr>
+          <p:spPr>
+            <a:xfrm>
+              <a:off x="6663082" y="2002113"/>
               <a:ext cx="138135" cy="138135"/>
             </a:xfrm>
             <a:prstGeom prst="ellipse">
@@ -5251,13 +5006,13 @@
         </p:sp>
         <p:sp>
           <p:nvSpPr>
-            <p:cNvPr id="52" name="pt50"/>
-            <p:cNvSpPr/>
-            <p:nvPr/>
-          </p:nvSpPr>
-          <p:spPr>
-            <a:xfrm>
-              <a:off x="3309082" y="3999732"/>
+            <p:cNvPr id="46" name="pt44"/>
+            <p:cNvSpPr/>
+            <p:nvPr/>
+          </p:nvSpPr>
+          <p:spPr>
+            <a:xfrm>
+              <a:off x="6150716" y="2002113"/>
               <a:ext cx="138135" cy="138135"/>
             </a:xfrm>
             <a:prstGeom prst="ellipse">
@@ -5286,13 +5041,13 @@
         </p:sp>
         <p:sp>
           <p:nvSpPr>
-            <p:cNvPr id="53" name="pt51"/>
-            <p:cNvSpPr/>
-            <p:nvPr/>
-          </p:nvSpPr>
-          <p:spPr>
-            <a:xfrm>
-              <a:off x="5191435" y="3639155"/>
+            <p:cNvPr id="47" name="pt45"/>
+            <p:cNvSpPr/>
+            <p:nvPr/>
+          </p:nvSpPr>
+          <p:spPr>
+            <a:xfrm>
+              <a:off x="4491802" y="4457677"/>
               <a:ext cx="138135" cy="138135"/>
             </a:xfrm>
             <a:prstGeom prst="ellipse">
@@ -5321,13 +5076,13 @@
         </p:sp>
         <p:sp>
           <p:nvSpPr>
-            <p:cNvPr id="54" name="pt52"/>
-            <p:cNvSpPr/>
-            <p:nvPr/>
-          </p:nvSpPr>
-          <p:spPr>
-            <a:xfrm>
-              <a:off x="8317588" y="3639155"/>
+            <p:cNvPr id="48" name="pt46"/>
+            <p:cNvSpPr/>
+            <p:nvPr/>
+          </p:nvSpPr>
+          <p:spPr>
+            <a:xfrm>
+              <a:off x="4988426" y="4457677"/>
               <a:ext cx="138135" cy="138135"/>
             </a:xfrm>
             <a:prstGeom prst="ellipse">
@@ -5356,756 +5111,13 @@
         </p:sp>
         <p:sp>
           <p:nvSpPr>
-            <p:cNvPr id="55" name="rc53"/>
-            <p:cNvSpPr/>
-            <p:nvPr/>
-          </p:nvSpPr>
-          <p:spPr>
-            <a:xfrm>
-              <a:off x="2447150" y="4436976"/>
-              <a:ext cx="6319447" cy="1153845"/>
-            </a:xfrm>
-            <a:prstGeom prst="rect">
-              <a:avLst/>
-            </a:prstGeom>
-          </p:spPr>
-          <p:txBody>
-            <a:bodyPr/>
-            <a:lstStyle/>
-            <a:p/>
-          </p:txBody>
-        </p:sp>
-        <p:sp>
-          <p:nvSpPr>
-            <p:cNvPr id="56" name="pl54"/>
-            <p:cNvSpPr/>
-            <p:nvPr/>
-          </p:nvSpPr>
-          <p:spPr>
-            <a:xfrm>
-              <a:off x="2447150" y="5374476"/>
-              <a:ext cx="6319447" cy="0"/>
-            </a:xfrm>
-            <a:custGeom>
-              <a:avLst/>
-              <a:pathLst>
-                <a:path w="6319447" h="0">
-                  <a:moveTo>
-                    <a:pt x="0" y="0"/>
-                  </a:moveTo>
-                  <a:lnTo>
-                    <a:pt x="6319447" y="0"/>
-                  </a:lnTo>
-                  <a:lnTo>
-                    <a:pt x="6319447" y="0"/>
-                  </a:lnTo>
-                </a:path>
-              </a:pathLst>
-            </a:custGeom>
-            <a:ln w="108405" cap="flat">
-              <a:solidFill>
-                <a:srgbClr val="BBBBBB">
-                  <a:alpha val="100000"/>
-                </a:srgbClr>
-              </a:solidFill>
-              <a:prstDash val="solid"/>
-              <a:round/>
-            </a:ln>
-          </p:spPr>
-          <p:txBody>
-            <a:bodyPr/>
-            <a:lstStyle/>
-            <a:p/>
-          </p:txBody>
-        </p:sp>
-        <p:sp>
-          <p:nvSpPr>
-            <p:cNvPr id="57" name="pl55"/>
-            <p:cNvSpPr/>
-            <p:nvPr/>
-          </p:nvSpPr>
-          <p:spPr>
-            <a:xfrm>
-              <a:off x="2447150" y="5013899"/>
-              <a:ext cx="6319447" cy="0"/>
-            </a:xfrm>
-            <a:custGeom>
-              <a:avLst/>
-              <a:pathLst>
-                <a:path w="6319447" h="0">
-                  <a:moveTo>
-                    <a:pt x="0" y="0"/>
-                  </a:moveTo>
-                  <a:lnTo>
-                    <a:pt x="6319447" y="0"/>
-                  </a:lnTo>
-                  <a:lnTo>
-                    <a:pt x="6319447" y="0"/>
-                  </a:lnTo>
-                </a:path>
-              </a:pathLst>
-            </a:custGeom>
-            <a:ln w="108405" cap="flat">
-              <a:solidFill>
-                <a:srgbClr val="EEEEEE">
-                  <a:alpha val="100000"/>
-                </a:srgbClr>
-              </a:solidFill>
-              <a:prstDash val="solid"/>
-              <a:round/>
-            </a:ln>
-          </p:spPr>
-          <p:txBody>
-            <a:bodyPr/>
-            <a:lstStyle/>
-            <a:p/>
-          </p:txBody>
-        </p:sp>
-        <p:sp>
-          <p:nvSpPr>
-            <p:cNvPr id="58" name="pl56"/>
-            <p:cNvSpPr/>
-            <p:nvPr/>
-          </p:nvSpPr>
-          <p:spPr>
-            <a:xfrm>
-              <a:off x="2447150" y="4653322"/>
-              <a:ext cx="6319447" cy="0"/>
-            </a:xfrm>
-            <a:custGeom>
-              <a:avLst/>
-              <a:pathLst>
-                <a:path w="6319447" h="0">
-                  <a:moveTo>
-                    <a:pt x="0" y="0"/>
-                  </a:moveTo>
-                  <a:lnTo>
-                    <a:pt x="6319447" y="0"/>
-                  </a:lnTo>
-                  <a:lnTo>
-                    <a:pt x="6319447" y="0"/>
-                  </a:lnTo>
-                </a:path>
-              </a:pathLst>
-            </a:custGeom>
-            <a:ln w="108405" cap="flat">
-              <a:solidFill>
-                <a:srgbClr val="BBBBBB">
-                  <a:alpha val="100000"/>
-                </a:srgbClr>
-              </a:solidFill>
-              <a:prstDash val="solid"/>
-              <a:round/>
-            </a:ln>
-          </p:spPr>
-          <p:txBody>
-            <a:bodyPr/>
-            <a:lstStyle/>
-            <a:p/>
-          </p:txBody>
-        </p:sp>
-        <p:sp>
-          <p:nvSpPr>
-            <p:cNvPr id="59" name="pl57"/>
-            <p:cNvSpPr/>
-            <p:nvPr/>
-          </p:nvSpPr>
-          <p:spPr>
-            <a:xfrm>
-              <a:off x="4092626" y="5374476"/>
-              <a:ext cx="1735916" cy="0"/>
-            </a:xfrm>
-            <a:custGeom>
-              <a:avLst/>
-              <a:pathLst>
-                <a:path w="1735916" h="0">
-                  <a:moveTo>
-                    <a:pt x="0" y="0"/>
-                  </a:moveTo>
-                  <a:lnTo>
-                    <a:pt x="1735916" y="0"/>
-                  </a:lnTo>
-                </a:path>
-              </a:pathLst>
-            </a:custGeom>
-            <a:ln w="108405" cap="flat">
-              <a:solidFill>
-                <a:srgbClr val="1952A8">
-                  <a:alpha val="100000"/>
-                </a:srgbClr>
-              </a:solidFill>
-              <a:prstDash val="solid"/>
-              <a:round/>
-            </a:ln>
-          </p:spPr>
-          <p:txBody>
-            <a:bodyPr/>
-            <a:lstStyle/>
-            <a:p/>
-          </p:txBody>
-        </p:sp>
-        <p:sp>
-          <p:nvSpPr>
-            <p:cNvPr id="60" name="pl58"/>
-            <p:cNvSpPr/>
-            <p:nvPr/>
-          </p:nvSpPr>
-          <p:spPr>
-            <a:xfrm>
-              <a:off x="4775704" y="5013899"/>
-              <a:ext cx="32930" cy="0"/>
-            </a:xfrm>
-            <a:custGeom>
-              <a:avLst/>
-              <a:pathLst>
-                <a:path w="32930" h="0">
-                  <a:moveTo>
-                    <a:pt x="32930" y="0"/>
-                  </a:moveTo>
-                  <a:lnTo>
-                    <a:pt x="0" y="0"/>
-                  </a:lnTo>
-                </a:path>
-              </a:pathLst>
-            </a:custGeom>
-            <a:ln w="108405" cap="flat">
-              <a:solidFill>
-                <a:srgbClr val="1952A8">
-                  <a:alpha val="100000"/>
-                </a:srgbClr>
-              </a:solidFill>
-              <a:prstDash val="solid"/>
-              <a:round/>
-            </a:ln>
-          </p:spPr>
-          <p:txBody>
-            <a:bodyPr/>
-            <a:lstStyle/>
-            <a:p/>
-          </p:txBody>
-        </p:sp>
-        <p:sp>
-          <p:nvSpPr>
-            <p:cNvPr id="61" name="pl59"/>
-            <p:cNvSpPr/>
-            <p:nvPr/>
-          </p:nvSpPr>
-          <p:spPr>
-            <a:xfrm>
-              <a:off x="3242137" y="4653322"/>
-              <a:ext cx="1267786" cy="0"/>
-            </a:xfrm>
-            <a:custGeom>
-              <a:avLst/>
-              <a:pathLst>
-                <a:path w="1267786" h="0">
-                  <a:moveTo>
-                    <a:pt x="1267786" y="0"/>
-                  </a:moveTo>
-                  <a:lnTo>
-                    <a:pt x="0" y="0"/>
-                  </a:lnTo>
-                </a:path>
-              </a:pathLst>
-            </a:custGeom>
-            <a:ln w="108405" cap="flat">
-              <a:solidFill>
-                <a:srgbClr val="1952A8">
-                  <a:alpha val="100000"/>
-                </a:srgbClr>
-              </a:solidFill>
-              <a:prstDash val="solid"/>
-              <a:round/>
-            </a:ln>
-          </p:spPr>
-          <p:txBody>
-            <a:bodyPr/>
-            <a:lstStyle/>
-            <a:p/>
-          </p:txBody>
-        </p:sp>
-        <p:sp>
-          <p:nvSpPr>
-            <p:cNvPr id="62" name="pl60"/>
-            <p:cNvSpPr/>
-            <p:nvPr/>
-          </p:nvSpPr>
-          <p:spPr>
-            <a:xfrm>
-              <a:off x="2734398" y="4436976"/>
-              <a:ext cx="0" cy="1153845"/>
-            </a:xfrm>
-            <a:custGeom>
-              <a:avLst/>
-              <a:pathLst>
-                <a:path w="0" h="1153845">
-                  <a:moveTo>
-                    <a:pt x="0" y="1153845"/>
-                  </a:moveTo>
-                  <a:lnTo>
-                    <a:pt x="0" y="0"/>
-                  </a:lnTo>
-                  <a:lnTo>
-                    <a:pt x="0" y="0"/>
-                  </a:lnTo>
-                </a:path>
-              </a:pathLst>
-            </a:custGeom>
-            <a:ln w="13550" cap="flat">
-              <a:solidFill>
-                <a:srgbClr val="FFFFFF">
-                  <a:alpha val="100000"/>
-                </a:srgbClr>
-              </a:solidFill>
-              <a:prstDash val="solid"/>
-              <a:round/>
-            </a:ln>
-          </p:spPr>
-          <p:txBody>
-            <a:bodyPr/>
-            <a:lstStyle/>
-            <a:p/>
-          </p:txBody>
-        </p:sp>
-        <p:sp>
-          <p:nvSpPr>
-            <p:cNvPr id="63" name="pl61"/>
-            <p:cNvSpPr/>
-            <p:nvPr/>
-          </p:nvSpPr>
-          <p:spPr>
-            <a:xfrm>
-              <a:off x="3308893" y="4436976"/>
-              <a:ext cx="0" cy="1153845"/>
-            </a:xfrm>
-            <a:custGeom>
-              <a:avLst/>
-              <a:pathLst>
-                <a:path w="0" h="1153845">
-                  <a:moveTo>
-                    <a:pt x="0" y="1153845"/>
-                  </a:moveTo>
-                  <a:lnTo>
-                    <a:pt x="0" y="0"/>
-                  </a:lnTo>
-                  <a:lnTo>
-                    <a:pt x="0" y="0"/>
-                  </a:lnTo>
-                </a:path>
-              </a:pathLst>
-            </a:custGeom>
-            <a:ln w="13550" cap="flat">
-              <a:solidFill>
-                <a:srgbClr val="FFFFFF">
-                  <a:alpha val="100000"/>
-                </a:srgbClr>
-              </a:solidFill>
-              <a:prstDash val="solid"/>
-              <a:round/>
-            </a:ln>
-          </p:spPr>
-          <p:txBody>
-            <a:bodyPr/>
-            <a:lstStyle/>
-            <a:p/>
-          </p:txBody>
-        </p:sp>
-        <p:sp>
-          <p:nvSpPr>
-            <p:cNvPr id="64" name="pl62"/>
-            <p:cNvSpPr/>
-            <p:nvPr/>
-          </p:nvSpPr>
-          <p:spPr>
-            <a:xfrm>
-              <a:off x="3883388" y="4436976"/>
-              <a:ext cx="0" cy="1153845"/>
-            </a:xfrm>
-            <a:custGeom>
-              <a:avLst/>
-              <a:pathLst>
-                <a:path w="0" h="1153845">
-                  <a:moveTo>
-                    <a:pt x="0" y="1153845"/>
-                  </a:moveTo>
-                  <a:lnTo>
-                    <a:pt x="0" y="0"/>
-                  </a:lnTo>
-                  <a:lnTo>
-                    <a:pt x="0" y="0"/>
-                  </a:lnTo>
-                </a:path>
-              </a:pathLst>
-            </a:custGeom>
-            <a:ln w="13550" cap="flat">
-              <a:solidFill>
-                <a:srgbClr val="FFFFFF">
-                  <a:alpha val="100000"/>
-                </a:srgbClr>
-              </a:solidFill>
-              <a:prstDash val="solid"/>
-              <a:round/>
-            </a:ln>
-          </p:spPr>
-          <p:txBody>
-            <a:bodyPr/>
-            <a:lstStyle/>
-            <a:p/>
-          </p:txBody>
-        </p:sp>
-        <p:sp>
-          <p:nvSpPr>
-            <p:cNvPr id="65" name="pl63"/>
-            <p:cNvSpPr/>
-            <p:nvPr/>
-          </p:nvSpPr>
-          <p:spPr>
-            <a:xfrm>
-              <a:off x="4457884" y="4436976"/>
-              <a:ext cx="0" cy="1153845"/>
-            </a:xfrm>
-            <a:custGeom>
-              <a:avLst/>
-              <a:pathLst>
-                <a:path w="0" h="1153845">
-                  <a:moveTo>
-                    <a:pt x="0" y="1153845"/>
-                  </a:moveTo>
-                  <a:lnTo>
-                    <a:pt x="0" y="0"/>
-                  </a:lnTo>
-                  <a:lnTo>
-                    <a:pt x="0" y="0"/>
-                  </a:lnTo>
-                </a:path>
-              </a:pathLst>
-            </a:custGeom>
-            <a:ln w="13550" cap="flat">
-              <a:solidFill>
-                <a:srgbClr val="FFFFFF">
-                  <a:alpha val="100000"/>
-                </a:srgbClr>
-              </a:solidFill>
-              <a:prstDash val="solid"/>
-              <a:round/>
-            </a:ln>
-          </p:spPr>
-          <p:txBody>
-            <a:bodyPr/>
-            <a:lstStyle/>
-            <a:p/>
-          </p:txBody>
-        </p:sp>
-        <p:sp>
-          <p:nvSpPr>
-            <p:cNvPr id="66" name="pl64"/>
-            <p:cNvSpPr/>
-            <p:nvPr/>
-          </p:nvSpPr>
-          <p:spPr>
-            <a:xfrm>
-              <a:off x="5032379" y="4436976"/>
-              <a:ext cx="0" cy="1153845"/>
-            </a:xfrm>
-            <a:custGeom>
-              <a:avLst/>
-              <a:pathLst>
-                <a:path w="0" h="1153845">
-                  <a:moveTo>
-                    <a:pt x="0" y="1153845"/>
-                  </a:moveTo>
-                  <a:lnTo>
-                    <a:pt x="0" y="0"/>
-                  </a:lnTo>
-                  <a:lnTo>
-                    <a:pt x="0" y="0"/>
-                  </a:lnTo>
-                </a:path>
-              </a:pathLst>
-            </a:custGeom>
-            <a:ln w="13550" cap="flat">
-              <a:solidFill>
-                <a:srgbClr val="FFFFFF">
-                  <a:alpha val="100000"/>
-                </a:srgbClr>
-              </a:solidFill>
-              <a:prstDash val="solid"/>
-              <a:round/>
-            </a:ln>
-          </p:spPr>
-          <p:txBody>
-            <a:bodyPr/>
-            <a:lstStyle/>
-            <a:p/>
-          </p:txBody>
-        </p:sp>
-        <p:sp>
-          <p:nvSpPr>
-            <p:cNvPr id="67" name="pl65"/>
-            <p:cNvSpPr/>
-            <p:nvPr/>
-          </p:nvSpPr>
-          <p:spPr>
-            <a:xfrm>
-              <a:off x="5606874" y="4436976"/>
-              <a:ext cx="0" cy="1153845"/>
-            </a:xfrm>
-            <a:custGeom>
-              <a:avLst/>
-              <a:pathLst>
-                <a:path w="0" h="1153845">
-                  <a:moveTo>
-                    <a:pt x="0" y="1153845"/>
-                  </a:moveTo>
-                  <a:lnTo>
-                    <a:pt x="0" y="0"/>
-                  </a:lnTo>
-                  <a:lnTo>
-                    <a:pt x="0" y="0"/>
-                  </a:lnTo>
-                </a:path>
-              </a:pathLst>
-            </a:custGeom>
-            <a:ln w="13550" cap="flat">
-              <a:solidFill>
-                <a:srgbClr val="FFFFFF">
-                  <a:alpha val="100000"/>
-                </a:srgbClr>
-              </a:solidFill>
-              <a:prstDash val="solid"/>
-              <a:round/>
-            </a:ln>
-          </p:spPr>
-          <p:txBody>
-            <a:bodyPr/>
-            <a:lstStyle/>
-            <a:p/>
-          </p:txBody>
-        </p:sp>
-        <p:sp>
-          <p:nvSpPr>
-            <p:cNvPr id="68" name="pl66"/>
-            <p:cNvSpPr/>
-            <p:nvPr/>
-          </p:nvSpPr>
-          <p:spPr>
-            <a:xfrm>
-              <a:off x="6181369" y="4436976"/>
-              <a:ext cx="0" cy="1153845"/>
-            </a:xfrm>
-            <a:custGeom>
-              <a:avLst/>
-              <a:pathLst>
-                <a:path w="0" h="1153845">
-                  <a:moveTo>
-                    <a:pt x="0" y="1153845"/>
-                  </a:moveTo>
-                  <a:lnTo>
-                    <a:pt x="0" y="0"/>
-                  </a:lnTo>
-                  <a:lnTo>
-                    <a:pt x="0" y="0"/>
-                  </a:lnTo>
-                </a:path>
-              </a:pathLst>
-            </a:custGeom>
-            <a:ln w="13550" cap="flat">
-              <a:solidFill>
-                <a:srgbClr val="FFFFFF">
-                  <a:alpha val="100000"/>
-                </a:srgbClr>
-              </a:solidFill>
-              <a:prstDash val="solid"/>
-              <a:round/>
-            </a:ln>
-          </p:spPr>
-          <p:txBody>
-            <a:bodyPr/>
-            <a:lstStyle/>
-            <a:p/>
-          </p:txBody>
-        </p:sp>
-        <p:sp>
-          <p:nvSpPr>
-            <p:cNvPr id="69" name="pl67"/>
-            <p:cNvSpPr/>
-            <p:nvPr/>
-          </p:nvSpPr>
-          <p:spPr>
-            <a:xfrm>
-              <a:off x="6755864" y="4436976"/>
-              <a:ext cx="0" cy="1153845"/>
-            </a:xfrm>
-            <a:custGeom>
-              <a:avLst/>
-              <a:pathLst>
-                <a:path w="0" h="1153845">
-                  <a:moveTo>
-                    <a:pt x="0" y="1153845"/>
-                  </a:moveTo>
-                  <a:lnTo>
-                    <a:pt x="0" y="0"/>
-                  </a:lnTo>
-                  <a:lnTo>
-                    <a:pt x="0" y="0"/>
-                  </a:lnTo>
-                </a:path>
-              </a:pathLst>
-            </a:custGeom>
-            <a:ln w="13550" cap="flat">
-              <a:solidFill>
-                <a:srgbClr val="FFFFFF">
-                  <a:alpha val="100000"/>
-                </a:srgbClr>
-              </a:solidFill>
-              <a:prstDash val="solid"/>
-              <a:round/>
-            </a:ln>
-          </p:spPr>
-          <p:txBody>
-            <a:bodyPr/>
-            <a:lstStyle/>
-            <a:p/>
-          </p:txBody>
-        </p:sp>
-        <p:sp>
-          <p:nvSpPr>
-            <p:cNvPr id="70" name="pl68"/>
-            <p:cNvSpPr/>
-            <p:nvPr/>
-          </p:nvSpPr>
-          <p:spPr>
-            <a:xfrm>
-              <a:off x="7330360" y="4436976"/>
-              <a:ext cx="0" cy="1153845"/>
-            </a:xfrm>
-            <a:custGeom>
-              <a:avLst/>
-              <a:pathLst>
-                <a:path w="0" h="1153845">
-                  <a:moveTo>
-                    <a:pt x="0" y="1153845"/>
-                  </a:moveTo>
-                  <a:lnTo>
-                    <a:pt x="0" y="0"/>
-                  </a:lnTo>
-                  <a:lnTo>
-                    <a:pt x="0" y="0"/>
-                  </a:lnTo>
-                </a:path>
-              </a:pathLst>
-            </a:custGeom>
-            <a:ln w="13550" cap="flat">
-              <a:solidFill>
-                <a:srgbClr val="FFFFFF">
-                  <a:alpha val="100000"/>
-                </a:srgbClr>
-              </a:solidFill>
-              <a:prstDash val="solid"/>
-              <a:round/>
-            </a:ln>
-          </p:spPr>
-          <p:txBody>
-            <a:bodyPr/>
-            <a:lstStyle/>
-            <a:p/>
-          </p:txBody>
-        </p:sp>
-        <p:sp>
-          <p:nvSpPr>
-            <p:cNvPr id="71" name="pl69"/>
-            <p:cNvSpPr/>
-            <p:nvPr/>
-          </p:nvSpPr>
-          <p:spPr>
-            <a:xfrm>
-              <a:off x="7904855" y="4436976"/>
-              <a:ext cx="0" cy="1153845"/>
-            </a:xfrm>
-            <a:custGeom>
-              <a:avLst/>
-              <a:pathLst>
-                <a:path w="0" h="1153845">
-                  <a:moveTo>
-                    <a:pt x="0" y="1153845"/>
-                  </a:moveTo>
-                  <a:lnTo>
-                    <a:pt x="0" y="0"/>
-                  </a:lnTo>
-                  <a:lnTo>
-                    <a:pt x="0" y="0"/>
-                  </a:lnTo>
-                </a:path>
-              </a:pathLst>
-            </a:custGeom>
-            <a:ln w="13550" cap="flat">
-              <a:solidFill>
-                <a:srgbClr val="FFFFFF">
-                  <a:alpha val="100000"/>
-                </a:srgbClr>
-              </a:solidFill>
-              <a:prstDash val="solid"/>
-              <a:round/>
-            </a:ln>
-          </p:spPr>
-          <p:txBody>
-            <a:bodyPr/>
-            <a:lstStyle/>
-            <a:p/>
-          </p:txBody>
-        </p:sp>
-        <p:sp>
-          <p:nvSpPr>
-            <p:cNvPr id="72" name="pl70"/>
-            <p:cNvSpPr/>
-            <p:nvPr/>
-          </p:nvSpPr>
-          <p:spPr>
-            <a:xfrm>
-              <a:off x="8479350" y="4436976"/>
-              <a:ext cx="0" cy="1153845"/>
-            </a:xfrm>
-            <a:custGeom>
-              <a:avLst/>
-              <a:pathLst>
-                <a:path w="0" h="1153845">
-                  <a:moveTo>
-                    <a:pt x="0" y="1153845"/>
-                  </a:moveTo>
-                  <a:lnTo>
-                    <a:pt x="0" y="0"/>
-                  </a:lnTo>
-                  <a:lnTo>
-                    <a:pt x="0" y="0"/>
-                  </a:lnTo>
-                </a:path>
-              </a:pathLst>
-            </a:custGeom>
-            <a:ln w="13550" cap="flat">
-              <a:solidFill>
-                <a:srgbClr val="FFFFFF">
-                  <a:alpha val="100000"/>
-                </a:srgbClr>
-              </a:solidFill>
-              <a:prstDash val="solid"/>
-              <a:round/>
-            </a:ln>
-          </p:spPr>
-          <p:txBody>
-            <a:bodyPr/>
-            <a:lstStyle/>
-            <a:p/>
-          </p:txBody>
-        </p:sp>
-        <p:sp>
-          <p:nvSpPr>
-            <p:cNvPr id="73" name="pt71"/>
-            <p:cNvSpPr/>
-            <p:nvPr/>
-          </p:nvSpPr>
-          <p:spPr>
-            <a:xfrm>
-              <a:off x="4023558" y="5305408"/>
+            <p:cNvPr id="49" name="pt47"/>
+            <p:cNvSpPr/>
+            <p:nvPr/>
+          </p:nvSpPr>
+          <p:spPr>
+            <a:xfrm>
+              <a:off x="4208238" y="4048416"/>
               <a:ext cx="138135" cy="138135"/>
             </a:xfrm>
             <a:prstGeom prst="ellipse">
@@ -6134,13 +5146,13 @@
         </p:sp>
         <p:sp>
           <p:nvSpPr>
-            <p:cNvPr id="74" name="pt72"/>
-            <p:cNvSpPr/>
-            <p:nvPr/>
-          </p:nvSpPr>
-          <p:spPr>
-            <a:xfrm>
-              <a:off x="5759474" y="5305408"/>
+            <p:cNvPr id="50" name="pt48"/>
+            <p:cNvSpPr/>
+            <p:nvPr/>
+          </p:nvSpPr>
+          <p:spPr>
+            <a:xfrm>
+              <a:off x="6848584" y="4048416"/>
               <a:ext cx="138135" cy="138135"/>
             </a:xfrm>
             <a:prstGeom prst="ellipse">
@@ -6169,13 +5181,13 @@
         </p:sp>
         <p:sp>
           <p:nvSpPr>
-            <p:cNvPr id="75" name="pt73"/>
-            <p:cNvSpPr/>
-            <p:nvPr/>
-          </p:nvSpPr>
-          <p:spPr>
-            <a:xfrm>
-              <a:off x="4739567" y="4944831"/>
+            <p:cNvPr id="51" name="pt49"/>
+            <p:cNvSpPr/>
+            <p:nvPr/>
+          </p:nvSpPr>
+          <p:spPr>
+            <a:xfrm>
+              <a:off x="7072801" y="3229895"/>
               <a:ext cx="138135" cy="138135"/>
             </a:xfrm>
             <a:prstGeom prst="ellipse">
@@ -6204,13 +5216,13 @@
         </p:sp>
         <p:sp>
           <p:nvSpPr>
-            <p:cNvPr id="76" name="pt74"/>
-            <p:cNvSpPr/>
-            <p:nvPr/>
-          </p:nvSpPr>
-          <p:spPr>
-            <a:xfrm>
-              <a:off x="4706636" y="4944831"/>
+            <p:cNvPr id="52" name="pt50"/>
+            <p:cNvSpPr/>
+            <p:nvPr/>
+          </p:nvSpPr>
+          <p:spPr>
+            <a:xfrm>
+              <a:off x="7646472" y="3229895"/>
               <a:ext cx="138135" cy="138135"/>
             </a:xfrm>
             <a:prstGeom prst="ellipse">
@@ -6239,13 +5251,13 @@
         </p:sp>
         <p:sp>
           <p:nvSpPr>
-            <p:cNvPr id="77" name="pt75"/>
-            <p:cNvSpPr/>
-            <p:nvPr/>
-          </p:nvSpPr>
-          <p:spPr>
-            <a:xfrm>
-              <a:off x="4440856" y="4584255"/>
+            <p:cNvPr id="53" name="pt51"/>
+            <p:cNvSpPr/>
+            <p:nvPr/>
+          </p:nvSpPr>
+          <p:spPr>
+            <a:xfrm>
+              <a:off x="3568237" y="4866937"/>
               <a:ext cx="138135" cy="138135"/>
             </a:xfrm>
             <a:prstGeom prst="ellipse">
@@ -6274,13 +5286,13 @@
         </p:sp>
         <p:sp>
           <p:nvSpPr>
-            <p:cNvPr id="78" name="pt76"/>
-            <p:cNvSpPr/>
-            <p:nvPr/>
-          </p:nvSpPr>
-          <p:spPr>
-            <a:xfrm>
-              <a:off x="3173069" y="4584255"/>
+            <p:cNvPr id="54" name="pt52"/>
+            <p:cNvSpPr/>
+            <p:nvPr/>
+          </p:nvSpPr>
+          <p:spPr>
+            <a:xfrm>
+              <a:off x="5292339" y="4866937"/>
               <a:ext cx="138135" cy="138135"/>
             </a:xfrm>
             <a:prstGeom prst="ellipse">
@@ -6309,40 +5321,14 @@
         </p:sp>
         <p:sp>
           <p:nvSpPr>
-            <p:cNvPr id="79" name="rc77"/>
-            <p:cNvSpPr/>
-            <p:nvPr/>
-          </p:nvSpPr>
-          <p:spPr>
-            <a:xfrm>
-              <a:off x="8766598" y="1825625"/>
-              <a:ext cx="254366" cy="793268"/>
-            </a:xfrm>
-            <a:prstGeom prst="rect">
-              <a:avLst/>
-            </a:prstGeom>
-            <a:solidFill>
-              <a:srgbClr val="D9D9D9">
-                <a:alpha val="100000"/>
-              </a:srgbClr>
-            </a:solidFill>
-          </p:spPr>
-          <p:txBody>
-            <a:bodyPr/>
-            <a:lstStyle/>
-            <a:p/>
-          </p:txBody>
-        </p:sp>
-        <p:sp>
-          <p:nvSpPr>
-            <p:cNvPr id="80" name="tx78"/>
-            <p:cNvSpPr/>
-            <p:nvPr/>
-          </p:nvSpPr>
-          <p:spPr>
-            <a:xfrm rot="5400000">
-              <a:off x="8738665" y="2165965"/>
-              <a:ext cx="313506" cy="112588"/>
+            <p:cNvPr id="55" name="tx53"/>
+            <p:cNvSpPr/>
+            <p:nvPr/>
+          </p:nvSpPr>
+          <p:spPr>
+            <a:xfrm>
+              <a:off x="1815699" y="5279685"/>
+              <a:ext cx="568821" cy="124792"/>
             </a:xfrm>
             <a:prstGeom prst="rect">
               <a:avLst/>
@@ -6355,7 +5341,7 @@
             <a:p>
               <a:pPr algn="l" marL="0" marR="0" indent="0">
                 <a:lnSpc>
-                  <a:spcPts val="1200"/>
+                  <a:spcPts val="1300"/>
                 </a:lnSpc>
                 <a:spcBef>
                   <a:spcPts val="0"/>
@@ -6365,56 +5351,30 @@
                 </a:spcAft>
               </a:pPr>
               <a:r>
-                <a:rPr sz="1200">
+                <a:rPr sz="1300">
                   <a:solidFill>
-                    <a:srgbClr val="1A1A1A">
+                    <a:srgbClr val="4D4D4D">
                       <a:alpha val="100000"/>
                     </a:srgbClr>
                   </a:solidFill>
                   <a:latin typeface="Helvetica"/>
                   <a:cs typeface="Helvetica"/>
                 </a:rPr>
-                <a:t>Both</a:t>
+                <a:t>CNGA1</a:t>
               </a:r>
             </a:p>
           </p:txBody>
         </p:sp>
         <p:sp>
           <p:nvSpPr>
-            <p:cNvPr id="81" name="rc79"/>
-            <p:cNvSpPr/>
-            <p:nvPr/>
-          </p:nvSpPr>
-          <p:spPr>
-            <a:xfrm>
-              <a:off x="8766598" y="2770724"/>
-              <a:ext cx="254366" cy="1514422"/>
-            </a:xfrm>
-            <a:prstGeom prst="rect">
-              <a:avLst/>
-            </a:prstGeom>
-            <a:solidFill>
-              <a:srgbClr val="D9D9D9">
-                <a:alpha val="100000"/>
-              </a:srgbClr>
-            </a:solidFill>
-          </p:spPr>
-          <p:txBody>
-            <a:bodyPr/>
-            <a:lstStyle/>
-            <a:p/>
-          </p:txBody>
-        </p:sp>
-        <p:sp>
-          <p:nvSpPr>
-            <p:cNvPr id="82" name="tx80"/>
-            <p:cNvSpPr/>
-            <p:nvPr/>
-          </p:nvSpPr>
-          <p:spPr>
-            <a:xfrm rot="5400000">
-              <a:off x="8714555" y="3470338"/>
-              <a:ext cx="364331" cy="115192"/>
+            <p:cNvPr id="56" name="tx54"/>
+            <p:cNvSpPr/>
+            <p:nvPr/>
+          </p:nvSpPr>
+          <p:spPr>
+            <a:xfrm>
+              <a:off x="1723878" y="4870424"/>
+              <a:ext cx="660641" cy="124792"/>
             </a:xfrm>
             <a:prstGeom prst="rect">
               <a:avLst/>
@@ -6427,7 +5387,7 @@
             <a:p>
               <a:pPr algn="l" marL="0" marR="0" indent="0">
                 <a:lnSpc>
-                  <a:spcPts val="1200"/>
+                  <a:spcPts val="1300"/>
                 </a:lnSpc>
                 <a:spcBef>
                   <a:spcPts val="0"/>
@@ -6437,56 +5397,30 @@
                 </a:spcAft>
               </a:pPr>
               <a:r>
-                <a:rPr sz="1200">
+                <a:rPr sz="1300">
                   <a:solidFill>
-                    <a:srgbClr val="1A1A1A">
+                    <a:srgbClr val="4D4D4D">
                       <a:alpha val="100000"/>
                     </a:srgbClr>
                   </a:solidFill>
                   <a:latin typeface="Helvetica"/>
                   <a:cs typeface="Helvetica"/>
                 </a:rPr>
-                <a:t>Cone</a:t>
+                <a:t>CNGA11</a:t>
               </a:r>
             </a:p>
           </p:txBody>
         </p:sp>
         <p:sp>
           <p:nvSpPr>
-            <p:cNvPr id="83" name="rc81"/>
-            <p:cNvSpPr/>
-            <p:nvPr/>
-          </p:nvSpPr>
-          <p:spPr>
-            <a:xfrm>
-              <a:off x="8766598" y="4436976"/>
-              <a:ext cx="254366" cy="1153845"/>
-            </a:xfrm>
-            <a:prstGeom prst="rect">
-              <a:avLst/>
-            </a:prstGeom>
-            <a:solidFill>
-              <a:srgbClr val="D9D9D9">
-                <a:alpha val="100000"/>
-              </a:srgbClr>
-            </a:solidFill>
-          </p:spPr>
-          <p:txBody>
-            <a:bodyPr/>
-            <a:lstStyle/>
-            <a:p/>
-          </p:txBody>
-        </p:sp>
-        <p:sp>
-          <p:nvSpPr>
-            <p:cNvPr id="84" name="tx82"/>
-            <p:cNvSpPr/>
-            <p:nvPr/>
-          </p:nvSpPr>
-          <p:spPr>
-            <a:xfrm rot="5400000">
-              <a:off x="8755631" y="4957605"/>
-              <a:ext cx="279573" cy="112588"/>
+            <p:cNvPr id="57" name="tx55"/>
+            <p:cNvSpPr/>
+            <p:nvPr/>
+          </p:nvSpPr>
+          <p:spPr>
+            <a:xfrm>
+              <a:off x="1723878" y="4461164"/>
+              <a:ext cx="660641" cy="124792"/>
             </a:xfrm>
             <a:prstGeom prst="rect">
               <a:avLst/>
@@ -6499,7 +5433,7 @@
             <a:p>
               <a:pPr algn="l" marL="0" marR="0" indent="0">
                 <a:lnSpc>
-                  <a:spcPts val="1200"/>
+                  <a:spcPts val="1300"/>
                 </a:lnSpc>
                 <a:spcBef>
                   <a:spcPts val="0"/>
@@ -6509,40 +5443,316 @@
                 </a:spcAft>
               </a:pPr>
               <a:r>
-                <a:rPr sz="1200">
+                <a:rPr sz="1300">
                   <a:solidFill>
-                    <a:srgbClr val="1A1A1A">
+                    <a:srgbClr val="4D4D4D">
                       <a:alpha val="100000"/>
                     </a:srgbClr>
                   </a:solidFill>
                   <a:latin typeface="Helvetica"/>
                   <a:cs typeface="Helvetica"/>
                 </a:rPr>
-                <a:t>Rod</a:t>
+                <a:t>CNGA12</a:t>
               </a:r>
             </a:p>
           </p:txBody>
         </p:sp>
         <p:sp>
           <p:nvSpPr>
-            <p:cNvPr id="85" name="pl83"/>
+            <p:cNvPr id="58" name="tx56"/>
+            <p:cNvSpPr/>
+            <p:nvPr/>
+          </p:nvSpPr>
+          <p:spPr>
+            <a:xfrm>
+              <a:off x="1723878" y="4051823"/>
+              <a:ext cx="660641" cy="124872"/>
+            </a:xfrm>
+            <a:prstGeom prst="rect">
+              <a:avLst/>
+            </a:prstGeom>
+            <a:noFill/>
+          </p:spPr>
+          <p:txBody>
+            <a:bodyPr lIns="0" rIns="0" tIns="0" bIns="0" anchorCtr="1" anchor="ctr" wrap="none"/>
+            <a:lstStyle/>
+            <a:p>
+              <a:pPr algn="l" marL="0" marR="0" indent="0">
+                <a:lnSpc>
+                  <a:spcPts val="1300"/>
+                </a:lnSpc>
+                <a:spcBef>
+                  <a:spcPts val="0"/>
+                </a:spcBef>
+                <a:spcAft>
+                  <a:spcPts val="0"/>
+                </a:spcAft>
+              </a:pPr>
+              <a:r>
+                <a:rPr sz="1300">
+                  <a:solidFill>
+                    <a:srgbClr val="4D4D4D">
+                      <a:alpha val="100000"/>
+                    </a:srgbClr>
+                  </a:solidFill>
+                  <a:latin typeface="Helvetica"/>
+                  <a:cs typeface="Helvetica"/>
+                </a:rPr>
+                <a:t>CNGA19</a:t>
+              </a:r>
+            </a:p>
+          </p:txBody>
+        </p:sp>
+        <p:sp>
+          <p:nvSpPr>
+            <p:cNvPr id="59" name="tx57"/>
+            <p:cNvSpPr/>
+            <p:nvPr/>
+          </p:nvSpPr>
+          <p:spPr>
+            <a:xfrm>
+              <a:off x="1815699" y="3642643"/>
+              <a:ext cx="568821" cy="124792"/>
+            </a:xfrm>
+            <a:prstGeom prst="rect">
+              <a:avLst/>
+            </a:prstGeom>
+            <a:noFill/>
+          </p:spPr>
+          <p:txBody>
+            <a:bodyPr lIns="0" rIns="0" tIns="0" bIns="0" anchorCtr="1" anchor="ctr" wrap="none"/>
+            <a:lstStyle/>
+            <a:p>
+              <a:pPr algn="l" marL="0" marR="0" indent="0">
+                <a:lnSpc>
+                  <a:spcPts val="1300"/>
+                </a:lnSpc>
+                <a:spcBef>
+                  <a:spcPts val="0"/>
+                </a:spcBef>
+                <a:spcAft>
+                  <a:spcPts val="0"/>
+                </a:spcAft>
+              </a:pPr>
+              <a:r>
+                <a:rPr sz="1300">
+                  <a:solidFill>
+                    <a:srgbClr val="4D4D4D">
+                      <a:alpha val="100000"/>
+                    </a:srgbClr>
+                  </a:solidFill>
+                  <a:latin typeface="Helvetica"/>
+                  <a:cs typeface="Helvetica"/>
+                </a:rPr>
+                <a:t>CNGA2</a:t>
+              </a:r>
+            </a:p>
+          </p:txBody>
+        </p:sp>
+        <p:sp>
+          <p:nvSpPr>
+            <p:cNvPr id="60" name="tx58"/>
+            <p:cNvSpPr/>
+            <p:nvPr/>
+          </p:nvSpPr>
+          <p:spPr>
+            <a:xfrm>
+              <a:off x="1723878" y="3233382"/>
+              <a:ext cx="660641" cy="124792"/>
+            </a:xfrm>
+            <a:prstGeom prst="rect">
+              <a:avLst/>
+            </a:prstGeom>
+            <a:noFill/>
+          </p:spPr>
+          <p:txBody>
+            <a:bodyPr lIns="0" rIns="0" tIns="0" bIns="0" anchorCtr="1" anchor="ctr" wrap="none"/>
+            <a:lstStyle/>
+            <a:p>
+              <a:pPr algn="l" marL="0" marR="0" indent="0">
+                <a:lnSpc>
+                  <a:spcPts val="1300"/>
+                </a:lnSpc>
+                <a:spcBef>
+                  <a:spcPts val="0"/>
+                </a:spcBef>
+                <a:spcAft>
+                  <a:spcPts val="0"/>
+                </a:spcAft>
+              </a:pPr>
+              <a:r>
+                <a:rPr sz="1300">
+                  <a:solidFill>
+                    <a:srgbClr val="4D4D4D">
+                      <a:alpha val="100000"/>
+                    </a:srgbClr>
+                  </a:solidFill>
+                  <a:latin typeface="Helvetica"/>
+                  <a:cs typeface="Helvetica"/>
+                </a:rPr>
+                <a:t>CNGA20</a:t>
+              </a:r>
+            </a:p>
+          </p:txBody>
+        </p:sp>
+        <p:sp>
+          <p:nvSpPr>
+            <p:cNvPr id="61" name="tx59"/>
+            <p:cNvSpPr/>
+            <p:nvPr/>
+          </p:nvSpPr>
+          <p:spPr>
+            <a:xfrm>
+              <a:off x="1815699" y="2824122"/>
+              <a:ext cx="568821" cy="124792"/>
+            </a:xfrm>
+            <a:prstGeom prst="rect">
+              <a:avLst/>
+            </a:prstGeom>
+            <a:noFill/>
+          </p:spPr>
+          <p:txBody>
+            <a:bodyPr lIns="0" rIns="0" tIns="0" bIns="0" anchorCtr="1" anchor="ctr" wrap="none"/>
+            <a:lstStyle/>
+            <a:p>
+              <a:pPr algn="l" marL="0" marR="0" indent="0">
+                <a:lnSpc>
+                  <a:spcPts val="1300"/>
+                </a:lnSpc>
+                <a:spcBef>
+                  <a:spcPts val="0"/>
+                </a:spcBef>
+                <a:spcAft>
+                  <a:spcPts val="0"/>
+                </a:spcAft>
+              </a:pPr>
+              <a:r>
+                <a:rPr sz="1300">
+                  <a:solidFill>
+                    <a:srgbClr val="4D4D4D">
+                      <a:alpha val="100000"/>
+                    </a:srgbClr>
+                  </a:solidFill>
+                  <a:latin typeface="Helvetica"/>
+                  <a:cs typeface="Helvetica"/>
+                </a:rPr>
+                <a:t>CNGA4</a:t>
+              </a:r>
+            </a:p>
+          </p:txBody>
+        </p:sp>
+        <p:sp>
+          <p:nvSpPr>
+            <p:cNvPr id="62" name="tx60"/>
+            <p:cNvSpPr/>
+            <p:nvPr/>
+          </p:nvSpPr>
+          <p:spPr>
+            <a:xfrm>
+              <a:off x="1815699" y="2414861"/>
+              <a:ext cx="568821" cy="124792"/>
+            </a:xfrm>
+            <a:prstGeom prst="rect">
+              <a:avLst/>
+            </a:prstGeom>
+            <a:noFill/>
+          </p:spPr>
+          <p:txBody>
+            <a:bodyPr lIns="0" rIns="0" tIns="0" bIns="0" anchorCtr="1" anchor="ctr" wrap="none"/>
+            <a:lstStyle/>
+            <a:p>
+              <a:pPr algn="l" marL="0" marR="0" indent="0">
+                <a:lnSpc>
+                  <a:spcPts val="1300"/>
+                </a:lnSpc>
+                <a:spcBef>
+                  <a:spcPts val="0"/>
+                </a:spcBef>
+                <a:spcAft>
+                  <a:spcPts val="0"/>
+                </a:spcAft>
+              </a:pPr>
+              <a:r>
+                <a:rPr sz="1300">
+                  <a:solidFill>
+                    <a:srgbClr val="4D4D4D">
+                      <a:alpha val="100000"/>
+                    </a:srgbClr>
+                  </a:solidFill>
+                  <a:latin typeface="Helvetica"/>
+                  <a:cs typeface="Helvetica"/>
+                </a:rPr>
+                <a:t>CNGA7</a:t>
+              </a:r>
+            </a:p>
+          </p:txBody>
+        </p:sp>
+        <p:sp>
+          <p:nvSpPr>
+            <p:cNvPr id="63" name="tx61"/>
+            <p:cNvSpPr/>
+            <p:nvPr/>
+          </p:nvSpPr>
+          <p:spPr>
+            <a:xfrm>
+              <a:off x="1815699" y="2005439"/>
+              <a:ext cx="568821" cy="124953"/>
+            </a:xfrm>
+            <a:prstGeom prst="rect">
+              <a:avLst/>
+            </a:prstGeom>
+            <a:noFill/>
+          </p:spPr>
+          <p:txBody>
+            <a:bodyPr lIns="0" rIns="0" tIns="0" bIns="0" anchorCtr="1" anchor="ctr" wrap="none"/>
+            <a:lstStyle/>
+            <a:p>
+              <a:pPr algn="l" marL="0" marR="0" indent="0">
+                <a:lnSpc>
+                  <a:spcPts val="1300"/>
+                </a:lnSpc>
+                <a:spcBef>
+                  <a:spcPts val="0"/>
+                </a:spcBef>
+                <a:spcAft>
+                  <a:spcPts val="0"/>
+                </a:spcAft>
+              </a:pPr>
+              <a:r>
+                <a:rPr sz="1300">
+                  <a:solidFill>
+                    <a:srgbClr val="4D4D4D">
+                      <a:alpha val="100000"/>
+                    </a:srgbClr>
+                  </a:solidFill>
+                  <a:latin typeface="Helvetica"/>
+                  <a:cs typeface="Helvetica"/>
+                </a:rPr>
+                <a:t>CNGA8</a:t>
+              </a:r>
+            </a:p>
+          </p:txBody>
+        </p:sp>
+        <p:sp>
+          <p:nvSpPr>
+            <p:cNvPr id="64" name="pl62"/>
             <p:cNvSpPr/>
             <p:nvPr/>
           </p:nvSpPr>
           <p:spPr>
             <a:xfrm>
               <a:off x="2447150" y="5590822"/>
-              <a:ext cx="6319447" cy="0"/>
+              <a:ext cx="6573813" cy="0"/>
             </a:xfrm>
             <a:custGeom>
               <a:avLst/>
               <a:pathLst>
-                <a:path w="6319447" h="0">
+                <a:path w="6573813" h="0">
                   <a:moveTo>
                     <a:pt x="0" y="0"/>
                   </a:moveTo>
                   <a:lnTo>
-                    <a:pt x="6319447" y="0"/>
+                    <a:pt x="6573813" y="0"/>
                   </a:lnTo>
                 </a:path>
               </a:pathLst>
@@ -6565,13 +5775,13 @@
         </p:sp>
         <p:sp>
           <p:nvSpPr>
-            <p:cNvPr id="86" name="pl84"/>
-            <p:cNvSpPr/>
-            <p:nvPr/>
-          </p:nvSpPr>
-          <p:spPr>
-            <a:xfrm>
-              <a:off x="2734398" y="5590822"/>
+            <p:cNvPr id="65" name="pl63"/>
+            <p:cNvSpPr/>
+            <p:nvPr/>
+          </p:nvSpPr>
+          <p:spPr>
+            <a:xfrm>
+              <a:off x="2745960" y="5590822"/>
               <a:ext cx="0" cy="34794"/>
             </a:xfrm>
             <a:custGeom>
@@ -6605,13 +5815,13 @@
         </p:sp>
         <p:sp>
           <p:nvSpPr>
-            <p:cNvPr id="87" name="pl85"/>
-            <p:cNvSpPr/>
-            <p:nvPr/>
-          </p:nvSpPr>
-          <p:spPr>
-            <a:xfrm>
-              <a:off x="3308893" y="5590822"/>
+            <p:cNvPr id="66" name="pl64"/>
+            <p:cNvSpPr/>
+            <p:nvPr/>
+          </p:nvSpPr>
+          <p:spPr>
+            <a:xfrm>
+              <a:off x="3343579" y="5590822"/>
               <a:ext cx="0" cy="34794"/>
             </a:xfrm>
             <a:custGeom>
@@ -6645,13 +5855,13 @@
         </p:sp>
         <p:sp>
           <p:nvSpPr>
-            <p:cNvPr id="88" name="pl86"/>
-            <p:cNvSpPr/>
-            <p:nvPr/>
-          </p:nvSpPr>
-          <p:spPr>
-            <a:xfrm>
-              <a:off x="3883388" y="5590822"/>
+            <p:cNvPr id="67" name="pl65"/>
+            <p:cNvSpPr/>
+            <p:nvPr/>
+          </p:nvSpPr>
+          <p:spPr>
+            <a:xfrm>
+              <a:off x="3941199" y="5590822"/>
               <a:ext cx="0" cy="34794"/>
             </a:xfrm>
             <a:custGeom>
@@ -6685,13 +5895,13 @@
         </p:sp>
         <p:sp>
           <p:nvSpPr>
-            <p:cNvPr id="89" name="pl87"/>
-            <p:cNvSpPr/>
-            <p:nvPr/>
-          </p:nvSpPr>
-          <p:spPr>
-            <a:xfrm>
-              <a:off x="4457884" y="5590822"/>
+            <p:cNvPr id="68" name="pl66"/>
+            <p:cNvSpPr/>
+            <p:nvPr/>
+          </p:nvSpPr>
+          <p:spPr>
+            <a:xfrm>
+              <a:off x="4538818" y="5590822"/>
               <a:ext cx="0" cy="34794"/>
             </a:xfrm>
             <a:custGeom>
@@ -6725,13 +5935,13 @@
         </p:sp>
         <p:sp>
           <p:nvSpPr>
-            <p:cNvPr id="90" name="pl88"/>
-            <p:cNvSpPr/>
-            <p:nvPr/>
-          </p:nvSpPr>
-          <p:spPr>
-            <a:xfrm>
-              <a:off x="5032379" y="5590822"/>
+            <p:cNvPr id="69" name="pl67"/>
+            <p:cNvSpPr/>
+            <p:nvPr/>
+          </p:nvSpPr>
+          <p:spPr>
+            <a:xfrm>
+              <a:off x="5136438" y="5590822"/>
               <a:ext cx="0" cy="34794"/>
             </a:xfrm>
             <a:custGeom>
@@ -6765,13 +5975,13 @@
         </p:sp>
         <p:sp>
           <p:nvSpPr>
-            <p:cNvPr id="91" name="pl89"/>
-            <p:cNvSpPr/>
-            <p:nvPr/>
-          </p:nvSpPr>
-          <p:spPr>
-            <a:xfrm>
-              <a:off x="5606874" y="5590822"/>
+            <p:cNvPr id="70" name="pl68"/>
+            <p:cNvSpPr/>
+            <p:nvPr/>
+          </p:nvSpPr>
+          <p:spPr>
+            <a:xfrm>
+              <a:off x="5734057" y="5590822"/>
               <a:ext cx="0" cy="34794"/>
             </a:xfrm>
             <a:custGeom>
@@ -6805,13 +6015,13 @@
         </p:sp>
         <p:sp>
           <p:nvSpPr>
-            <p:cNvPr id="92" name="pl90"/>
-            <p:cNvSpPr/>
-            <p:nvPr/>
-          </p:nvSpPr>
-          <p:spPr>
-            <a:xfrm>
-              <a:off x="6181369" y="5590822"/>
+            <p:cNvPr id="71" name="pl69"/>
+            <p:cNvSpPr/>
+            <p:nvPr/>
+          </p:nvSpPr>
+          <p:spPr>
+            <a:xfrm>
+              <a:off x="6331677" y="5590822"/>
               <a:ext cx="0" cy="34794"/>
             </a:xfrm>
             <a:custGeom>
@@ -6845,13 +6055,13 @@
         </p:sp>
         <p:sp>
           <p:nvSpPr>
-            <p:cNvPr id="93" name="pl91"/>
-            <p:cNvSpPr/>
-            <p:nvPr/>
-          </p:nvSpPr>
-          <p:spPr>
-            <a:xfrm>
-              <a:off x="6755864" y="5590822"/>
+            <p:cNvPr id="72" name="pl70"/>
+            <p:cNvSpPr/>
+            <p:nvPr/>
+          </p:nvSpPr>
+          <p:spPr>
+            <a:xfrm>
+              <a:off x="6929296" y="5590822"/>
               <a:ext cx="0" cy="34794"/>
             </a:xfrm>
             <a:custGeom>
@@ -6885,13 +6095,13 @@
         </p:sp>
         <p:sp>
           <p:nvSpPr>
-            <p:cNvPr id="94" name="pl92"/>
-            <p:cNvSpPr/>
-            <p:nvPr/>
-          </p:nvSpPr>
-          <p:spPr>
-            <a:xfrm>
-              <a:off x="7330360" y="5590822"/>
+            <p:cNvPr id="73" name="pl71"/>
+            <p:cNvSpPr/>
+            <p:nvPr/>
+          </p:nvSpPr>
+          <p:spPr>
+            <a:xfrm>
+              <a:off x="7526915" y="5590822"/>
               <a:ext cx="0" cy="34794"/>
             </a:xfrm>
             <a:custGeom>
@@ -6925,13 +6135,13 @@
         </p:sp>
         <p:sp>
           <p:nvSpPr>
-            <p:cNvPr id="95" name="pl93"/>
-            <p:cNvSpPr/>
-            <p:nvPr/>
-          </p:nvSpPr>
-          <p:spPr>
-            <a:xfrm>
-              <a:off x="7904855" y="5590822"/>
+            <p:cNvPr id="74" name="pl72"/>
+            <p:cNvSpPr/>
+            <p:nvPr/>
+          </p:nvSpPr>
+          <p:spPr>
+            <a:xfrm>
+              <a:off x="8124535" y="5590822"/>
               <a:ext cx="0" cy="34794"/>
             </a:xfrm>
             <a:custGeom>
@@ -6965,13 +6175,13 @@
         </p:sp>
         <p:sp>
           <p:nvSpPr>
-            <p:cNvPr id="96" name="pl94"/>
-            <p:cNvSpPr/>
-            <p:nvPr/>
-          </p:nvSpPr>
-          <p:spPr>
-            <a:xfrm>
-              <a:off x="8479350" y="5590822"/>
+            <p:cNvPr id="75" name="pl73"/>
+            <p:cNvSpPr/>
+            <p:nvPr/>
+          </p:nvSpPr>
+          <p:spPr>
+            <a:xfrm>
+              <a:off x="8722154" y="5590822"/>
               <a:ext cx="0" cy="34794"/>
             </a:xfrm>
             <a:custGeom>
@@ -7005,13 +6215,13 @@
         </p:sp>
         <p:sp>
           <p:nvSpPr>
-            <p:cNvPr id="97" name="tx95"/>
-            <p:cNvSpPr/>
-            <p:nvPr/>
-          </p:nvSpPr>
-          <p:spPr>
-            <a:xfrm>
-              <a:off x="2619642" y="5653291"/>
+            <p:cNvPr id="76" name="tx74"/>
+            <p:cNvSpPr/>
+            <p:nvPr/>
+          </p:nvSpPr>
+          <p:spPr>
+            <a:xfrm>
+              <a:off x="2631204" y="5653291"/>
               <a:ext cx="229511" cy="118585"/>
             </a:xfrm>
             <a:prstGeom prst="rect">
@@ -7051,13 +6261,13 @@
         </p:sp>
         <p:sp>
           <p:nvSpPr>
-            <p:cNvPr id="98" name="tx96"/>
-            <p:cNvSpPr/>
-            <p:nvPr/>
-          </p:nvSpPr>
-          <p:spPr>
-            <a:xfrm>
-              <a:off x="3194137" y="5656918"/>
+            <p:cNvPr id="77" name="tx75"/>
+            <p:cNvSpPr/>
+            <p:nvPr/>
+          </p:nvSpPr>
+          <p:spPr>
+            <a:xfrm>
+              <a:off x="3228824" y="5656918"/>
               <a:ext cx="229511" cy="114957"/>
             </a:xfrm>
             <a:prstGeom prst="rect">
@@ -7097,13 +6307,13 @@
         </p:sp>
         <p:sp>
           <p:nvSpPr>
-            <p:cNvPr id="99" name="tx97"/>
-            <p:cNvSpPr/>
-            <p:nvPr/>
-          </p:nvSpPr>
-          <p:spPr>
-            <a:xfrm>
-              <a:off x="3768632" y="5656032"/>
+            <p:cNvPr id="78" name="tx76"/>
+            <p:cNvSpPr/>
+            <p:nvPr/>
+          </p:nvSpPr>
+          <p:spPr>
+            <a:xfrm>
+              <a:off x="3826443" y="5656032"/>
               <a:ext cx="229511" cy="115844"/>
             </a:xfrm>
             <a:prstGeom prst="rect">
@@ -7143,13 +6353,13 @@
         </p:sp>
         <p:sp>
           <p:nvSpPr>
-            <p:cNvPr id="100" name="tx98"/>
-            <p:cNvSpPr/>
-            <p:nvPr/>
-          </p:nvSpPr>
-          <p:spPr>
-            <a:xfrm>
-              <a:off x="4343128" y="5653129"/>
+            <p:cNvPr id="79" name="tx77"/>
+            <p:cNvSpPr/>
+            <p:nvPr/>
+          </p:nvSpPr>
+          <p:spPr>
+            <a:xfrm>
+              <a:off x="4424062" y="5653129"/>
               <a:ext cx="229511" cy="118746"/>
             </a:xfrm>
             <a:prstGeom prst="rect">
@@ -7189,13 +6399,13 @@
         </p:sp>
         <p:sp>
           <p:nvSpPr>
-            <p:cNvPr id="101" name="tx99"/>
-            <p:cNvSpPr/>
-            <p:nvPr/>
-          </p:nvSpPr>
-          <p:spPr>
-            <a:xfrm>
-              <a:off x="4917623" y="5656112"/>
+            <p:cNvPr id="80" name="tx78"/>
+            <p:cNvSpPr/>
+            <p:nvPr/>
+          </p:nvSpPr>
+          <p:spPr>
+            <a:xfrm>
+              <a:off x="5021682" y="5656112"/>
               <a:ext cx="229511" cy="115763"/>
             </a:xfrm>
             <a:prstGeom prst="rect">
@@ -7235,13 +6445,13 @@
         </p:sp>
         <p:sp>
           <p:nvSpPr>
-            <p:cNvPr id="102" name="tx100"/>
-            <p:cNvSpPr/>
-            <p:nvPr/>
-          </p:nvSpPr>
-          <p:spPr>
-            <a:xfrm>
-              <a:off x="5492118" y="5654016"/>
+            <p:cNvPr id="81" name="tx79"/>
+            <p:cNvSpPr/>
+            <p:nvPr/>
+          </p:nvSpPr>
+          <p:spPr>
+            <a:xfrm>
+              <a:off x="5619301" y="5654016"/>
               <a:ext cx="229511" cy="117859"/>
             </a:xfrm>
             <a:prstGeom prst="rect">
@@ -7281,13 +6491,13 @@
         </p:sp>
         <p:sp>
           <p:nvSpPr>
-            <p:cNvPr id="103" name="tx101"/>
-            <p:cNvSpPr/>
-            <p:nvPr/>
-          </p:nvSpPr>
-          <p:spPr>
-            <a:xfrm>
-              <a:off x="6066613" y="5652968"/>
+            <p:cNvPr id="82" name="tx80"/>
+            <p:cNvSpPr/>
+            <p:nvPr/>
+          </p:nvSpPr>
+          <p:spPr>
+            <a:xfrm>
+              <a:off x="6216921" y="5652968"/>
               <a:ext cx="229511" cy="118907"/>
             </a:xfrm>
             <a:prstGeom prst="rect">
@@ -7327,13 +6537,13 @@
         </p:sp>
         <p:sp>
           <p:nvSpPr>
-            <p:cNvPr id="104" name="tx102"/>
-            <p:cNvSpPr/>
-            <p:nvPr/>
-          </p:nvSpPr>
-          <p:spPr>
-            <a:xfrm>
-              <a:off x="6641109" y="5656918"/>
+            <p:cNvPr id="83" name="tx81"/>
+            <p:cNvSpPr/>
+            <p:nvPr/>
+          </p:nvSpPr>
+          <p:spPr>
+            <a:xfrm>
+              <a:off x="6814540" y="5656918"/>
               <a:ext cx="229511" cy="114957"/>
             </a:xfrm>
             <a:prstGeom prst="rect">
@@ -7373,13 +6583,13 @@
         </p:sp>
         <p:sp>
           <p:nvSpPr>
-            <p:cNvPr id="105" name="tx103"/>
-            <p:cNvSpPr/>
-            <p:nvPr/>
-          </p:nvSpPr>
-          <p:spPr>
-            <a:xfrm>
-              <a:off x="7215604" y="5652807"/>
+            <p:cNvPr id="84" name="tx82"/>
+            <p:cNvSpPr/>
+            <p:nvPr/>
+          </p:nvSpPr>
+          <p:spPr>
+            <a:xfrm>
+              <a:off x="7412160" y="5652807"/>
               <a:ext cx="229511" cy="119068"/>
             </a:xfrm>
             <a:prstGeom prst="rect">
@@ -7419,13 +6629,13 @@
         </p:sp>
         <p:sp>
           <p:nvSpPr>
-            <p:cNvPr id="106" name="tx104"/>
-            <p:cNvSpPr/>
-            <p:nvPr/>
-          </p:nvSpPr>
-          <p:spPr>
-            <a:xfrm>
-              <a:off x="7790099" y="5653049"/>
+            <p:cNvPr id="85" name="tx83"/>
+            <p:cNvSpPr/>
+            <p:nvPr/>
+          </p:nvSpPr>
+          <p:spPr>
+            <a:xfrm>
+              <a:off x="8009779" y="5653049"/>
               <a:ext cx="229511" cy="118826"/>
             </a:xfrm>
             <a:prstGeom prst="rect">
@@ -7465,13 +6675,13 @@
         </p:sp>
         <p:sp>
           <p:nvSpPr>
-            <p:cNvPr id="107" name="tx105"/>
-            <p:cNvSpPr/>
-            <p:nvPr/>
-          </p:nvSpPr>
-          <p:spPr>
-            <a:xfrm>
-              <a:off x="8364594" y="5652888"/>
+            <p:cNvPr id="86" name="tx84"/>
+            <p:cNvSpPr/>
+            <p:nvPr/>
+          </p:nvSpPr>
+          <p:spPr>
+            <a:xfrm>
+              <a:off x="8607399" y="5652888"/>
               <a:ext cx="229511" cy="118988"/>
             </a:xfrm>
             <a:prstGeom prst="rect">
@@ -7511,427 +6721,13 @@
         </p:sp>
         <p:sp>
           <p:nvSpPr>
-            <p:cNvPr id="108" name="tx106"/>
-            <p:cNvSpPr/>
-            <p:nvPr/>
-          </p:nvSpPr>
-          <p:spPr>
-            <a:xfrm>
-              <a:off x="1723878" y="2336967"/>
-              <a:ext cx="660641" cy="124792"/>
-            </a:xfrm>
-            <a:prstGeom prst="rect">
-              <a:avLst/>
-            </a:prstGeom>
-            <a:noFill/>
-          </p:spPr>
-          <p:txBody>
-            <a:bodyPr lIns="0" rIns="0" tIns="0" bIns="0" anchorCtr="1" anchor="ctr" wrap="none"/>
-            <a:lstStyle/>
-            <a:p>
-              <a:pPr algn="l" marL="0" marR="0" indent="0">
-                <a:lnSpc>
-                  <a:spcPts val="1300"/>
-                </a:lnSpc>
-                <a:spcBef>
-                  <a:spcPts val="0"/>
-                </a:spcBef>
-                <a:spcAft>
-                  <a:spcPts val="0"/>
-                </a:spcAft>
-              </a:pPr>
-              <a:r>
-                <a:rPr sz="1300">
-                  <a:solidFill>
-                    <a:srgbClr val="4D4D4D">
-                      <a:alpha val="100000"/>
-                    </a:srgbClr>
-                  </a:solidFill>
-                  <a:latin typeface="Helvetica"/>
-                  <a:cs typeface="Helvetica"/>
-                </a:rPr>
-                <a:t>CNGA11</a:t>
-              </a:r>
-            </a:p>
-          </p:txBody>
-        </p:sp>
-        <p:sp>
-          <p:nvSpPr>
-            <p:cNvPr id="109" name="tx107"/>
-            <p:cNvSpPr/>
-            <p:nvPr/>
-          </p:nvSpPr>
-          <p:spPr>
-            <a:xfrm>
-              <a:off x="1723878" y="1976390"/>
-              <a:ext cx="660641" cy="124792"/>
-            </a:xfrm>
-            <a:prstGeom prst="rect">
-              <a:avLst/>
-            </a:prstGeom>
-            <a:noFill/>
-          </p:spPr>
-          <p:txBody>
-            <a:bodyPr lIns="0" rIns="0" tIns="0" bIns="0" anchorCtr="1" anchor="ctr" wrap="none"/>
-            <a:lstStyle/>
-            <a:p>
-              <a:pPr algn="l" marL="0" marR="0" indent="0">
-                <a:lnSpc>
-                  <a:spcPts val="1300"/>
-                </a:lnSpc>
-                <a:spcBef>
-                  <a:spcPts val="0"/>
-                </a:spcBef>
-                <a:spcAft>
-                  <a:spcPts val="0"/>
-                </a:spcAft>
-              </a:pPr>
-              <a:r>
-                <a:rPr sz="1300">
-                  <a:solidFill>
-                    <a:srgbClr val="4D4D4D">
-                      <a:alpha val="100000"/>
-                    </a:srgbClr>
-                  </a:solidFill>
-                  <a:latin typeface="Helvetica"/>
-                  <a:cs typeface="Helvetica"/>
-                </a:rPr>
-                <a:t>CNGA20</a:t>
-              </a:r>
-            </a:p>
-          </p:txBody>
-        </p:sp>
-        <p:sp>
-          <p:nvSpPr>
-            <p:cNvPr id="110" name="tx108"/>
-            <p:cNvSpPr/>
-            <p:nvPr/>
-          </p:nvSpPr>
-          <p:spPr>
-            <a:xfrm>
-              <a:off x="1723878" y="4003219"/>
-              <a:ext cx="660641" cy="124792"/>
-            </a:xfrm>
-            <a:prstGeom prst="rect">
-              <a:avLst/>
-            </a:prstGeom>
-            <a:noFill/>
-          </p:spPr>
-          <p:txBody>
-            <a:bodyPr lIns="0" rIns="0" tIns="0" bIns="0" anchorCtr="1" anchor="ctr" wrap="none"/>
-            <a:lstStyle/>
-            <a:p>
-              <a:pPr algn="l" marL="0" marR="0" indent="0">
-                <a:lnSpc>
-                  <a:spcPts val="1300"/>
-                </a:lnSpc>
-                <a:spcBef>
-                  <a:spcPts val="0"/>
-                </a:spcBef>
-                <a:spcAft>
-                  <a:spcPts val="0"/>
-                </a:spcAft>
-              </a:pPr>
-              <a:r>
-                <a:rPr sz="1300">
-                  <a:solidFill>
-                    <a:srgbClr val="4D4D4D">
-                      <a:alpha val="100000"/>
-                    </a:srgbClr>
-                  </a:solidFill>
-                  <a:latin typeface="Helvetica"/>
-                  <a:cs typeface="Helvetica"/>
-                </a:rPr>
-                <a:t>CNGA12</a:t>
-              </a:r>
-            </a:p>
-          </p:txBody>
-        </p:sp>
-        <p:sp>
-          <p:nvSpPr>
-            <p:cNvPr id="111" name="tx109"/>
-            <p:cNvSpPr/>
-            <p:nvPr/>
-          </p:nvSpPr>
-          <p:spPr>
-            <a:xfrm>
-              <a:off x="1723878" y="3642562"/>
-              <a:ext cx="660641" cy="124872"/>
-            </a:xfrm>
-            <a:prstGeom prst="rect">
-              <a:avLst/>
-            </a:prstGeom>
-            <a:noFill/>
-          </p:spPr>
-          <p:txBody>
-            <a:bodyPr lIns="0" rIns="0" tIns="0" bIns="0" anchorCtr="1" anchor="ctr" wrap="none"/>
-            <a:lstStyle/>
-            <a:p>
-              <a:pPr algn="l" marL="0" marR="0" indent="0">
-                <a:lnSpc>
-                  <a:spcPts val="1300"/>
-                </a:lnSpc>
-                <a:spcBef>
-                  <a:spcPts val="0"/>
-                </a:spcBef>
-                <a:spcAft>
-                  <a:spcPts val="0"/>
-                </a:spcAft>
-              </a:pPr>
-              <a:r>
-                <a:rPr sz="1300">
-                  <a:solidFill>
-                    <a:srgbClr val="4D4D4D">
-                      <a:alpha val="100000"/>
-                    </a:srgbClr>
-                  </a:solidFill>
-                  <a:latin typeface="Helvetica"/>
-                  <a:cs typeface="Helvetica"/>
-                </a:rPr>
-                <a:t>CNGA19</a:t>
-              </a:r>
-            </a:p>
-          </p:txBody>
-        </p:sp>
-        <p:sp>
-          <p:nvSpPr>
-            <p:cNvPr id="112" name="tx110"/>
-            <p:cNvSpPr/>
-            <p:nvPr/>
-          </p:nvSpPr>
-          <p:spPr>
-            <a:xfrm>
-              <a:off x="1815699" y="3282066"/>
-              <a:ext cx="568821" cy="124792"/>
-            </a:xfrm>
-            <a:prstGeom prst="rect">
-              <a:avLst/>
-            </a:prstGeom>
-            <a:noFill/>
-          </p:spPr>
-          <p:txBody>
-            <a:bodyPr lIns="0" rIns="0" tIns="0" bIns="0" anchorCtr="1" anchor="ctr" wrap="none"/>
-            <a:lstStyle/>
-            <a:p>
-              <a:pPr algn="l" marL="0" marR="0" indent="0">
-                <a:lnSpc>
-                  <a:spcPts val="1300"/>
-                </a:lnSpc>
-                <a:spcBef>
-                  <a:spcPts val="0"/>
-                </a:spcBef>
-                <a:spcAft>
-                  <a:spcPts val="0"/>
-                </a:spcAft>
-              </a:pPr>
-              <a:r>
-                <a:rPr sz="1300">
-                  <a:solidFill>
-                    <a:srgbClr val="4D4D4D">
-                      <a:alpha val="100000"/>
-                    </a:srgbClr>
-                  </a:solidFill>
-                  <a:latin typeface="Helvetica"/>
-                  <a:cs typeface="Helvetica"/>
-                </a:rPr>
-                <a:t>CNGA7</a:t>
-              </a:r>
-            </a:p>
-          </p:txBody>
-        </p:sp>
-        <p:sp>
-          <p:nvSpPr>
-            <p:cNvPr id="113" name="tx111"/>
-            <p:cNvSpPr/>
-            <p:nvPr/>
-          </p:nvSpPr>
-          <p:spPr>
-            <a:xfrm>
-              <a:off x="1815699" y="2921328"/>
-              <a:ext cx="568821" cy="124953"/>
-            </a:xfrm>
-            <a:prstGeom prst="rect">
-              <a:avLst/>
-            </a:prstGeom>
-            <a:noFill/>
-          </p:spPr>
-          <p:txBody>
-            <a:bodyPr lIns="0" rIns="0" tIns="0" bIns="0" anchorCtr="1" anchor="ctr" wrap="none"/>
-            <a:lstStyle/>
-            <a:p>
-              <a:pPr algn="l" marL="0" marR="0" indent="0">
-                <a:lnSpc>
-                  <a:spcPts val="1300"/>
-                </a:lnSpc>
-                <a:spcBef>
-                  <a:spcPts val="0"/>
-                </a:spcBef>
-                <a:spcAft>
-                  <a:spcPts val="0"/>
-                </a:spcAft>
-              </a:pPr>
-              <a:r>
-                <a:rPr sz="1300">
-                  <a:solidFill>
-                    <a:srgbClr val="4D4D4D">
-                      <a:alpha val="100000"/>
-                    </a:srgbClr>
-                  </a:solidFill>
-                  <a:latin typeface="Helvetica"/>
-                  <a:cs typeface="Helvetica"/>
-                </a:rPr>
-                <a:t>CNGA8</a:t>
-              </a:r>
-            </a:p>
-          </p:txBody>
-        </p:sp>
-        <p:sp>
-          <p:nvSpPr>
-            <p:cNvPr id="114" name="tx112"/>
-            <p:cNvSpPr/>
-            <p:nvPr/>
-          </p:nvSpPr>
-          <p:spPr>
-            <a:xfrm>
-              <a:off x="1815699" y="5308895"/>
-              <a:ext cx="568821" cy="124792"/>
-            </a:xfrm>
-            <a:prstGeom prst="rect">
-              <a:avLst/>
-            </a:prstGeom>
-            <a:noFill/>
-          </p:spPr>
-          <p:txBody>
-            <a:bodyPr lIns="0" rIns="0" tIns="0" bIns="0" anchorCtr="1" anchor="ctr" wrap="none"/>
-            <a:lstStyle/>
-            <a:p>
-              <a:pPr algn="l" marL="0" marR="0" indent="0">
-                <a:lnSpc>
-                  <a:spcPts val="1300"/>
-                </a:lnSpc>
-                <a:spcBef>
-                  <a:spcPts val="0"/>
-                </a:spcBef>
-                <a:spcAft>
-                  <a:spcPts val="0"/>
-                </a:spcAft>
-              </a:pPr>
-              <a:r>
-                <a:rPr sz="1300">
-                  <a:solidFill>
-                    <a:srgbClr val="4D4D4D">
-                      <a:alpha val="100000"/>
-                    </a:srgbClr>
-                  </a:solidFill>
-                  <a:latin typeface="Helvetica"/>
-                  <a:cs typeface="Helvetica"/>
-                </a:rPr>
-                <a:t>CNGA1</a:t>
-              </a:r>
-            </a:p>
-          </p:txBody>
-        </p:sp>
-        <p:sp>
-          <p:nvSpPr>
-            <p:cNvPr id="115" name="tx113"/>
-            <p:cNvSpPr/>
-            <p:nvPr/>
-          </p:nvSpPr>
-          <p:spPr>
-            <a:xfrm>
-              <a:off x="1815699" y="4948319"/>
-              <a:ext cx="568821" cy="124792"/>
-            </a:xfrm>
-            <a:prstGeom prst="rect">
-              <a:avLst/>
-            </a:prstGeom>
-            <a:noFill/>
-          </p:spPr>
-          <p:txBody>
-            <a:bodyPr lIns="0" rIns="0" tIns="0" bIns="0" anchorCtr="1" anchor="ctr" wrap="none"/>
-            <a:lstStyle/>
-            <a:p>
-              <a:pPr algn="l" marL="0" marR="0" indent="0">
-                <a:lnSpc>
-                  <a:spcPts val="1300"/>
-                </a:lnSpc>
-                <a:spcBef>
-                  <a:spcPts val="0"/>
-                </a:spcBef>
-                <a:spcAft>
-                  <a:spcPts val="0"/>
-                </a:spcAft>
-              </a:pPr>
-              <a:r>
-                <a:rPr sz="1300">
-                  <a:solidFill>
-                    <a:srgbClr val="4D4D4D">
-                      <a:alpha val="100000"/>
-                    </a:srgbClr>
-                  </a:solidFill>
-                  <a:latin typeface="Helvetica"/>
-                  <a:cs typeface="Helvetica"/>
-                </a:rPr>
-                <a:t>CNGA2</a:t>
-              </a:r>
-            </a:p>
-          </p:txBody>
-        </p:sp>
-        <p:sp>
-          <p:nvSpPr>
-            <p:cNvPr id="116" name="tx114"/>
-            <p:cNvSpPr/>
-            <p:nvPr/>
-          </p:nvSpPr>
-          <p:spPr>
-            <a:xfrm>
-              <a:off x="1815699" y="4587742"/>
-              <a:ext cx="568821" cy="124792"/>
-            </a:xfrm>
-            <a:prstGeom prst="rect">
-              <a:avLst/>
-            </a:prstGeom>
-            <a:noFill/>
-          </p:spPr>
-          <p:txBody>
-            <a:bodyPr lIns="0" rIns="0" tIns="0" bIns="0" anchorCtr="1" anchor="ctr" wrap="none"/>
-            <a:lstStyle/>
-            <a:p>
-              <a:pPr algn="l" marL="0" marR="0" indent="0">
-                <a:lnSpc>
-                  <a:spcPts val="1300"/>
-                </a:lnSpc>
-                <a:spcBef>
-                  <a:spcPts val="0"/>
-                </a:spcBef>
-                <a:spcAft>
-                  <a:spcPts val="0"/>
-                </a:spcAft>
-              </a:pPr>
-              <a:r>
-                <a:rPr sz="1300">
-                  <a:solidFill>
-                    <a:srgbClr val="4D4D4D">
-                      <a:alpha val="100000"/>
-                    </a:srgbClr>
-                  </a:solidFill>
-                  <a:latin typeface="Helvetica"/>
-                  <a:cs typeface="Helvetica"/>
-                </a:rPr>
-                <a:t>CNGA4</a:t>
-              </a:r>
-            </a:p>
-          </p:txBody>
-        </p:sp>
-        <p:sp>
-          <p:nvSpPr>
-            <p:cNvPr id="117" name="tx115"/>
-            <p:cNvSpPr/>
-            <p:nvPr/>
-          </p:nvSpPr>
-          <p:spPr>
-            <a:xfrm>
-              <a:off x="5180063" y="5955581"/>
+            <p:cNvPr id="87" name="tx85"/>
+            <p:cNvSpPr/>
+            <p:nvPr/>
+          </p:nvSpPr>
+          <p:spPr>
+            <a:xfrm>
+              <a:off x="5307246" y="5955581"/>
               <a:ext cx="853622" cy="179244"/>
             </a:xfrm>
             <a:prstGeom prst="rect">
@@ -7971,7 +6767,7 @@
         </p:sp>
         <p:sp>
           <p:nvSpPr>
-            <p:cNvPr id="118" name="rc116"/>
+            <p:cNvPr id="88" name="rc86"/>
             <p:cNvSpPr/>
             <p:nvPr/>
           </p:nvSpPr>
@@ -7997,7 +6793,7 @@
         </p:sp>
         <p:sp>
           <p:nvSpPr>
-            <p:cNvPr id="119" name="tx117"/>
+            <p:cNvPr id="89" name="tx87"/>
             <p:cNvSpPr/>
             <p:nvPr/>
           </p:nvSpPr>
@@ -8043,7 +6839,7 @@
         </p:sp>
         <p:sp>
           <p:nvSpPr>
-            <p:cNvPr id="120" name="rc118"/>
+            <p:cNvPr id="90" name="rc88"/>
             <p:cNvSpPr/>
             <p:nvPr/>
           </p:nvSpPr>
@@ -8064,7 +6860,7 @@
         </p:sp>
         <p:sp>
           <p:nvSpPr>
-            <p:cNvPr id="121" name="pt119"/>
+            <p:cNvPr id="91" name="pt89"/>
             <p:cNvSpPr/>
             <p:nvPr/>
           </p:nvSpPr>
@@ -8099,7 +6895,7 @@
         </p:sp>
         <p:sp>
           <p:nvSpPr>
-            <p:cNvPr id="122" name="rc120"/>
+            <p:cNvPr id="92" name="rc90"/>
             <p:cNvSpPr/>
             <p:nvPr/>
           </p:nvSpPr>
@@ -8120,7 +6916,7 @@
         </p:sp>
         <p:sp>
           <p:nvSpPr>
-            <p:cNvPr id="123" name="pt121"/>
+            <p:cNvPr id="93" name="pt91"/>
             <p:cNvSpPr/>
             <p:nvPr/>
           </p:nvSpPr>
@@ -8155,7 +6951,7 @@
         </p:sp>
         <p:sp>
           <p:nvSpPr>
-            <p:cNvPr id="124" name="tx122"/>
+            <p:cNvPr id="94" name="tx92"/>
             <p:cNvSpPr/>
             <p:nvPr/>
           </p:nvSpPr>
@@ -8201,7 +6997,7 @@
         </p:sp>
         <p:sp>
           <p:nvSpPr>
-            <p:cNvPr id="125" name="tx123"/>
+            <p:cNvPr id="95" name="tx93"/>
             <p:cNvSpPr/>
             <p:nvPr/>
           </p:nvSpPr>
@@ -8247,7 +7043,7 @@
         </p:sp>
         <p:sp>
           <p:nvSpPr>
-            <p:cNvPr id="126" name="rc124"/>
+            <p:cNvPr id="96" name="rc94"/>
             <p:cNvSpPr/>
             <p:nvPr/>
           </p:nvSpPr>
@@ -8273,7 +7069,7 @@
         </p:sp>
         <p:sp>
           <p:nvSpPr>
-            <p:cNvPr id="127" name="tx125"/>
+            <p:cNvPr id="97" name="tx95"/>
             <p:cNvSpPr/>
             <p:nvPr/>
           </p:nvSpPr>
@@ -8319,7 +7115,7 @@
         </p:sp>
         <p:sp>
           <p:nvSpPr>
-            <p:cNvPr id="128" name="rc126"/>
+            <p:cNvPr id="98" name="rc96"/>
             <p:cNvSpPr/>
             <p:nvPr/>
           </p:nvSpPr>
@@ -8340,7 +7136,7 @@
         </p:sp>
         <p:sp>
           <p:nvSpPr>
-            <p:cNvPr id="129" name="pl127"/>
+            <p:cNvPr id="99" name="pl97"/>
             <p:cNvSpPr/>
             <p:nvPr/>
           </p:nvSpPr>
@@ -8380,7 +7176,7 @@
         </p:sp>
         <p:sp>
           <p:nvSpPr>
-            <p:cNvPr id="130" name="rc128"/>
+            <p:cNvPr id="100" name="rc98"/>
             <p:cNvSpPr/>
             <p:nvPr/>
           </p:nvSpPr>
@@ -8401,7 +7197,7 @@
         </p:sp>
         <p:sp>
           <p:nvSpPr>
-            <p:cNvPr id="131" name="pl129"/>
+            <p:cNvPr id="101" name="pl99"/>
             <p:cNvSpPr/>
             <p:nvPr/>
           </p:nvSpPr>
@@ -8441,7 +7237,7 @@
         </p:sp>
         <p:sp>
           <p:nvSpPr>
-            <p:cNvPr id="132" name="tx130"/>
+            <p:cNvPr id="102" name="tx100"/>
             <p:cNvSpPr/>
             <p:nvPr/>
           </p:nvSpPr>
@@ -8487,7 +7283,7 @@
         </p:sp>
         <p:sp>
           <p:nvSpPr>
-            <p:cNvPr id="133" name="tx131"/>
+            <p:cNvPr id="103" name="tx101"/>
             <p:cNvSpPr/>
             <p:nvPr/>
           </p:nvSpPr>

</xml_diff>

<commit_message>
Added the proportion feature, removed the legends for colors completely in alt_ball_and_stick_graph.R and removed only the legend for different gene types in ball_and_stick_graph.R
</commit_message>
<xml_diff>
--- a/Ball_and_stick_graph/Presentation.pptx
+++ b/Ball_and_stick_graph/Presentation.pptx
@@ -4060,8 +4060,8 @@
           </p:nvSpPr>
           <p:spPr>
             <a:xfrm>
-              <a:off x="6095294" y="1972903"/>
-              <a:ext cx="138135" cy="138135"/>
+              <a:off x="6058708" y="1936316"/>
+              <a:ext cx="211308" cy="211308"/>
             </a:xfrm>
             <a:prstGeom prst="ellipse">
               <a:avLst/>
@@ -4095,8 +4095,8 @@
           </p:nvSpPr>
           <p:spPr>
             <a:xfrm>
-              <a:off x="6646242" y="1972903"/>
-              <a:ext cx="138135" cy="138135"/>
+              <a:off x="6609655" y="1936316"/>
+              <a:ext cx="211308" cy="211308"/>
             </a:xfrm>
             <a:prstGeom prst="ellipse">
               <a:avLst/>
@@ -4130,8 +4130,8 @@
           </p:nvSpPr>
           <p:spPr>
             <a:xfrm>
-              <a:off x="7322870" y="2333479"/>
-              <a:ext cx="138135" cy="138135"/>
+              <a:off x="7286283" y="2296893"/>
+              <a:ext cx="211308" cy="211308"/>
             </a:xfrm>
             <a:prstGeom prst="ellipse">
               <a:avLst/>
@@ -4165,8 +4165,8 @@
           </p:nvSpPr>
           <p:spPr>
             <a:xfrm>
-              <a:off x="5064975" y="2333479"/>
-              <a:ext cx="138135" cy="138135"/>
+              <a:off x="5028389" y="2296893"/>
+              <a:ext cx="211308" cy="211308"/>
             </a:xfrm>
             <a:prstGeom prst="ellipse">
               <a:avLst/>
@@ -5005,8 +5005,8 @@
           </p:nvSpPr>
           <p:spPr>
             <a:xfrm>
-              <a:off x="7146834" y="3278579"/>
-              <a:ext cx="138135" cy="138135"/>
+              <a:off x="7138704" y="3270448"/>
+              <a:ext cx="154396" cy="154396"/>
             </a:xfrm>
             <a:prstGeom prst="ellipse">
               <a:avLst/>
@@ -5040,8 +5040,8 @@
           </p:nvSpPr>
           <p:spPr>
             <a:xfrm>
-              <a:off x="4665426" y="3278579"/>
-              <a:ext cx="138135" cy="138135"/>
+              <a:off x="4657295" y="3270448"/>
+              <a:ext cx="154396" cy="154396"/>
             </a:xfrm>
             <a:prstGeom prst="ellipse">
               <a:avLst/>
@@ -5075,8 +5075,8 @@
           </p:nvSpPr>
           <p:spPr>
             <a:xfrm>
-              <a:off x="5250494" y="2918002"/>
-              <a:ext cx="138135" cy="138135"/>
+              <a:off x="5232878" y="2900386"/>
+              <a:ext cx="173367" cy="173367"/>
             </a:xfrm>
             <a:prstGeom prst="ellipse">
               <a:avLst/>
@@ -5110,8 +5110,8 @@
           </p:nvSpPr>
           <p:spPr>
             <a:xfrm>
-              <a:off x="8365058" y="2918002"/>
-              <a:ext cx="138135" cy="138135"/>
+              <a:off x="8347443" y="2900386"/>
+              <a:ext cx="173367" cy="173367"/>
             </a:xfrm>
             <a:prstGeom prst="ellipse">
               <a:avLst/>
@@ -5145,8 +5145,8 @@
           </p:nvSpPr>
           <p:spPr>
             <a:xfrm>
-              <a:off x="7576922" y="3999732"/>
-              <a:ext cx="138135" cy="138135"/>
+              <a:off x="7549820" y="3972631"/>
+              <a:ext cx="192337" cy="192337"/>
             </a:xfrm>
             <a:prstGeom prst="ellipse">
               <a:avLst/>
@@ -5180,8 +5180,8 @@
           </p:nvSpPr>
           <p:spPr>
             <a:xfrm>
-              <a:off x="3309082" y="3999732"/>
-              <a:ext cx="138135" cy="138135"/>
+              <a:off x="3281981" y="3972631"/>
+              <a:ext cx="192337" cy="192337"/>
             </a:xfrm>
             <a:prstGeom prst="ellipse">
               <a:avLst/>
@@ -5215,8 +5215,8 @@
           </p:nvSpPr>
           <p:spPr>
             <a:xfrm>
-              <a:off x="5191435" y="3639155"/>
-              <a:ext cx="138135" cy="138135"/>
+              <a:off x="5154848" y="3602569"/>
+              <a:ext cx="211308" cy="211308"/>
             </a:xfrm>
             <a:prstGeom prst="ellipse">
               <a:avLst/>
@@ -5250,8 +5250,8 @@
           </p:nvSpPr>
           <p:spPr>
             <a:xfrm>
-              <a:off x="8317588" y="3639155"/>
-              <a:ext cx="138135" cy="138135"/>
+              <a:off x="8281001" y="3602569"/>
+              <a:ext cx="211308" cy="211308"/>
             </a:xfrm>
             <a:prstGeom prst="ellipse">
               <a:avLst/>
@@ -6007,8 +6007,8 @@
           </p:nvSpPr>
           <p:spPr>
             <a:xfrm>
-              <a:off x="4023558" y="5305408"/>
-              <a:ext cx="138135" cy="138135"/>
+              <a:off x="4041174" y="5323024"/>
+              <a:ext cx="102903" cy="102903"/>
             </a:xfrm>
             <a:prstGeom prst="ellipse">
               <a:avLst/>
@@ -6042,8 +6042,8 @@
           </p:nvSpPr>
           <p:spPr>
             <a:xfrm>
-              <a:off x="5759474" y="5305408"/>
-              <a:ext cx="138135" cy="138135"/>
+              <a:off x="5777090" y="5323024"/>
+              <a:ext cx="102903" cy="102903"/>
             </a:xfrm>
             <a:prstGeom prst="ellipse">
               <a:avLst/>
@@ -6077,8 +6077,8 @@
           </p:nvSpPr>
           <p:spPr>
             <a:xfrm>
-              <a:off x="4739567" y="4944831"/>
-              <a:ext cx="138135" cy="138135"/>
+              <a:off x="4747697" y="4952962"/>
+              <a:ext cx="121874" cy="121874"/>
             </a:xfrm>
             <a:prstGeom prst="ellipse">
               <a:avLst/>
@@ -6112,8 +6112,8 @@
           </p:nvSpPr>
           <p:spPr>
             <a:xfrm>
-              <a:off x="4706636" y="4944831"/>
-              <a:ext cx="138135" cy="138135"/>
+              <a:off x="4714766" y="4952962"/>
+              <a:ext cx="121874" cy="121874"/>
             </a:xfrm>
             <a:prstGeom prst="ellipse">
               <a:avLst/>
@@ -6147,8 +6147,8 @@
           </p:nvSpPr>
           <p:spPr>
             <a:xfrm>
-              <a:off x="4440856" y="4584255"/>
-              <a:ext cx="138135" cy="138135"/>
+              <a:off x="4442211" y="4585610"/>
+              <a:ext cx="135425" cy="135425"/>
             </a:xfrm>
             <a:prstGeom prst="ellipse">
               <a:avLst/>
@@ -6182,8 +6182,8 @@
           </p:nvSpPr>
           <p:spPr>
             <a:xfrm>
-              <a:off x="3173069" y="4584255"/>
-              <a:ext cx="138135" cy="138135"/>
+              <a:off x="3174424" y="4585610"/>
+              <a:ext cx="135425" cy="135425"/>
             </a:xfrm>
             <a:prstGeom prst="ellipse">
               <a:avLst/>
@@ -7879,7 +7879,585 @@
           </p:nvSpPr>
           <p:spPr>
             <a:xfrm>
-              <a:off x="9229731" y="1815355"/>
+              <a:off x="9229731" y="1737818"/>
+              <a:ext cx="878923" cy="176361"/>
+            </a:xfrm>
+            <a:prstGeom prst="rect">
+              <a:avLst/>
+            </a:prstGeom>
+            <a:noFill/>
+          </p:spPr>
+          <p:txBody>
+            <a:bodyPr lIns="0" rIns="0" tIns="0" bIns="0" anchorCtr="1" anchor="ctr" wrap="none"/>
+            <a:lstStyle/>
+            <a:p>
+              <a:pPr algn="l" marL="0" marR="0" indent="0">
+                <a:lnSpc>
+                  <a:spcPts val="1500"/>
+                </a:lnSpc>
+                <a:spcBef>
+                  <a:spcPts val="0"/>
+                </a:spcBef>
+                <a:spcAft>
+                  <a:spcPts val="0"/>
+                </a:spcAft>
+              </a:pPr>
+              <a:r>
+                <a:rPr sz="1500">
+                  <a:solidFill>
+                    <a:srgbClr val="000000">
+                      <a:alpha val="100000"/>
+                    </a:srgbClr>
+                  </a:solidFill>
+                  <a:latin typeface="Helvetica"/>
+                  <a:cs typeface="Helvetica"/>
+                </a:rPr>
+                <a:t>Proportion</a:t>
+              </a:r>
+            </a:p>
+          </p:txBody>
+        </p:sp>
+        <p:sp>
+          <p:nvSpPr>
+            <p:cNvPr id="115" name="pt113"/>
+            <p:cNvSpPr/>
+            <p:nvPr/>
+          </p:nvSpPr>
+          <p:spPr>
+            <a:xfrm>
+              <a:off x="9304279" y="2120049"/>
+              <a:ext cx="102903" cy="102903"/>
+            </a:xfrm>
+            <a:prstGeom prst="ellipse">
+              <a:avLst/>
+            </a:prstGeom>
+            <a:ln w="21600" cap="rnd">
+              <a:solidFill>
+                <a:srgbClr val="000000">
+                  <a:alpha val="100000"/>
+                </a:srgbClr>
+              </a:solidFill>
+              <a:prstDash val="solid"/>
+              <a:round/>
+            </a:ln>
+          </p:spPr>
+          <p:txBody>
+            <a:bodyPr/>
+            <a:lstStyle/>
+            <a:p/>
+          </p:txBody>
+        </p:sp>
+        <p:sp>
+          <p:nvSpPr>
+            <p:cNvPr id="116" name="pt114"/>
+            <p:cNvSpPr/>
+            <p:nvPr/>
+          </p:nvSpPr>
+          <p:spPr>
+            <a:xfrm>
+              <a:off x="9294794" y="2456545"/>
+              <a:ext cx="121874" cy="121874"/>
+            </a:xfrm>
+            <a:prstGeom prst="ellipse">
+              <a:avLst/>
+            </a:prstGeom>
+            <a:ln w="21600" cap="rnd">
+              <a:solidFill>
+                <a:srgbClr val="000000">
+                  <a:alpha val="100000"/>
+                </a:srgbClr>
+              </a:solidFill>
+              <a:prstDash val="solid"/>
+              <a:round/>
+            </a:ln>
+          </p:spPr>
+          <p:txBody>
+            <a:bodyPr/>
+            <a:lstStyle/>
+            <a:p/>
+          </p:txBody>
+        </p:sp>
+        <p:sp>
+          <p:nvSpPr>
+            <p:cNvPr id="117" name="pt115"/>
+            <p:cNvSpPr/>
+            <p:nvPr/>
+          </p:nvSpPr>
+          <p:spPr>
+            <a:xfrm>
+              <a:off x="9288019" y="2795752"/>
+              <a:ext cx="135425" cy="135425"/>
+            </a:xfrm>
+            <a:prstGeom prst="ellipse">
+              <a:avLst/>
+            </a:prstGeom>
+            <a:ln w="21600" cap="rnd">
+              <a:solidFill>
+                <a:srgbClr val="000000">
+                  <a:alpha val="100000"/>
+                </a:srgbClr>
+              </a:solidFill>
+              <a:prstDash val="solid"/>
+              <a:round/>
+            </a:ln>
+          </p:spPr>
+          <p:txBody>
+            <a:bodyPr/>
+            <a:lstStyle/>
+            <a:p/>
+          </p:txBody>
+        </p:sp>
+        <p:sp>
+          <p:nvSpPr>
+            <p:cNvPr id="118" name="pt116"/>
+            <p:cNvSpPr/>
+            <p:nvPr/>
+          </p:nvSpPr>
+          <p:spPr>
+            <a:xfrm>
+              <a:off x="9278533" y="3132248"/>
+              <a:ext cx="154396" cy="154396"/>
+            </a:xfrm>
+            <a:prstGeom prst="ellipse">
+              <a:avLst/>
+            </a:prstGeom>
+            <a:ln w="21600" cap="rnd">
+              <a:solidFill>
+                <a:srgbClr val="000000">
+                  <a:alpha val="100000"/>
+                </a:srgbClr>
+              </a:solidFill>
+              <a:prstDash val="solid"/>
+              <a:round/>
+            </a:ln>
+          </p:spPr>
+          <p:txBody>
+            <a:bodyPr/>
+            <a:lstStyle/>
+            <a:p/>
+          </p:txBody>
+        </p:sp>
+        <p:sp>
+          <p:nvSpPr>
+            <p:cNvPr id="119" name="pt117"/>
+            <p:cNvSpPr/>
+            <p:nvPr/>
+          </p:nvSpPr>
+          <p:spPr>
+            <a:xfrm>
+              <a:off x="9269048" y="3468744"/>
+              <a:ext cx="173367" cy="173367"/>
+            </a:xfrm>
+            <a:prstGeom prst="ellipse">
+              <a:avLst/>
+            </a:prstGeom>
+            <a:ln w="21600" cap="rnd">
+              <a:solidFill>
+                <a:srgbClr val="000000">
+                  <a:alpha val="100000"/>
+                </a:srgbClr>
+              </a:solidFill>
+              <a:prstDash val="solid"/>
+              <a:round/>
+            </a:ln>
+          </p:spPr>
+          <p:txBody>
+            <a:bodyPr/>
+            <a:lstStyle/>
+            <a:p/>
+          </p:txBody>
+        </p:sp>
+        <p:sp>
+          <p:nvSpPr>
+            <p:cNvPr id="120" name="pt118"/>
+            <p:cNvSpPr/>
+            <p:nvPr/>
+          </p:nvSpPr>
+          <p:spPr>
+            <a:xfrm>
+              <a:off x="9259562" y="3808912"/>
+              <a:ext cx="192337" cy="192337"/>
+            </a:xfrm>
+            <a:prstGeom prst="ellipse">
+              <a:avLst/>
+            </a:prstGeom>
+            <a:ln w="21600" cap="rnd">
+              <a:solidFill>
+                <a:srgbClr val="000000">
+                  <a:alpha val="100000"/>
+                </a:srgbClr>
+              </a:solidFill>
+              <a:prstDash val="solid"/>
+              <a:round/>
+            </a:ln>
+          </p:spPr>
+          <p:txBody>
+            <a:bodyPr/>
+            <a:lstStyle/>
+            <a:p/>
+          </p:txBody>
+        </p:sp>
+        <p:sp>
+          <p:nvSpPr>
+            <p:cNvPr id="121" name="pt119"/>
+            <p:cNvSpPr/>
+            <p:nvPr/>
+          </p:nvSpPr>
+          <p:spPr>
+            <a:xfrm>
+              <a:off x="9250077" y="4165352"/>
+              <a:ext cx="211308" cy="211308"/>
+            </a:xfrm>
+            <a:prstGeom prst="ellipse">
+              <a:avLst/>
+            </a:prstGeom>
+            <a:ln w="21600" cap="rnd">
+              <a:solidFill>
+                <a:srgbClr val="000000">
+                  <a:alpha val="100000"/>
+                </a:srgbClr>
+              </a:solidFill>
+              <a:prstDash val="solid"/>
+              <a:round/>
+            </a:ln>
+          </p:spPr>
+          <p:txBody>
+            <a:bodyPr/>
+            <a:lstStyle/>
+            <a:p/>
+          </p:txBody>
+        </p:sp>
+        <p:sp>
+          <p:nvSpPr>
+            <p:cNvPr id="122" name="tx120"/>
+            <p:cNvSpPr/>
+            <p:nvPr/>
+          </p:nvSpPr>
+          <p:spPr>
+            <a:xfrm>
+              <a:off x="9551320" y="2108984"/>
+              <a:ext cx="853473" cy="121729"/>
+            </a:xfrm>
+            <a:prstGeom prst="rect">
+              <a:avLst/>
+            </a:prstGeom>
+            <a:noFill/>
+          </p:spPr>
+          <p:txBody>
+            <a:bodyPr lIns="0" rIns="0" tIns="0" bIns="0" anchorCtr="1" anchor="ctr" wrap="none"/>
+            <a:lstStyle/>
+            <a:p>
+              <a:pPr algn="l" marL="0" marR="0" indent="0">
+                <a:lnSpc>
+                  <a:spcPts val="1300"/>
+                </a:lnSpc>
+                <a:spcBef>
+                  <a:spcPts val="0"/>
+                </a:spcBef>
+                <a:spcAft>
+                  <a:spcPts val="0"/>
+                </a:spcAft>
+              </a:pPr>
+              <a:r>
+                <a:rPr sz="1300">
+                  <a:solidFill>
+                    <a:srgbClr val="000000">
+                      <a:alpha val="100000"/>
+                    </a:srgbClr>
+                  </a:solidFill>
+                  <a:latin typeface="Helvetica"/>
+                  <a:cs typeface="Helvetica"/>
+                </a:rPr>
+                <a:t>0.01 or less</a:t>
+              </a:r>
+            </a:p>
+          </p:txBody>
+        </p:sp>
+        <p:sp>
+          <p:nvSpPr>
+            <p:cNvPr id="123" name="tx121"/>
+            <p:cNvSpPr/>
+            <p:nvPr/>
+          </p:nvSpPr>
+          <p:spPr>
+            <a:xfrm>
+              <a:off x="9551320" y="2457707"/>
+              <a:ext cx="789464" cy="118988"/>
+            </a:xfrm>
+            <a:prstGeom prst="rect">
+              <a:avLst/>
+            </a:prstGeom>
+            <a:noFill/>
+          </p:spPr>
+          <p:txBody>
+            <a:bodyPr lIns="0" rIns="0" tIns="0" bIns="0" anchorCtr="1" anchor="ctr" wrap="none"/>
+            <a:lstStyle/>
+            <a:p>
+              <a:pPr algn="l" marL="0" marR="0" indent="0">
+                <a:lnSpc>
+                  <a:spcPts val="1300"/>
+                </a:lnSpc>
+                <a:spcBef>
+                  <a:spcPts val="0"/>
+                </a:spcBef>
+                <a:spcAft>
+                  <a:spcPts val="0"/>
+                </a:spcAft>
+              </a:pPr>
+              <a:r>
+                <a:rPr sz="1300">
+                  <a:solidFill>
+                    <a:srgbClr val="000000">
+                      <a:alpha val="100000"/>
+                    </a:srgbClr>
+                  </a:solidFill>
+                  <a:latin typeface="Helvetica"/>
+                  <a:cs typeface="Helvetica"/>
+                </a:rPr>
+                <a:t>0.01-0.025</a:t>
+              </a:r>
+            </a:p>
+          </p:txBody>
+        </p:sp>
+        <p:sp>
+          <p:nvSpPr>
+            <p:cNvPr id="124" name="tx122"/>
+            <p:cNvSpPr/>
+            <p:nvPr/>
+          </p:nvSpPr>
+          <p:spPr>
+            <a:xfrm>
+              <a:off x="9551320" y="2803688"/>
+              <a:ext cx="789464" cy="118988"/>
+            </a:xfrm>
+            <a:prstGeom prst="rect">
+              <a:avLst/>
+            </a:prstGeom>
+            <a:noFill/>
+          </p:spPr>
+          <p:txBody>
+            <a:bodyPr lIns="0" rIns="0" tIns="0" bIns="0" anchorCtr="1" anchor="ctr" wrap="none"/>
+            <a:lstStyle/>
+            <a:p>
+              <a:pPr algn="l" marL="0" marR="0" indent="0">
+                <a:lnSpc>
+                  <a:spcPts val="1300"/>
+                </a:lnSpc>
+                <a:spcBef>
+                  <a:spcPts val="0"/>
+                </a:spcBef>
+                <a:spcAft>
+                  <a:spcPts val="0"/>
+                </a:spcAft>
+              </a:pPr>
+              <a:r>
+                <a:rPr sz="1300">
+                  <a:solidFill>
+                    <a:srgbClr val="000000">
+                      <a:alpha val="100000"/>
+                    </a:srgbClr>
+                  </a:solidFill>
+                  <a:latin typeface="Helvetica"/>
+                  <a:cs typeface="Helvetica"/>
+                </a:rPr>
+                <a:t>0.025-0.05</a:t>
+              </a:r>
+            </a:p>
+          </p:txBody>
+        </p:sp>
+        <p:sp>
+          <p:nvSpPr>
+            <p:cNvPr id="125" name="tx123"/>
+            <p:cNvSpPr/>
+            <p:nvPr/>
+          </p:nvSpPr>
+          <p:spPr>
+            <a:xfrm>
+              <a:off x="9551320" y="3150073"/>
+              <a:ext cx="605823" cy="118585"/>
+            </a:xfrm>
+            <a:prstGeom prst="rect">
+              <a:avLst/>
+            </a:prstGeom>
+            <a:noFill/>
+          </p:spPr>
+          <p:txBody>
+            <a:bodyPr lIns="0" rIns="0" tIns="0" bIns="0" anchorCtr="1" anchor="ctr" wrap="none"/>
+            <a:lstStyle/>
+            <a:p>
+              <a:pPr algn="l" marL="0" marR="0" indent="0">
+                <a:lnSpc>
+                  <a:spcPts val="1300"/>
+                </a:lnSpc>
+                <a:spcBef>
+                  <a:spcPts val="0"/>
+                </a:spcBef>
+                <a:spcAft>
+                  <a:spcPts val="0"/>
+                </a:spcAft>
+              </a:pPr>
+              <a:r>
+                <a:rPr sz="1300">
+                  <a:solidFill>
+                    <a:srgbClr val="000000">
+                      <a:alpha val="100000"/>
+                    </a:srgbClr>
+                  </a:solidFill>
+                  <a:latin typeface="Helvetica"/>
+                  <a:cs typeface="Helvetica"/>
+                </a:rPr>
+                <a:t>0.05-0.1</a:t>
+              </a:r>
+            </a:p>
+          </p:txBody>
+        </p:sp>
+        <p:sp>
+          <p:nvSpPr>
+            <p:cNvPr id="126" name="tx124"/>
+            <p:cNvSpPr/>
+            <p:nvPr/>
+          </p:nvSpPr>
+          <p:spPr>
+            <a:xfrm>
+              <a:off x="9551320" y="3495651"/>
+              <a:ext cx="514002" cy="118988"/>
+            </a:xfrm>
+            <a:prstGeom prst="rect">
+              <a:avLst/>
+            </a:prstGeom>
+            <a:noFill/>
+          </p:spPr>
+          <p:txBody>
+            <a:bodyPr lIns="0" rIns="0" tIns="0" bIns="0" anchorCtr="1" anchor="ctr" wrap="none"/>
+            <a:lstStyle/>
+            <a:p>
+              <a:pPr algn="l" marL="0" marR="0" indent="0">
+                <a:lnSpc>
+                  <a:spcPts val="1300"/>
+                </a:lnSpc>
+                <a:spcBef>
+                  <a:spcPts val="0"/>
+                </a:spcBef>
+                <a:spcAft>
+                  <a:spcPts val="0"/>
+                </a:spcAft>
+              </a:pPr>
+              <a:r>
+                <a:rPr sz="1300">
+                  <a:solidFill>
+                    <a:srgbClr val="000000">
+                      <a:alpha val="100000"/>
+                    </a:srgbClr>
+                  </a:solidFill>
+                  <a:latin typeface="Helvetica"/>
+                  <a:cs typeface="Helvetica"/>
+                </a:rPr>
+                <a:t>0.1-0.2</a:t>
+              </a:r>
+            </a:p>
+          </p:txBody>
+        </p:sp>
+        <p:sp>
+          <p:nvSpPr>
+            <p:cNvPr id="127" name="tx125"/>
+            <p:cNvSpPr/>
+            <p:nvPr/>
+          </p:nvSpPr>
+          <p:spPr>
+            <a:xfrm>
+              <a:off x="9551320" y="3845305"/>
+              <a:ext cx="514002" cy="118988"/>
+            </a:xfrm>
+            <a:prstGeom prst="rect">
+              <a:avLst/>
+            </a:prstGeom>
+            <a:noFill/>
+          </p:spPr>
+          <p:txBody>
+            <a:bodyPr lIns="0" rIns="0" tIns="0" bIns="0" anchorCtr="1" anchor="ctr" wrap="none"/>
+            <a:lstStyle/>
+            <a:p>
+              <a:pPr algn="l" marL="0" marR="0" indent="0">
+                <a:lnSpc>
+                  <a:spcPts val="1300"/>
+                </a:lnSpc>
+                <a:spcBef>
+                  <a:spcPts val="0"/>
+                </a:spcBef>
+                <a:spcAft>
+                  <a:spcPts val="0"/>
+                </a:spcAft>
+              </a:pPr>
+              <a:r>
+                <a:rPr sz="1300">
+                  <a:solidFill>
+                    <a:srgbClr val="000000">
+                      <a:alpha val="100000"/>
+                    </a:srgbClr>
+                  </a:solidFill>
+                  <a:latin typeface="Helvetica"/>
+                  <a:cs typeface="Helvetica"/>
+                </a:rPr>
+                <a:t>0.2-0.5</a:t>
+              </a:r>
+            </a:p>
+          </p:txBody>
+        </p:sp>
+        <p:sp>
+          <p:nvSpPr>
+            <p:cNvPr id="128" name="tx126"/>
+            <p:cNvSpPr/>
+            <p:nvPr/>
+          </p:nvSpPr>
+          <p:spPr>
+            <a:xfrm>
+              <a:off x="9551320" y="4178259"/>
+              <a:ext cx="991164" cy="151959"/>
+            </a:xfrm>
+            <a:prstGeom prst="rect">
+              <a:avLst/>
+            </a:prstGeom>
+            <a:noFill/>
+          </p:spPr>
+          <p:txBody>
+            <a:bodyPr lIns="0" rIns="0" tIns="0" bIns="0" anchorCtr="1" anchor="ctr" wrap="none"/>
+            <a:lstStyle/>
+            <a:p>
+              <a:pPr algn="l" marL="0" marR="0" indent="0">
+                <a:lnSpc>
+                  <a:spcPts val="1300"/>
+                </a:lnSpc>
+                <a:spcBef>
+                  <a:spcPts val="0"/>
+                </a:spcBef>
+                <a:spcAft>
+                  <a:spcPts val="0"/>
+                </a:spcAft>
+              </a:pPr>
+              <a:r>
+                <a:rPr sz="1300">
+                  <a:solidFill>
+                    <a:srgbClr val="000000">
+                      <a:alpha val="100000"/>
+                    </a:srgbClr>
+                  </a:solidFill>
+                  <a:latin typeface="Helvetica"/>
+                  <a:cs typeface="Helvetica"/>
+                </a:rPr>
+                <a:t>0.5 or greater</a:t>
+              </a:r>
+            </a:p>
+          </p:txBody>
+        </p:sp>
+        <p:sp>
+          <p:nvSpPr>
+            <p:cNvPr id="129" name="tx127"/>
+            <p:cNvSpPr/>
+            <p:nvPr/>
+          </p:nvSpPr>
+          <p:spPr>
+            <a:xfrm>
+              <a:off x="9229731" y="4767702"/>
               <a:ext cx="2054479" cy="179244"/>
             </a:xfrm>
             <a:prstGeom prst="rect">
@@ -7919,14 +8497,14 @@
         </p:sp>
         <p:sp>
           <p:nvSpPr>
-            <p:cNvPr id="115" name="pt113"/>
-            <p:cNvSpPr/>
-            <p:nvPr/>
-          </p:nvSpPr>
-          <p:spPr>
-            <a:xfrm>
-              <a:off x="9270392" y="2182855"/>
-              <a:ext cx="138135" cy="138135"/>
+            <p:cNvPr id="130" name="pt128"/>
+            <p:cNvSpPr/>
+            <p:nvPr/>
+          </p:nvSpPr>
+          <p:spPr>
+            <a:xfrm>
+              <a:off x="9308333" y="5173143"/>
+              <a:ext cx="62251" cy="62251"/>
             </a:xfrm>
             <a:prstGeom prst="ellipse">
               <a:avLst/>
@@ -7954,14 +8532,14 @@
         </p:sp>
         <p:sp>
           <p:nvSpPr>
-            <p:cNvPr id="116" name="pt114"/>
-            <p:cNvSpPr/>
-            <p:nvPr/>
-          </p:nvSpPr>
-          <p:spPr>
-            <a:xfrm>
-              <a:off x="9270392" y="2528836"/>
-              <a:ext cx="138135" cy="138135"/>
+            <p:cNvPr id="131" name="pt129"/>
+            <p:cNvSpPr/>
+            <p:nvPr/>
+          </p:nvSpPr>
+          <p:spPr>
+            <a:xfrm>
+              <a:off x="9308333" y="5519124"/>
+              <a:ext cx="62251" cy="62251"/>
             </a:xfrm>
             <a:prstGeom prst="ellipse">
               <a:avLst/>
@@ -7989,13 +8567,13 @@
         </p:sp>
         <p:sp>
           <p:nvSpPr>
-            <p:cNvPr id="117" name="tx115"/>
-            <p:cNvSpPr/>
-            <p:nvPr/>
-          </p:nvSpPr>
-          <p:spPr>
-            <a:xfrm>
-              <a:off x="9518776" y="2155789"/>
+            <p:cNvPr id="132" name="tx130"/>
+            <p:cNvSpPr/>
+            <p:nvPr/>
+          </p:nvSpPr>
+          <p:spPr>
+            <a:xfrm>
+              <a:off x="9518776" y="5108135"/>
               <a:ext cx="881124" cy="155345"/>
             </a:xfrm>
             <a:prstGeom prst="rect">
@@ -8035,13 +8613,13 @@
         </p:sp>
         <p:sp>
           <p:nvSpPr>
-            <p:cNvPr id="118" name="tx116"/>
-            <p:cNvSpPr/>
-            <p:nvPr/>
-          </p:nvSpPr>
-          <p:spPr>
-            <a:xfrm>
-              <a:off x="9518776" y="2501770"/>
+            <p:cNvPr id="133" name="tx131"/>
+            <p:cNvSpPr/>
+            <p:nvPr/>
+          </p:nvSpPr>
+          <p:spPr>
+            <a:xfrm>
+              <a:off x="9518776" y="5454117"/>
               <a:ext cx="853554" cy="155345"/>
             </a:xfrm>
             <a:prstGeom prst="rect">
@@ -8075,528 +8653,6 @@
                   <a:cs typeface="Helvetica"/>
                 </a:rPr>
                 <a:t>Foreground</a:t>
-              </a:r>
-            </a:p>
-          </p:txBody>
-        </p:sp>
-        <p:sp>
-          <p:nvSpPr>
-            <p:cNvPr id="119" name="tx117"/>
-            <p:cNvSpPr/>
-            <p:nvPr/>
-          </p:nvSpPr>
-          <p:spPr>
-            <a:xfrm>
-              <a:off x="9229731" y="3075072"/>
-              <a:ext cx="1895326" cy="182500"/>
-            </a:xfrm>
-            <a:prstGeom prst="rect">
-              <a:avLst/>
-            </a:prstGeom>
-            <a:noFill/>
-          </p:spPr>
-          <p:txBody>
-            <a:bodyPr lIns="0" rIns="0" tIns="0" bIns="0" anchorCtr="1" anchor="ctr" wrap="none"/>
-            <a:lstStyle/>
-            <a:p>
-              <a:pPr algn="l" marL="0" marR="0" indent="0">
-                <a:lnSpc>
-                  <a:spcPts val="1500"/>
-                </a:lnSpc>
-                <a:spcBef>
-                  <a:spcPts val="0"/>
-                </a:spcBef>
-                <a:spcAft>
-                  <a:spcPts val="0"/>
-                </a:spcAft>
-              </a:pPr>
-              <a:r>
-                <a:rPr sz="1500">
-                  <a:solidFill>
-                    <a:srgbClr val="000000">
-                      <a:alpha val="100000"/>
-                    </a:srgbClr>
-                  </a:solidFill>
-                  <a:latin typeface="Helvetica"/>
-                  <a:cs typeface="Helvetica"/>
-                </a:rPr>
-                <a:t>Statistical Significance</a:t>
-              </a:r>
-            </a:p>
-          </p:txBody>
-        </p:sp>
-        <p:sp>
-          <p:nvSpPr>
-            <p:cNvPr id="120" name="pl118"/>
-            <p:cNvSpPr/>
-            <p:nvPr/>
-          </p:nvSpPr>
-          <p:spPr>
-            <a:xfrm>
-              <a:off x="9251677" y="3514894"/>
-              <a:ext cx="175564" cy="0"/>
-            </a:xfrm>
-            <a:custGeom>
-              <a:avLst/>
-              <a:pathLst>
-                <a:path w="175564" h="0">
-                  <a:moveTo>
-                    <a:pt x="0" y="0"/>
-                  </a:moveTo>
-                  <a:lnTo>
-                    <a:pt x="175564" y="0"/>
-                  </a:lnTo>
-                </a:path>
-              </a:pathLst>
-            </a:custGeom>
-            <a:ln w="108405" cap="flat">
-              <a:solidFill>
-                <a:srgbClr val="EEEEEE">
-                  <a:alpha val="100000"/>
-                </a:srgbClr>
-              </a:solidFill>
-              <a:prstDash val="solid"/>
-              <a:round/>
-            </a:ln>
-          </p:spPr>
-          <p:txBody>
-            <a:bodyPr/>
-            <a:lstStyle/>
-            <a:p/>
-          </p:txBody>
-        </p:sp>
-        <p:sp>
-          <p:nvSpPr>
-            <p:cNvPr id="121" name="pl119"/>
-            <p:cNvSpPr/>
-            <p:nvPr/>
-          </p:nvSpPr>
-          <p:spPr>
-            <a:xfrm>
-              <a:off x="9251677" y="3860876"/>
-              <a:ext cx="175564" cy="0"/>
-            </a:xfrm>
-            <a:custGeom>
-              <a:avLst/>
-              <a:pathLst>
-                <a:path w="175564" h="0">
-                  <a:moveTo>
-                    <a:pt x="0" y="0"/>
-                  </a:moveTo>
-                  <a:lnTo>
-                    <a:pt x="175564" y="0"/>
-                  </a:lnTo>
-                </a:path>
-              </a:pathLst>
-            </a:custGeom>
-            <a:ln w="108405" cap="flat">
-              <a:solidFill>
-                <a:srgbClr val="BBBBBB">
-                  <a:alpha val="100000"/>
-                </a:srgbClr>
-              </a:solidFill>
-              <a:prstDash val="solid"/>
-              <a:round/>
-            </a:ln>
-          </p:spPr>
-          <p:txBody>
-            <a:bodyPr/>
-            <a:lstStyle/>
-            <a:p/>
-          </p:txBody>
-        </p:sp>
-        <p:sp>
-          <p:nvSpPr>
-            <p:cNvPr id="122" name="tx120"/>
-            <p:cNvSpPr/>
-            <p:nvPr/>
-          </p:nvSpPr>
-          <p:spPr>
-            <a:xfrm>
-              <a:off x="9518776" y="3452538"/>
-              <a:ext cx="211050" cy="121567"/>
-            </a:xfrm>
-            <a:prstGeom prst="rect">
-              <a:avLst/>
-            </a:prstGeom>
-            <a:noFill/>
-          </p:spPr>
-          <p:txBody>
-            <a:bodyPr lIns="0" rIns="0" tIns="0" bIns="0" anchorCtr="1" anchor="ctr" wrap="none"/>
-            <a:lstStyle/>
-            <a:p>
-              <a:pPr algn="l" marL="0" marR="0" indent="0">
-                <a:lnSpc>
-                  <a:spcPts val="1300"/>
-                </a:lnSpc>
-                <a:spcBef>
-                  <a:spcPts val="0"/>
-                </a:spcBef>
-                <a:spcAft>
-                  <a:spcPts val="0"/>
-                </a:spcAft>
-              </a:pPr>
-              <a:r>
-                <a:rPr sz="1300">
-                  <a:solidFill>
-                    <a:srgbClr val="000000">
-                      <a:alpha val="100000"/>
-                    </a:srgbClr>
-                  </a:solidFill>
-                  <a:latin typeface="Helvetica"/>
-                  <a:cs typeface="Helvetica"/>
-                </a:rPr>
-                <a:t>No</a:t>
-              </a:r>
-            </a:p>
-          </p:txBody>
-        </p:sp>
-        <p:sp>
-          <p:nvSpPr>
-            <p:cNvPr id="123" name="tx121"/>
-            <p:cNvSpPr/>
-            <p:nvPr/>
-          </p:nvSpPr>
-          <p:spPr>
-            <a:xfrm>
-              <a:off x="9518776" y="3798359"/>
-              <a:ext cx="284491" cy="121729"/>
-            </a:xfrm>
-            <a:prstGeom prst="rect">
-              <a:avLst/>
-            </a:prstGeom>
-            <a:noFill/>
-          </p:spPr>
-          <p:txBody>
-            <a:bodyPr lIns="0" rIns="0" tIns="0" bIns="0" anchorCtr="1" anchor="ctr" wrap="none"/>
-            <a:lstStyle/>
-            <a:p>
-              <a:pPr algn="l" marL="0" marR="0" indent="0">
-                <a:lnSpc>
-                  <a:spcPts val="1300"/>
-                </a:lnSpc>
-                <a:spcBef>
-                  <a:spcPts val="0"/>
-                </a:spcBef>
-                <a:spcAft>
-                  <a:spcPts val="0"/>
-                </a:spcAft>
-              </a:pPr>
-              <a:r>
-                <a:rPr sz="1300">
-                  <a:solidFill>
-                    <a:srgbClr val="000000">
-                      <a:alpha val="100000"/>
-                    </a:srgbClr>
-                  </a:solidFill>
-                  <a:latin typeface="Helvetica"/>
-                  <a:cs typeface="Helvetica"/>
-                </a:rPr>
-                <a:t>Yes</a:t>
-              </a:r>
-            </a:p>
-          </p:txBody>
-        </p:sp>
-        <p:sp>
-          <p:nvSpPr>
-            <p:cNvPr id="124" name="tx122"/>
-            <p:cNvSpPr/>
-            <p:nvPr/>
-          </p:nvSpPr>
-          <p:spPr>
-            <a:xfrm>
-              <a:off x="9229731" y="4339346"/>
-              <a:ext cx="942454" cy="181198"/>
-            </a:xfrm>
-            <a:prstGeom prst="rect">
-              <a:avLst/>
-            </a:prstGeom>
-            <a:noFill/>
-          </p:spPr>
-          <p:txBody>
-            <a:bodyPr lIns="0" rIns="0" tIns="0" bIns="0" anchorCtr="1" anchor="ctr" wrap="none"/>
-            <a:lstStyle/>
-            <a:p>
-              <a:pPr algn="l" marL="0" marR="0" indent="0">
-                <a:lnSpc>
-                  <a:spcPts val="1500"/>
-                </a:lnSpc>
-                <a:spcBef>
-                  <a:spcPts val="0"/>
-                </a:spcBef>
-                <a:spcAft>
-                  <a:spcPts val="0"/>
-                </a:spcAft>
-              </a:pPr>
-              <a:r>
-                <a:rPr sz="1500">
-                  <a:solidFill>
-                    <a:srgbClr val="000000">
-                      <a:alpha val="100000"/>
-                    </a:srgbClr>
-                  </a:solidFill>
-                  <a:latin typeface="Helvetica"/>
-                  <a:cs typeface="Helvetica"/>
-                </a:rPr>
-                <a:t>Gene Type</a:t>
-              </a:r>
-            </a:p>
-          </p:txBody>
-        </p:sp>
-        <p:sp>
-          <p:nvSpPr>
-            <p:cNvPr id="125" name="pl123"/>
-            <p:cNvSpPr/>
-            <p:nvPr/>
-          </p:nvSpPr>
-          <p:spPr>
-            <a:xfrm>
-              <a:off x="9251677" y="4777866"/>
-              <a:ext cx="175564" cy="0"/>
-            </a:xfrm>
-            <a:custGeom>
-              <a:avLst/>
-              <a:pathLst>
-                <a:path w="175564" h="0">
-                  <a:moveTo>
-                    <a:pt x="0" y="0"/>
-                  </a:moveTo>
-                  <a:lnTo>
-                    <a:pt x="175564" y="0"/>
-                  </a:lnTo>
-                </a:path>
-              </a:pathLst>
-            </a:custGeom>
-            <a:ln w="108405" cap="flat">
-              <a:solidFill>
-                <a:srgbClr val="1463AB">
-                  <a:alpha val="100000"/>
-                </a:srgbClr>
-              </a:solidFill>
-              <a:prstDash val="solid"/>
-              <a:round/>
-            </a:ln>
-          </p:spPr>
-          <p:txBody>
-            <a:bodyPr/>
-            <a:lstStyle/>
-            <a:p/>
-          </p:txBody>
-        </p:sp>
-        <p:sp>
-          <p:nvSpPr>
-            <p:cNvPr id="126" name="pl124"/>
-            <p:cNvSpPr/>
-            <p:nvPr/>
-          </p:nvSpPr>
-          <p:spPr>
-            <a:xfrm>
-              <a:off x="9251677" y="5123848"/>
-              <a:ext cx="175564" cy="0"/>
-            </a:xfrm>
-            <a:custGeom>
-              <a:avLst/>
-              <a:pathLst>
-                <a:path w="175564" h="0">
-                  <a:moveTo>
-                    <a:pt x="0" y="0"/>
-                  </a:moveTo>
-                  <a:lnTo>
-                    <a:pt x="175564" y="0"/>
-                  </a:lnTo>
-                </a:path>
-              </a:pathLst>
-            </a:custGeom>
-            <a:ln w="108405" cap="flat">
-              <a:solidFill>
-                <a:srgbClr val="DF232A">
-                  <a:alpha val="100000"/>
-                </a:srgbClr>
-              </a:solidFill>
-              <a:prstDash val="solid"/>
-              <a:round/>
-            </a:ln>
-          </p:spPr>
-          <p:txBody>
-            <a:bodyPr/>
-            <a:lstStyle/>
-            <a:p/>
-          </p:txBody>
-        </p:sp>
-        <p:sp>
-          <p:nvSpPr>
-            <p:cNvPr id="127" name="pl125"/>
-            <p:cNvSpPr/>
-            <p:nvPr/>
-          </p:nvSpPr>
-          <p:spPr>
-            <a:xfrm>
-              <a:off x="9251677" y="5469829"/>
-              <a:ext cx="175564" cy="0"/>
-            </a:xfrm>
-            <a:custGeom>
-              <a:avLst/>
-              <a:pathLst>
-                <a:path w="175564" h="0">
-                  <a:moveTo>
-                    <a:pt x="0" y="0"/>
-                  </a:moveTo>
-                  <a:lnTo>
-                    <a:pt x="175564" y="0"/>
-                  </a:lnTo>
-                </a:path>
-              </a:pathLst>
-            </a:custGeom>
-            <a:ln w="108405" cap="flat">
-              <a:solidFill>
-                <a:srgbClr val="626364">
-                  <a:alpha val="100000"/>
-                </a:srgbClr>
-              </a:solidFill>
-              <a:prstDash val="solid"/>
-              <a:round/>
-            </a:ln>
-          </p:spPr>
-          <p:txBody>
-            <a:bodyPr/>
-            <a:lstStyle/>
-            <a:p/>
-          </p:txBody>
-        </p:sp>
-        <p:sp>
-          <p:nvSpPr>
-            <p:cNvPr id="128" name="tx126"/>
-            <p:cNvSpPr/>
-            <p:nvPr/>
-          </p:nvSpPr>
-          <p:spPr>
-            <a:xfrm>
-              <a:off x="9518776" y="4715107"/>
-              <a:ext cx="339631" cy="121970"/>
-            </a:xfrm>
-            <a:prstGeom prst="rect">
-              <a:avLst/>
-            </a:prstGeom>
-            <a:noFill/>
-          </p:spPr>
-          <p:txBody>
-            <a:bodyPr lIns="0" rIns="0" tIns="0" bIns="0" anchorCtr="1" anchor="ctr" wrap="none"/>
-            <a:lstStyle/>
-            <a:p>
-              <a:pPr algn="l" marL="0" marR="0" indent="0">
-                <a:lnSpc>
-                  <a:spcPts val="1300"/>
-                </a:lnSpc>
-                <a:spcBef>
-                  <a:spcPts val="0"/>
-                </a:spcBef>
-                <a:spcAft>
-                  <a:spcPts val="0"/>
-                </a:spcAft>
-              </a:pPr>
-              <a:r>
-                <a:rPr sz="1300">
-                  <a:solidFill>
-                    <a:srgbClr val="000000">
-                      <a:alpha val="100000"/>
-                    </a:srgbClr>
-                  </a:solidFill>
-                  <a:latin typeface="Helvetica"/>
-                  <a:cs typeface="Helvetica"/>
-                </a:rPr>
-                <a:t>Both</a:t>
-              </a:r>
-            </a:p>
-          </p:txBody>
-        </p:sp>
-        <p:sp>
-          <p:nvSpPr>
-            <p:cNvPr id="129" name="tx127"/>
-            <p:cNvSpPr/>
-            <p:nvPr/>
-          </p:nvSpPr>
-          <p:spPr>
-            <a:xfrm>
-              <a:off x="9518776" y="5058267"/>
-              <a:ext cx="394692" cy="124792"/>
-            </a:xfrm>
-            <a:prstGeom prst="rect">
-              <a:avLst/>
-            </a:prstGeom>
-            <a:noFill/>
-          </p:spPr>
-          <p:txBody>
-            <a:bodyPr lIns="0" rIns="0" tIns="0" bIns="0" anchorCtr="1" anchor="ctr" wrap="none"/>
-            <a:lstStyle/>
-            <a:p>
-              <a:pPr algn="l" marL="0" marR="0" indent="0">
-                <a:lnSpc>
-                  <a:spcPts val="1300"/>
-                </a:lnSpc>
-                <a:spcBef>
-                  <a:spcPts val="0"/>
-                </a:spcBef>
-                <a:spcAft>
-                  <a:spcPts val="0"/>
-                </a:spcAft>
-              </a:pPr>
-              <a:r>
-                <a:rPr sz="1300">
-                  <a:solidFill>
-                    <a:srgbClr val="000000">
-                      <a:alpha val="100000"/>
-                    </a:srgbClr>
-                  </a:solidFill>
-                  <a:latin typeface="Helvetica"/>
-                  <a:cs typeface="Helvetica"/>
-                </a:rPr>
-                <a:t>Cone</a:t>
-              </a:r>
-            </a:p>
-          </p:txBody>
-        </p:sp>
-        <p:sp>
-          <p:nvSpPr>
-            <p:cNvPr id="130" name="tx128"/>
-            <p:cNvSpPr/>
-            <p:nvPr/>
-          </p:nvSpPr>
-          <p:spPr>
-            <a:xfrm>
-              <a:off x="9518776" y="5407070"/>
-              <a:ext cx="302871" cy="121970"/>
-            </a:xfrm>
-            <a:prstGeom prst="rect">
-              <a:avLst/>
-            </a:prstGeom>
-            <a:noFill/>
-          </p:spPr>
-          <p:txBody>
-            <a:bodyPr lIns="0" rIns="0" tIns="0" bIns="0" anchorCtr="1" anchor="ctr" wrap="none"/>
-            <a:lstStyle/>
-            <a:p>
-              <a:pPr algn="l" marL="0" marR="0" indent="0">
-                <a:lnSpc>
-                  <a:spcPts val="1300"/>
-                </a:lnSpc>
-                <a:spcBef>
-                  <a:spcPts val="0"/>
-                </a:spcBef>
-                <a:spcAft>
-                  <a:spcPts val="0"/>
-                </a:spcAft>
-              </a:pPr>
-              <a:r>
-                <a:rPr sz="1300">
-                  <a:solidFill>
-                    <a:srgbClr val="000000">
-                      <a:alpha val="100000"/>
-                    </a:srgbClr>
-                  </a:solidFill>
-                  <a:latin typeface="Helvetica"/>
-                  <a:cs typeface="Helvetica"/>
-                </a:rPr>
-                <a:t>Rod</a:t>
               </a:r>
             </a:p>
           </p:txBody>

</xml_diff>

<commit_message>
Changes made in the presentation pptx.
</commit_message>
<xml_diff>
--- a/Ball_and_stick_graph/Presentation.pptx
+++ b/Ball_and_stick_graph/Presentation.pptx
@@ -261,7 +261,7 @@
           <a:p>
             <a:fld id="{35E44566-E169-1B43-A35F-0A8894463DC4}" type="datetimeFigureOut">
               <a:rPr lang="en-TH" smtClean="0"/>
-              <a:t>13/6/2024 R</a:t>
+              <a:t>19/7/2024 R</a:t>
             </a:fld>
             <a:endParaRPr lang="en-TH"/>
           </a:p>
@@ -461,7 +461,7 @@
           <a:p>
             <a:fld id="{35E44566-E169-1B43-A35F-0A8894463DC4}" type="datetimeFigureOut">
               <a:rPr lang="en-TH" smtClean="0"/>
-              <a:t>13/6/2024 R</a:t>
+              <a:t>19/7/2024 R</a:t>
             </a:fld>
             <a:endParaRPr lang="en-TH"/>
           </a:p>
@@ -671,7 +671,7 @@
           <a:p>
             <a:fld id="{35E44566-E169-1B43-A35F-0A8894463DC4}" type="datetimeFigureOut">
               <a:rPr lang="en-TH" smtClean="0"/>
-              <a:t>13/6/2024 R</a:t>
+              <a:t>19/7/2024 R</a:t>
             </a:fld>
             <a:endParaRPr lang="en-TH"/>
           </a:p>
@@ -871,7 +871,7 @@
           <a:p>
             <a:fld id="{35E44566-E169-1B43-A35F-0A8894463DC4}" type="datetimeFigureOut">
               <a:rPr lang="en-TH" smtClean="0"/>
-              <a:t>13/6/2024 R</a:t>
+              <a:t>19/7/2024 R</a:t>
             </a:fld>
             <a:endParaRPr lang="en-TH"/>
           </a:p>
@@ -1147,7 +1147,7 @@
           <a:p>
             <a:fld id="{35E44566-E169-1B43-A35F-0A8894463DC4}" type="datetimeFigureOut">
               <a:rPr lang="en-TH" smtClean="0"/>
-              <a:t>13/6/2024 R</a:t>
+              <a:t>19/7/2024 R</a:t>
             </a:fld>
             <a:endParaRPr lang="en-TH"/>
           </a:p>
@@ -1415,7 +1415,7 @@
           <a:p>
             <a:fld id="{35E44566-E169-1B43-A35F-0A8894463DC4}" type="datetimeFigureOut">
               <a:rPr lang="en-TH" smtClean="0"/>
-              <a:t>13/6/2024 R</a:t>
+              <a:t>19/7/2024 R</a:t>
             </a:fld>
             <a:endParaRPr lang="en-TH"/>
           </a:p>
@@ -1830,7 +1830,7 @@
           <a:p>
             <a:fld id="{35E44566-E169-1B43-A35F-0A8894463DC4}" type="datetimeFigureOut">
               <a:rPr lang="en-TH" smtClean="0"/>
-              <a:t>13/6/2024 R</a:t>
+              <a:t>19/7/2024 R</a:t>
             </a:fld>
             <a:endParaRPr lang="en-TH"/>
           </a:p>
@@ -1972,7 +1972,7 @@
           <a:p>
             <a:fld id="{35E44566-E169-1B43-A35F-0A8894463DC4}" type="datetimeFigureOut">
               <a:rPr lang="en-TH" smtClean="0"/>
-              <a:t>13/6/2024 R</a:t>
+              <a:t>19/7/2024 R</a:t>
             </a:fld>
             <a:endParaRPr lang="en-TH"/>
           </a:p>
@@ -2085,7 +2085,7 @@
           <a:p>
             <a:fld id="{35E44566-E169-1B43-A35F-0A8894463DC4}" type="datetimeFigureOut">
               <a:rPr lang="en-TH" smtClean="0"/>
-              <a:t>13/6/2024 R</a:t>
+              <a:t>19/7/2024 R</a:t>
             </a:fld>
             <a:endParaRPr lang="en-TH"/>
           </a:p>
@@ -2398,7 +2398,7 @@
           <a:p>
             <a:fld id="{35E44566-E169-1B43-A35F-0A8894463DC4}" type="datetimeFigureOut">
               <a:rPr lang="en-TH" smtClean="0"/>
-              <a:t>13/6/2024 R</a:t>
+              <a:t>19/7/2024 R</a:t>
             </a:fld>
             <a:endParaRPr lang="en-TH"/>
           </a:p>
@@ -2687,7 +2687,7 @@
           <a:p>
             <a:fld id="{35E44566-E169-1B43-A35F-0A8894463DC4}" type="datetimeFigureOut">
               <a:rPr lang="en-TH" smtClean="0"/>
-              <a:t>13/6/2024 R</a:t>
+              <a:t>19/7/2024 R</a:t>
             </a:fld>
             <a:endParaRPr lang="en-TH"/>
           </a:p>
@@ -2930,7 +2930,7 @@
           <a:p>
             <a:fld id="{35E44566-E169-1B43-A35F-0A8894463DC4}" type="datetimeFigureOut">
               <a:rPr lang="en-TH" smtClean="0"/>
-              <a:t>13/6/2024 R</a:t>
+              <a:t>19/7/2024 R</a:t>
             </a:fld>
             <a:endParaRPr lang="en-TH"/>
           </a:p>
@@ -3347,57 +3347,7 @@
           <a:chExt cx="0" cy="0"/>
         </a:xfrm>
       </p:grpSpPr>
-      <p:sp>
-        <p:nvSpPr>
-          <p:cNvPr id="2" name="Title 1">
-            <a:extLst>
-              <a:ext uri="{FF2B5EF4-FFF2-40B4-BE49-F238E27FC236}">
-                <a16:creationId xmlns:a16="http://schemas.microsoft.com/office/drawing/2014/main" id="{61B28FBF-5C0F-E98C-24F3-55F7162AC3A3}"/>
-              </a:ext>
-            </a:extLst>
-          </p:cNvPr>
-          <p:cNvSpPr>
-            <a:spLocks noGrp="1"/>
-          </p:cNvSpPr>
-          <p:nvPr>
-            <p:ph type="title"/>
-          </p:nvPr>
-        </p:nvSpPr>
-        <p:spPr/>
-        <p:txBody>
-          <a:bodyPr/>
-          <a:lstStyle/>
-          <a:p>
-            <a:endParaRPr lang="en-TH"/>
-          </a:p>
-        </p:txBody>
-      </p:sp>
-      <p:sp>
-        <p:nvSpPr>
-          <p:cNvPr id="3" name="R Placeholder">
-            <a:extLst>
-              <a:ext uri="{FF2B5EF4-FFF2-40B4-BE49-F238E27FC236}">
-                <a16:creationId xmlns:a16="http://schemas.microsoft.com/office/drawing/2014/main" id="{D7CE09C2-8FF9-2597-A53C-C11345D67C50}"/>
-              </a:ext>
-            </a:extLst>
-          </p:cNvPr>
-          <p:cNvSpPr>
-            <a:spLocks noGrp="1"/>
-          </p:cNvSpPr>
-          <p:nvPr>
-            <p:ph idx="1"/>
-          </p:nvPr>
-        </p:nvSpPr>
-        <p:spPr/>
-        <p:txBody>
-          <a:bodyPr/>
-          <a:lstStyle/>
-          <a:p>
-            <a:endParaRPr lang="en-TH"/>
-          </a:p>
-        </p:txBody>
-      </p:sp>
-      <p:grpSp xmlns:pic="http://schemas.openxmlformats.org/drawingml/2006/picture">
+      <p:grpSp>
         <p:nvGrpSpPr>
           <p:cNvPr id="4" name="R Placeholder"/>
           <p:cNvGrpSpPr/>
@@ -3443,7 +3393,9 @@
           <p:txBody>
             <a:bodyPr/>
             <a:lstStyle/>
-            <a:p/>
+            <a:p>
+              <a:endParaRPr/>
+            </a:p>
           </p:txBody>
         </p:sp>
         <p:sp>
@@ -3459,8 +3411,12 @@
             </a:xfrm>
             <a:custGeom>
               <a:avLst/>
+              <a:gdLst/>
+              <a:ahLst/>
+              <a:cxnLst/>
+              <a:rect l="0" t="0" r="0" b="0"/>
               <a:pathLst>
-                <a:path w="6319447" h="0">
+                <a:path w="6319447">
                   <a:moveTo>
                     <a:pt x="0" y="0"/>
                   </a:moveTo>
@@ -3486,7 +3442,9 @@
           <p:txBody>
             <a:bodyPr/>
             <a:lstStyle/>
-            <a:p/>
+            <a:p>
+              <a:endParaRPr/>
+            </a:p>
           </p:txBody>
         </p:sp>
         <p:sp>
@@ -3502,8 +3460,12 @@
             </a:xfrm>
             <a:custGeom>
               <a:avLst/>
+              <a:gdLst/>
+              <a:ahLst/>
+              <a:cxnLst/>
+              <a:rect l="0" t="0" r="0" b="0"/>
               <a:pathLst>
-                <a:path w="6319447" h="0">
+                <a:path w="6319447">
                   <a:moveTo>
                     <a:pt x="0" y="0"/>
                   </a:moveTo>
@@ -3529,7 +3491,9 @@
           <p:txBody>
             <a:bodyPr/>
             <a:lstStyle/>
-            <a:p/>
+            <a:p>
+              <a:endParaRPr/>
+            </a:p>
           </p:txBody>
         </p:sp>
         <p:sp>
@@ -3545,8 +3509,12 @@
             </a:xfrm>
             <a:custGeom>
               <a:avLst/>
+              <a:gdLst/>
+              <a:ahLst/>
+              <a:cxnLst/>
+              <a:rect l="0" t="0" r="0" b="0"/>
               <a:pathLst>
-                <a:path w="2257894" h="0">
+                <a:path w="2257894">
                   <a:moveTo>
                     <a:pt x="2257894" y="0"/>
                   </a:moveTo>
@@ -3569,7 +3537,9 @@
           <p:txBody>
             <a:bodyPr/>
             <a:lstStyle/>
-            <a:p/>
+            <a:p>
+              <a:endParaRPr/>
+            </a:p>
           </p:txBody>
         </p:sp>
         <p:sp>
@@ -3585,8 +3555,12 @@
             </a:xfrm>
             <a:custGeom>
               <a:avLst/>
+              <a:gdLst/>
+              <a:ahLst/>
+              <a:cxnLst/>
+              <a:rect l="0" t="0" r="0" b="0"/>
               <a:pathLst>
-                <a:path w="550947" h="0">
+                <a:path w="550947">
                   <a:moveTo>
                     <a:pt x="0" y="0"/>
                   </a:moveTo>
@@ -3609,7 +3583,9 @@
           <p:txBody>
             <a:bodyPr/>
             <a:lstStyle/>
-            <a:p/>
+            <a:p>
+              <a:endParaRPr/>
+            </a:p>
           </p:txBody>
         </p:sp>
         <p:sp>
@@ -3625,8 +3601,12 @@
             </a:xfrm>
             <a:custGeom>
               <a:avLst/>
+              <a:gdLst/>
+              <a:ahLst/>
+              <a:cxnLst/>
+              <a:rect l="0" t="0" r="0" b="0"/>
               <a:pathLst>
-                <a:path w="0" h="793268">
+                <a:path h="793268">
                   <a:moveTo>
                     <a:pt x="0" y="793268"/>
                   </a:moveTo>
@@ -3649,7 +3629,9 @@
           <p:txBody>
             <a:bodyPr/>
             <a:lstStyle/>
-            <a:p/>
+            <a:p>
+              <a:endParaRPr/>
+            </a:p>
           </p:txBody>
         </p:sp>
         <p:sp>
@@ -3665,8 +3647,12 @@
             </a:xfrm>
             <a:custGeom>
               <a:avLst/>
+              <a:gdLst/>
+              <a:ahLst/>
+              <a:cxnLst/>
+              <a:rect l="0" t="0" r="0" b="0"/>
               <a:pathLst>
-                <a:path w="0" h="793268">
+                <a:path h="793268">
                   <a:moveTo>
                     <a:pt x="0" y="793268"/>
                   </a:moveTo>
@@ -3689,7 +3675,9 @@
           <p:txBody>
             <a:bodyPr/>
             <a:lstStyle/>
-            <a:p/>
+            <a:p>
+              <a:endParaRPr/>
+            </a:p>
           </p:txBody>
         </p:sp>
         <p:sp>
@@ -3705,8 +3693,12 @@
             </a:xfrm>
             <a:custGeom>
               <a:avLst/>
+              <a:gdLst/>
+              <a:ahLst/>
+              <a:cxnLst/>
+              <a:rect l="0" t="0" r="0" b="0"/>
               <a:pathLst>
-                <a:path w="0" h="793268">
+                <a:path h="793268">
                   <a:moveTo>
                     <a:pt x="0" y="793268"/>
                   </a:moveTo>
@@ -3729,7 +3721,9 @@
           <p:txBody>
             <a:bodyPr/>
             <a:lstStyle/>
-            <a:p/>
+            <a:p>
+              <a:endParaRPr/>
+            </a:p>
           </p:txBody>
         </p:sp>
         <p:sp>
@@ -3745,8 +3739,12 @@
             </a:xfrm>
             <a:custGeom>
               <a:avLst/>
+              <a:gdLst/>
+              <a:ahLst/>
+              <a:cxnLst/>
+              <a:rect l="0" t="0" r="0" b="0"/>
               <a:pathLst>
-                <a:path w="0" h="793268">
+                <a:path h="793268">
                   <a:moveTo>
                     <a:pt x="0" y="793268"/>
                   </a:moveTo>
@@ -3769,7 +3767,9 @@
           <p:txBody>
             <a:bodyPr/>
             <a:lstStyle/>
-            <a:p/>
+            <a:p>
+              <a:endParaRPr/>
+            </a:p>
           </p:txBody>
         </p:sp>
         <p:sp>
@@ -3785,8 +3785,12 @@
             </a:xfrm>
             <a:custGeom>
               <a:avLst/>
+              <a:gdLst/>
+              <a:ahLst/>
+              <a:cxnLst/>
+              <a:rect l="0" t="0" r="0" b="0"/>
               <a:pathLst>
-                <a:path w="0" h="793268">
+                <a:path h="793268">
                   <a:moveTo>
                     <a:pt x="0" y="793268"/>
                   </a:moveTo>
@@ -3809,7 +3813,9 @@
           <p:txBody>
             <a:bodyPr/>
             <a:lstStyle/>
-            <a:p/>
+            <a:p>
+              <a:endParaRPr/>
+            </a:p>
           </p:txBody>
         </p:sp>
         <p:sp>
@@ -3825,8 +3831,12 @@
             </a:xfrm>
             <a:custGeom>
               <a:avLst/>
+              <a:gdLst/>
+              <a:ahLst/>
+              <a:cxnLst/>
+              <a:rect l="0" t="0" r="0" b="0"/>
               <a:pathLst>
-                <a:path w="0" h="793268">
+                <a:path h="793268">
                   <a:moveTo>
                     <a:pt x="0" y="793268"/>
                   </a:moveTo>
@@ -3849,7 +3859,9 @@
           <p:txBody>
             <a:bodyPr/>
             <a:lstStyle/>
-            <a:p/>
+            <a:p>
+              <a:endParaRPr/>
+            </a:p>
           </p:txBody>
         </p:sp>
         <p:sp>
@@ -3865,8 +3877,12 @@
             </a:xfrm>
             <a:custGeom>
               <a:avLst/>
+              <a:gdLst/>
+              <a:ahLst/>
+              <a:cxnLst/>
+              <a:rect l="0" t="0" r="0" b="0"/>
               <a:pathLst>
-                <a:path w="0" h="793268">
+                <a:path h="793268">
                   <a:moveTo>
                     <a:pt x="0" y="793268"/>
                   </a:moveTo>
@@ -3889,7 +3905,9 @@
           <p:txBody>
             <a:bodyPr/>
             <a:lstStyle/>
-            <a:p/>
+            <a:p>
+              <a:endParaRPr/>
+            </a:p>
           </p:txBody>
         </p:sp>
         <p:sp>
@@ -3905,8 +3923,12 @@
             </a:xfrm>
             <a:custGeom>
               <a:avLst/>
+              <a:gdLst/>
+              <a:ahLst/>
+              <a:cxnLst/>
+              <a:rect l="0" t="0" r="0" b="0"/>
               <a:pathLst>
-                <a:path w="0" h="793268">
+                <a:path h="793268">
                   <a:moveTo>
                     <a:pt x="0" y="793268"/>
                   </a:moveTo>
@@ -3929,7 +3951,9 @@
           <p:txBody>
             <a:bodyPr/>
             <a:lstStyle/>
-            <a:p/>
+            <a:p>
+              <a:endParaRPr/>
+            </a:p>
           </p:txBody>
         </p:sp>
         <p:sp>
@@ -3945,8 +3969,12 @@
             </a:xfrm>
             <a:custGeom>
               <a:avLst/>
+              <a:gdLst/>
+              <a:ahLst/>
+              <a:cxnLst/>
+              <a:rect l="0" t="0" r="0" b="0"/>
               <a:pathLst>
-                <a:path w="0" h="793268">
+                <a:path h="793268">
                   <a:moveTo>
                     <a:pt x="0" y="793268"/>
                   </a:moveTo>
@@ -3969,7 +3997,9 @@
           <p:txBody>
             <a:bodyPr/>
             <a:lstStyle/>
-            <a:p/>
+            <a:p>
+              <a:endParaRPr/>
+            </a:p>
           </p:txBody>
         </p:sp>
         <p:sp>
@@ -3985,8 +4015,12 @@
             </a:xfrm>
             <a:custGeom>
               <a:avLst/>
+              <a:gdLst/>
+              <a:ahLst/>
+              <a:cxnLst/>
+              <a:rect l="0" t="0" r="0" b="0"/>
               <a:pathLst>
-                <a:path w="0" h="793268">
+                <a:path h="793268">
                   <a:moveTo>
                     <a:pt x="0" y="793268"/>
                   </a:moveTo>
@@ -4009,7 +4043,9 @@
           <p:txBody>
             <a:bodyPr/>
             <a:lstStyle/>
-            <a:p/>
+            <a:p>
+              <a:endParaRPr/>
+            </a:p>
           </p:txBody>
         </p:sp>
         <p:sp>
@@ -4025,8 +4061,12 @@
             </a:xfrm>
             <a:custGeom>
               <a:avLst/>
+              <a:gdLst/>
+              <a:ahLst/>
+              <a:cxnLst/>
+              <a:rect l="0" t="0" r="0" b="0"/>
               <a:pathLst>
-                <a:path w="0" h="793268">
+                <a:path h="793268">
                   <a:moveTo>
                     <a:pt x="0" y="793268"/>
                   </a:moveTo>
@@ -4049,7 +4089,9 @@
           <p:txBody>
             <a:bodyPr/>
             <a:lstStyle/>
-            <a:p/>
+            <a:p>
+              <a:endParaRPr/>
+            </a:p>
           </p:txBody>
         </p:sp>
         <p:sp>
@@ -4060,8 +4102,8 @@
           </p:nvSpPr>
           <p:spPr>
             <a:xfrm>
-              <a:off x="6058708" y="1936316"/>
-              <a:ext cx="211308" cy="211308"/>
+              <a:off x="6085809" y="1963417"/>
+              <a:ext cx="157106" cy="157106"/>
             </a:xfrm>
             <a:prstGeom prst="ellipse">
               <a:avLst/>
@@ -4084,7 +4126,9 @@
           <p:txBody>
             <a:bodyPr/>
             <a:lstStyle/>
-            <a:p/>
+            <a:p>
+              <a:endParaRPr/>
+            </a:p>
           </p:txBody>
         </p:sp>
         <p:sp>
@@ -4095,8 +4139,8 @@
           </p:nvSpPr>
           <p:spPr>
             <a:xfrm>
-              <a:off x="6609655" y="1936316"/>
-              <a:ext cx="211308" cy="211308"/>
+              <a:off x="6636757" y="1963417"/>
+              <a:ext cx="157106" cy="157106"/>
             </a:xfrm>
             <a:prstGeom prst="ellipse">
               <a:avLst/>
@@ -4119,7 +4163,9 @@
           <p:txBody>
             <a:bodyPr/>
             <a:lstStyle/>
-            <a:p/>
+            <a:p>
+              <a:endParaRPr/>
+            </a:p>
           </p:txBody>
         </p:sp>
         <p:sp>
@@ -4130,8 +4176,8 @@
           </p:nvSpPr>
           <p:spPr>
             <a:xfrm>
-              <a:off x="7286283" y="2296893"/>
-              <a:ext cx="211308" cy="211308"/>
+              <a:off x="7313384" y="2323994"/>
+              <a:ext cx="157106" cy="157106"/>
             </a:xfrm>
             <a:prstGeom prst="ellipse">
               <a:avLst/>
@@ -4154,7 +4200,9 @@
           <p:txBody>
             <a:bodyPr/>
             <a:lstStyle/>
-            <a:p/>
+            <a:p>
+              <a:endParaRPr/>
+            </a:p>
           </p:txBody>
         </p:sp>
         <p:sp>
@@ -4165,8 +4213,8 @@
           </p:nvSpPr>
           <p:spPr>
             <a:xfrm>
-              <a:off x="5028389" y="2296893"/>
-              <a:ext cx="211308" cy="211308"/>
+              <a:off x="5055490" y="2323994"/>
+              <a:ext cx="157106" cy="157106"/>
             </a:xfrm>
             <a:prstGeom prst="ellipse">
               <a:avLst/>
@@ -4189,7 +4237,9 @@
           <p:txBody>
             <a:bodyPr/>
             <a:lstStyle/>
-            <a:p/>
+            <a:p>
+              <a:endParaRPr/>
+            </a:p>
           </p:txBody>
         </p:sp>
         <p:sp>
@@ -4205,8 +4255,12 @@
             </a:xfrm>
             <a:custGeom>
               <a:avLst/>
+              <a:gdLst/>
+              <a:ahLst/>
+              <a:cxnLst/>
+              <a:rect l="0" t="0" r="0" b="0"/>
               <a:pathLst>
-                <a:path w="6319447" h="0">
+                <a:path w="6319447">
                   <a:moveTo>
                     <a:pt x="0" y="0"/>
                   </a:moveTo>
@@ -4232,7 +4286,9 @@
           <p:txBody>
             <a:bodyPr/>
             <a:lstStyle/>
-            <a:p/>
+            <a:p>
+              <a:endParaRPr/>
+            </a:p>
           </p:txBody>
         </p:sp>
         <p:sp>
@@ -4248,8 +4304,12 @@
             </a:xfrm>
             <a:custGeom>
               <a:avLst/>
+              <a:gdLst/>
+              <a:ahLst/>
+              <a:cxnLst/>
+              <a:rect l="0" t="0" r="0" b="0"/>
               <a:pathLst>
-                <a:path w="6319447" h="0">
+                <a:path w="6319447">
                   <a:moveTo>
                     <a:pt x="0" y="0"/>
                   </a:moveTo>
@@ -4275,7 +4335,9 @@
           <p:txBody>
             <a:bodyPr/>
             <a:lstStyle/>
-            <a:p/>
+            <a:p>
+              <a:endParaRPr/>
+            </a:p>
           </p:txBody>
         </p:sp>
         <p:sp>
@@ -4291,8 +4353,12 @@
             </a:xfrm>
             <a:custGeom>
               <a:avLst/>
+              <a:gdLst/>
+              <a:ahLst/>
+              <a:cxnLst/>
+              <a:rect l="0" t="0" r="0" b="0"/>
               <a:pathLst>
-                <a:path w="6319447" h="0">
+                <a:path w="6319447">
                   <a:moveTo>
                     <a:pt x="0" y="0"/>
                   </a:moveTo>
@@ -4318,7 +4384,9 @@
           <p:txBody>
             <a:bodyPr/>
             <a:lstStyle/>
-            <a:p/>
+            <a:p>
+              <a:endParaRPr/>
+            </a:p>
           </p:txBody>
         </p:sp>
         <p:sp>
@@ -4334,8 +4402,12 @@
             </a:xfrm>
             <a:custGeom>
               <a:avLst/>
+              <a:gdLst/>
+              <a:ahLst/>
+              <a:cxnLst/>
+              <a:rect l="0" t="0" r="0" b="0"/>
               <a:pathLst>
-                <a:path w="6319447" h="0">
+                <a:path w="6319447">
                   <a:moveTo>
                     <a:pt x="0" y="0"/>
                   </a:moveTo>
@@ -4361,7 +4433,9 @@
           <p:txBody>
             <a:bodyPr/>
             <a:lstStyle/>
-            <a:p/>
+            <a:p>
+              <a:endParaRPr/>
+            </a:p>
           </p:txBody>
         </p:sp>
         <p:sp>
@@ -4377,8 +4451,12 @@
             </a:xfrm>
             <a:custGeom>
               <a:avLst/>
+              <a:gdLst/>
+              <a:ahLst/>
+              <a:cxnLst/>
+              <a:rect l="0" t="0" r="0" b="0"/>
               <a:pathLst>
-                <a:path w="4267839" h="0">
+                <a:path w="4267839">
                   <a:moveTo>
                     <a:pt x="4267839" y="0"/>
                   </a:moveTo>
@@ -4401,7 +4479,9 @@
           <p:txBody>
             <a:bodyPr/>
             <a:lstStyle/>
-            <a:p/>
+            <a:p>
+              <a:endParaRPr/>
+            </a:p>
           </p:txBody>
         </p:sp>
         <p:sp>
@@ -4417,8 +4497,12 @@
             </a:xfrm>
             <a:custGeom>
               <a:avLst/>
+              <a:gdLst/>
+              <a:ahLst/>
+              <a:cxnLst/>
+              <a:rect l="0" t="0" r="0" b="0"/>
               <a:pathLst>
-                <a:path w="3126152" h="0">
+                <a:path w="3126152">
                   <a:moveTo>
                     <a:pt x="0" y="0"/>
                   </a:moveTo>
@@ -4441,7 +4525,9 @@
           <p:txBody>
             <a:bodyPr/>
             <a:lstStyle/>
-            <a:p/>
+            <a:p>
+              <a:endParaRPr/>
+            </a:p>
           </p:txBody>
         </p:sp>
         <p:sp>
@@ -4457,8 +4543,12 @@
             </a:xfrm>
             <a:custGeom>
               <a:avLst/>
+              <a:gdLst/>
+              <a:ahLst/>
+              <a:cxnLst/>
+              <a:rect l="0" t="0" r="0" b="0"/>
               <a:pathLst>
-                <a:path w="2481408" h="0">
+                <a:path w="2481408">
                   <a:moveTo>
                     <a:pt x="2481408" y="0"/>
                   </a:moveTo>
@@ -4481,7 +4571,9 @@
           <p:txBody>
             <a:bodyPr/>
             <a:lstStyle/>
-            <a:p/>
+            <a:p>
+              <a:endParaRPr/>
+            </a:p>
           </p:txBody>
         </p:sp>
         <p:sp>
@@ -4497,8 +4589,12 @@
             </a:xfrm>
             <a:custGeom>
               <a:avLst/>
+              <a:gdLst/>
+              <a:ahLst/>
+              <a:cxnLst/>
+              <a:rect l="0" t="0" r="0" b="0"/>
               <a:pathLst>
-                <a:path w="3114564" h="0">
+                <a:path w="3114564">
                   <a:moveTo>
                     <a:pt x="0" y="0"/>
                   </a:moveTo>
@@ -4521,7 +4617,9 @@
           <p:txBody>
             <a:bodyPr/>
             <a:lstStyle/>
-            <a:p/>
+            <a:p>
+              <a:endParaRPr/>
+            </a:p>
           </p:txBody>
         </p:sp>
         <p:sp>
@@ -4537,8 +4635,12 @@
             </a:xfrm>
             <a:custGeom>
               <a:avLst/>
+              <a:gdLst/>
+              <a:ahLst/>
+              <a:cxnLst/>
+              <a:rect l="0" t="0" r="0" b="0"/>
               <a:pathLst>
-                <a:path w="0" h="1514422">
+                <a:path h="1514422">
                   <a:moveTo>
                     <a:pt x="0" y="1514422"/>
                   </a:moveTo>
@@ -4564,7 +4666,9 @@
           <p:txBody>
             <a:bodyPr/>
             <a:lstStyle/>
-            <a:p/>
+            <a:p>
+              <a:endParaRPr/>
+            </a:p>
           </p:txBody>
         </p:sp>
         <p:sp>
@@ -4580,8 +4684,12 @@
             </a:xfrm>
             <a:custGeom>
               <a:avLst/>
+              <a:gdLst/>
+              <a:ahLst/>
+              <a:cxnLst/>
+              <a:rect l="0" t="0" r="0" b="0"/>
               <a:pathLst>
-                <a:path w="0" h="1514422">
+                <a:path h="1514422">
                   <a:moveTo>
                     <a:pt x="0" y="1514422"/>
                   </a:moveTo>
@@ -4607,7 +4715,9 @@
           <p:txBody>
             <a:bodyPr/>
             <a:lstStyle/>
-            <a:p/>
+            <a:p>
+              <a:endParaRPr/>
+            </a:p>
           </p:txBody>
         </p:sp>
         <p:sp>
@@ -4623,8 +4733,12 @@
             </a:xfrm>
             <a:custGeom>
               <a:avLst/>
+              <a:gdLst/>
+              <a:ahLst/>
+              <a:cxnLst/>
+              <a:rect l="0" t="0" r="0" b="0"/>
               <a:pathLst>
-                <a:path w="0" h="1514422">
+                <a:path h="1514422">
                   <a:moveTo>
                     <a:pt x="0" y="1514422"/>
                   </a:moveTo>
@@ -4650,7 +4764,9 @@
           <p:txBody>
             <a:bodyPr/>
             <a:lstStyle/>
-            <a:p/>
+            <a:p>
+              <a:endParaRPr/>
+            </a:p>
           </p:txBody>
         </p:sp>
         <p:sp>
@@ -4666,8 +4782,12 @@
             </a:xfrm>
             <a:custGeom>
               <a:avLst/>
+              <a:gdLst/>
+              <a:ahLst/>
+              <a:cxnLst/>
+              <a:rect l="0" t="0" r="0" b="0"/>
               <a:pathLst>
-                <a:path w="0" h="1514422">
+                <a:path h="1514422">
                   <a:moveTo>
                     <a:pt x="0" y="1514422"/>
                   </a:moveTo>
@@ -4693,7 +4813,9 @@
           <p:txBody>
             <a:bodyPr/>
             <a:lstStyle/>
-            <a:p/>
+            <a:p>
+              <a:endParaRPr/>
+            </a:p>
           </p:txBody>
         </p:sp>
         <p:sp>
@@ -4709,8 +4831,12 @@
             </a:xfrm>
             <a:custGeom>
               <a:avLst/>
+              <a:gdLst/>
+              <a:ahLst/>
+              <a:cxnLst/>
+              <a:rect l="0" t="0" r="0" b="0"/>
               <a:pathLst>
-                <a:path w="0" h="1514422">
+                <a:path h="1514422">
                   <a:moveTo>
                     <a:pt x="0" y="1514422"/>
                   </a:moveTo>
@@ -4736,7 +4862,9 @@
           <p:txBody>
             <a:bodyPr/>
             <a:lstStyle/>
-            <a:p/>
+            <a:p>
+              <a:endParaRPr/>
+            </a:p>
           </p:txBody>
         </p:sp>
         <p:sp>
@@ -4752,8 +4880,12 @@
             </a:xfrm>
             <a:custGeom>
               <a:avLst/>
+              <a:gdLst/>
+              <a:ahLst/>
+              <a:cxnLst/>
+              <a:rect l="0" t="0" r="0" b="0"/>
               <a:pathLst>
-                <a:path w="0" h="1514422">
+                <a:path h="1514422">
                   <a:moveTo>
                     <a:pt x="0" y="1514422"/>
                   </a:moveTo>
@@ -4779,7 +4911,9 @@
           <p:txBody>
             <a:bodyPr/>
             <a:lstStyle/>
-            <a:p/>
+            <a:p>
+              <a:endParaRPr/>
+            </a:p>
           </p:txBody>
         </p:sp>
         <p:sp>
@@ -4795,8 +4929,12 @@
             </a:xfrm>
             <a:custGeom>
               <a:avLst/>
+              <a:gdLst/>
+              <a:ahLst/>
+              <a:cxnLst/>
+              <a:rect l="0" t="0" r="0" b="0"/>
               <a:pathLst>
-                <a:path w="0" h="1514422">
+                <a:path h="1514422">
                   <a:moveTo>
                     <a:pt x="0" y="1514422"/>
                   </a:moveTo>
@@ -4822,7 +4960,9 @@
           <p:txBody>
             <a:bodyPr/>
             <a:lstStyle/>
-            <a:p/>
+            <a:p>
+              <a:endParaRPr/>
+            </a:p>
           </p:txBody>
         </p:sp>
         <p:sp>
@@ -4838,8 +4978,12 @@
             </a:xfrm>
             <a:custGeom>
               <a:avLst/>
+              <a:gdLst/>
+              <a:ahLst/>
+              <a:cxnLst/>
+              <a:rect l="0" t="0" r="0" b="0"/>
               <a:pathLst>
-                <a:path w="0" h="1514422">
+                <a:path h="1514422">
                   <a:moveTo>
                     <a:pt x="0" y="1514422"/>
                   </a:moveTo>
@@ -4865,7 +5009,9 @@
           <p:txBody>
             <a:bodyPr/>
             <a:lstStyle/>
-            <a:p/>
+            <a:p>
+              <a:endParaRPr/>
+            </a:p>
           </p:txBody>
         </p:sp>
         <p:sp>
@@ -4881,8 +5027,12 @@
             </a:xfrm>
             <a:custGeom>
               <a:avLst/>
+              <a:gdLst/>
+              <a:ahLst/>
+              <a:cxnLst/>
+              <a:rect l="0" t="0" r="0" b="0"/>
               <a:pathLst>
-                <a:path w="0" h="1514422">
+                <a:path h="1514422">
                   <a:moveTo>
                     <a:pt x="0" y="1514422"/>
                   </a:moveTo>
@@ -4908,7 +5058,9 @@
           <p:txBody>
             <a:bodyPr/>
             <a:lstStyle/>
-            <a:p/>
+            <a:p>
+              <a:endParaRPr/>
+            </a:p>
           </p:txBody>
         </p:sp>
         <p:sp>
@@ -4924,8 +5076,12 @@
             </a:xfrm>
             <a:custGeom>
               <a:avLst/>
+              <a:gdLst/>
+              <a:ahLst/>
+              <a:cxnLst/>
+              <a:rect l="0" t="0" r="0" b="0"/>
               <a:pathLst>
-                <a:path w="0" h="1514422">
+                <a:path h="1514422">
                   <a:moveTo>
                     <a:pt x="0" y="1514422"/>
                   </a:moveTo>
@@ -4951,7 +5107,9 @@
           <p:txBody>
             <a:bodyPr/>
             <a:lstStyle/>
-            <a:p/>
+            <a:p>
+              <a:endParaRPr/>
+            </a:p>
           </p:txBody>
         </p:sp>
         <p:sp>
@@ -4967,8 +5125,12 @@
             </a:xfrm>
             <a:custGeom>
               <a:avLst/>
+              <a:gdLst/>
+              <a:ahLst/>
+              <a:cxnLst/>
+              <a:rect l="0" t="0" r="0" b="0"/>
               <a:pathLst>
-                <a:path w="0" h="1514422">
+                <a:path h="1514422">
                   <a:moveTo>
                     <a:pt x="0" y="1514422"/>
                   </a:moveTo>
@@ -4994,7 +5156,9 @@
           <p:txBody>
             <a:bodyPr/>
             <a:lstStyle/>
-            <a:p/>
+            <a:p>
+              <a:endParaRPr/>
+            </a:p>
           </p:txBody>
         </p:sp>
         <p:sp>
@@ -5005,8 +5169,8 @@
           </p:nvSpPr>
           <p:spPr>
             <a:xfrm>
-              <a:off x="7138704" y="3270448"/>
-              <a:ext cx="154396" cy="154396"/>
+              <a:off x="7157675" y="3289419"/>
+              <a:ext cx="116454" cy="116454"/>
             </a:xfrm>
             <a:prstGeom prst="ellipse">
               <a:avLst/>
@@ -5029,7 +5193,9 @@
           <p:txBody>
             <a:bodyPr/>
             <a:lstStyle/>
-            <a:p/>
+            <a:p>
+              <a:endParaRPr/>
+            </a:p>
           </p:txBody>
         </p:sp>
         <p:sp>
@@ -5040,8 +5206,8 @@
           </p:nvSpPr>
           <p:spPr>
             <a:xfrm>
-              <a:off x="4657295" y="3270448"/>
-              <a:ext cx="154396" cy="154396"/>
+              <a:off x="4676266" y="3289419"/>
+              <a:ext cx="116454" cy="116454"/>
             </a:xfrm>
             <a:prstGeom prst="ellipse">
               <a:avLst/>
@@ -5064,7 +5230,9 @@
           <p:txBody>
             <a:bodyPr/>
             <a:lstStyle/>
-            <a:p/>
+            <a:p>
+              <a:endParaRPr/>
+            </a:p>
           </p:txBody>
         </p:sp>
         <p:sp>
@@ -5075,8 +5243,8 @@
           </p:nvSpPr>
           <p:spPr>
             <a:xfrm>
-              <a:off x="5232878" y="2900386"/>
-              <a:ext cx="173367" cy="173367"/>
+              <a:off x="5254559" y="2922067"/>
+              <a:ext cx="130005" cy="130005"/>
             </a:xfrm>
             <a:prstGeom prst="ellipse">
               <a:avLst/>
@@ -5099,7 +5267,9 @@
           <p:txBody>
             <a:bodyPr/>
             <a:lstStyle/>
-            <a:p/>
+            <a:p>
+              <a:endParaRPr/>
+            </a:p>
           </p:txBody>
         </p:sp>
         <p:sp>
@@ -5110,8 +5280,8 @@
           </p:nvSpPr>
           <p:spPr>
             <a:xfrm>
-              <a:off x="8347443" y="2900386"/>
-              <a:ext cx="173367" cy="173367"/>
+              <a:off x="8369124" y="2922067"/>
+              <a:ext cx="130005" cy="130005"/>
             </a:xfrm>
             <a:prstGeom prst="ellipse">
               <a:avLst/>
@@ -5134,7 +5304,9 @@
           <p:txBody>
             <a:bodyPr/>
             <a:lstStyle/>
-            <a:p/>
+            <a:p>
+              <a:endParaRPr/>
+            </a:p>
           </p:txBody>
         </p:sp>
         <p:sp>
@@ -5145,8 +5317,8 @@
           </p:nvSpPr>
           <p:spPr>
             <a:xfrm>
-              <a:off x="7549820" y="3972631"/>
-              <a:ext cx="192337" cy="192337"/>
+              <a:off x="7574212" y="3997022"/>
+              <a:ext cx="143555" cy="143555"/>
             </a:xfrm>
             <a:prstGeom prst="ellipse">
               <a:avLst/>
@@ -5169,7 +5341,9 @@
           <p:txBody>
             <a:bodyPr/>
             <a:lstStyle/>
-            <a:p/>
+            <a:p>
+              <a:endParaRPr/>
+            </a:p>
           </p:txBody>
         </p:sp>
         <p:sp>
@@ -5180,8 +5354,8 @@
           </p:nvSpPr>
           <p:spPr>
             <a:xfrm>
-              <a:off x="3281981" y="3972631"/>
-              <a:ext cx="192337" cy="192337"/>
+              <a:off x="3306372" y="3997022"/>
+              <a:ext cx="143555" cy="143555"/>
             </a:xfrm>
             <a:prstGeom prst="ellipse">
               <a:avLst/>
@@ -5204,7 +5378,9 @@
           <p:txBody>
             <a:bodyPr/>
             <a:lstStyle/>
-            <a:p/>
+            <a:p>
+              <a:endParaRPr/>
+            </a:p>
           </p:txBody>
         </p:sp>
         <p:sp>
@@ -5215,8 +5391,8 @@
           </p:nvSpPr>
           <p:spPr>
             <a:xfrm>
-              <a:off x="5154848" y="3602569"/>
-              <a:ext cx="211308" cy="211308"/>
+              <a:off x="5181950" y="3629670"/>
+              <a:ext cx="157106" cy="157106"/>
             </a:xfrm>
             <a:prstGeom prst="ellipse">
               <a:avLst/>
@@ -5239,7 +5415,9 @@
           <p:txBody>
             <a:bodyPr/>
             <a:lstStyle/>
-            <a:p/>
+            <a:p>
+              <a:endParaRPr/>
+            </a:p>
           </p:txBody>
         </p:sp>
         <p:sp>
@@ -5250,8 +5428,8 @@
           </p:nvSpPr>
           <p:spPr>
             <a:xfrm>
-              <a:off x="8281001" y="3602569"/>
-              <a:ext cx="211308" cy="211308"/>
+              <a:off x="8308103" y="3629670"/>
+              <a:ext cx="157106" cy="157106"/>
             </a:xfrm>
             <a:prstGeom prst="ellipse">
               <a:avLst/>
@@ -5274,7 +5452,9 @@
           <p:txBody>
             <a:bodyPr/>
             <a:lstStyle/>
-            <a:p/>
+            <a:p>
+              <a:endParaRPr/>
+            </a:p>
           </p:txBody>
         </p:sp>
         <p:sp>
@@ -5290,8 +5470,12 @@
             </a:xfrm>
             <a:custGeom>
               <a:avLst/>
+              <a:gdLst/>
+              <a:ahLst/>
+              <a:cxnLst/>
+              <a:rect l="0" t="0" r="0" b="0"/>
               <a:pathLst>
-                <a:path w="6319447" h="0">
+                <a:path w="6319447">
                   <a:moveTo>
                     <a:pt x="0" y="0"/>
                   </a:moveTo>
@@ -5317,7 +5501,9 @@
           <p:txBody>
             <a:bodyPr/>
             <a:lstStyle/>
-            <a:p/>
+            <a:p>
+              <a:endParaRPr/>
+            </a:p>
           </p:txBody>
         </p:sp>
         <p:sp>
@@ -5333,8 +5519,12 @@
             </a:xfrm>
             <a:custGeom>
               <a:avLst/>
+              <a:gdLst/>
+              <a:ahLst/>
+              <a:cxnLst/>
+              <a:rect l="0" t="0" r="0" b="0"/>
               <a:pathLst>
-                <a:path w="6319447" h="0">
+                <a:path w="6319447">
                   <a:moveTo>
                     <a:pt x="0" y="0"/>
                   </a:moveTo>
@@ -5360,7 +5550,9 @@
           <p:txBody>
             <a:bodyPr/>
             <a:lstStyle/>
-            <a:p/>
+            <a:p>
+              <a:endParaRPr/>
+            </a:p>
           </p:txBody>
         </p:sp>
         <p:sp>
@@ -5376,8 +5568,12 @@
             </a:xfrm>
             <a:custGeom>
               <a:avLst/>
+              <a:gdLst/>
+              <a:ahLst/>
+              <a:cxnLst/>
+              <a:rect l="0" t="0" r="0" b="0"/>
               <a:pathLst>
-                <a:path w="6319447" h="0">
+                <a:path w="6319447">
                   <a:moveTo>
                     <a:pt x="0" y="0"/>
                   </a:moveTo>
@@ -5403,7 +5599,9 @@
           <p:txBody>
             <a:bodyPr/>
             <a:lstStyle/>
-            <a:p/>
+            <a:p>
+              <a:endParaRPr/>
+            </a:p>
           </p:txBody>
         </p:sp>
         <p:sp>
@@ -5419,8 +5617,12 @@
             </a:xfrm>
             <a:custGeom>
               <a:avLst/>
+              <a:gdLst/>
+              <a:ahLst/>
+              <a:cxnLst/>
+              <a:rect l="0" t="0" r="0" b="0"/>
               <a:pathLst>
-                <a:path w="1735916" h="0">
+                <a:path w="1735916">
                   <a:moveTo>
                     <a:pt x="0" y="0"/>
                   </a:moveTo>
@@ -5443,7 +5645,9 @@
           <p:txBody>
             <a:bodyPr/>
             <a:lstStyle/>
-            <a:p/>
+            <a:p>
+              <a:endParaRPr/>
+            </a:p>
           </p:txBody>
         </p:sp>
         <p:sp>
@@ -5459,8 +5663,12 @@
             </a:xfrm>
             <a:custGeom>
               <a:avLst/>
+              <a:gdLst/>
+              <a:ahLst/>
+              <a:cxnLst/>
+              <a:rect l="0" t="0" r="0" b="0"/>
               <a:pathLst>
-                <a:path w="32930" h="0">
+                <a:path w="32930">
                   <a:moveTo>
                     <a:pt x="32930" y="0"/>
                   </a:moveTo>
@@ -5483,7 +5691,9 @@
           <p:txBody>
             <a:bodyPr/>
             <a:lstStyle/>
-            <a:p/>
+            <a:p>
+              <a:endParaRPr/>
+            </a:p>
           </p:txBody>
         </p:sp>
         <p:sp>
@@ -5499,8 +5709,12 @@
             </a:xfrm>
             <a:custGeom>
               <a:avLst/>
+              <a:gdLst/>
+              <a:ahLst/>
+              <a:cxnLst/>
+              <a:rect l="0" t="0" r="0" b="0"/>
               <a:pathLst>
-                <a:path w="1267786" h="0">
+                <a:path w="1267786">
                   <a:moveTo>
                     <a:pt x="1267786" y="0"/>
                   </a:moveTo>
@@ -5523,7 +5737,9 @@
           <p:txBody>
             <a:bodyPr/>
             <a:lstStyle/>
-            <a:p/>
+            <a:p>
+              <a:endParaRPr/>
+            </a:p>
           </p:txBody>
         </p:sp>
         <p:sp>
@@ -5539,8 +5755,12 @@
             </a:xfrm>
             <a:custGeom>
               <a:avLst/>
+              <a:gdLst/>
+              <a:ahLst/>
+              <a:cxnLst/>
+              <a:rect l="0" t="0" r="0" b="0"/>
               <a:pathLst>
-                <a:path w="0" h="1153845">
+                <a:path h="1153845">
                   <a:moveTo>
                     <a:pt x="0" y="1153845"/>
                   </a:moveTo>
@@ -5566,7 +5786,9 @@
           <p:txBody>
             <a:bodyPr/>
             <a:lstStyle/>
-            <a:p/>
+            <a:p>
+              <a:endParaRPr/>
+            </a:p>
           </p:txBody>
         </p:sp>
         <p:sp>
@@ -5582,8 +5804,12 @@
             </a:xfrm>
             <a:custGeom>
               <a:avLst/>
+              <a:gdLst/>
+              <a:ahLst/>
+              <a:cxnLst/>
+              <a:rect l="0" t="0" r="0" b="0"/>
               <a:pathLst>
-                <a:path w="0" h="1153845">
+                <a:path h="1153845">
                   <a:moveTo>
                     <a:pt x="0" y="1153845"/>
                   </a:moveTo>
@@ -5609,7 +5835,9 @@
           <p:txBody>
             <a:bodyPr/>
             <a:lstStyle/>
-            <a:p/>
+            <a:p>
+              <a:endParaRPr/>
+            </a:p>
           </p:txBody>
         </p:sp>
         <p:sp>
@@ -5625,8 +5853,12 @@
             </a:xfrm>
             <a:custGeom>
               <a:avLst/>
+              <a:gdLst/>
+              <a:ahLst/>
+              <a:cxnLst/>
+              <a:rect l="0" t="0" r="0" b="0"/>
               <a:pathLst>
-                <a:path w="0" h="1153845">
+                <a:path h="1153845">
                   <a:moveTo>
                     <a:pt x="0" y="1153845"/>
                   </a:moveTo>
@@ -5652,7 +5884,9 @@
           <p:txBody>
             <a:bodyPr/>
             <a:lstStyle/>
-            <a:p/>
+            <a:p>
+              <a:endParaRPr/>
+            </a:p>
           </p:txBody>
         </p:sp>
         <p:sp>
@@ -5668,8 +5902,12 @@
             </a:xfrm>
             <a:custGeom>
               <a:avLst/>
+              <a:gdLst/>
+              <a:ahLst/>
+              <a:cxnLst/>
+              <a:rect l="0" t="0" r="0" b="0"/>
               <a:pathLst>
-                <a:path w="0" h="1153845">
+                <a:path h="1153845">
                   <a:moveTo>
                     <a:pt x="0" y="1153845"/>
                   </a:moveTo>
@@ -5695,7 +5933,9 @@
           <p:txBody>
             <a:bodyPr/>
             <a:lstStyle/>
-            <a:p/>
+            <a:p>
+              <a:endParaRPr/>
+            </a:p>
           </p:txBody>
         </p:sp>
         <p:sp>
@@ -5711,8 +5951,12 @@
             </a:xfrm>
             <a:custGeom>
               <a:avLst/>
+              <a:gdLst/>
+              <a:ahLst/>
+              <a:cxnLst/>
+              <a:rect l="0" t="0" r="0" b="0"/>
               <a:pathLst>
-                <a:path w="0" h="1153845">
+                <a:path h="1153845">
                   <a:moveTo>
                     <a:pt x="0" y="1153845"/>
                   </a:moveTo>
@@ -5738,7 +5982,9 @@
           <p:txBody>
             <a:bodyPr/>
             <a:lstStyle/>
-            <a:p/>
+            <a:p>
+              <a:endParaRPr/>
+            </a:p>
           </p:txBody>
         </p:sp>
         <p:sp>
@@ -5754,8 +6000,12 @@
             </a:xfrm>
             <a:custGeom>
               <a:avLst/>
+              <a:gdLst/>
+              <a:ahLst/>
+              <a:cxnLst/>
+              <a:rect l="0" t="0" r="0" b="0"/>
               <a:pathLst>
-                <a:path w="0" h="1153845">
+                <a:path h="1153845">
                   <a:moveTo>
                     <a:pt x="0" y="1153845"/>
                   </a:moveTo>
@@ -5781,7 +6031,9 @@
           <p:txBody>
             <a:bodyPr/>
             <a:lstStyle/>
-            <a:p/>
+            <a:p>
+              <a:endParaRPr/>
+            </a:p>
           </p:txBody>
         </p:sp>
         <p:sp>
@@ -5797,8 +6049,12 @@
             </a:xfrm>
             <a:custGeom>
               <a:avLst/>
+              <a:gdLst/>
+              <a:ahLst/>
+              <a:cxnLst/>
+              <a:rect l="0" t="0" r="0" b="0"/>
               <a:pathLst>
-                <a:path w="0" h="1153845">
+                <a:path h="1153845">
                   <a:moveTo>
                     <a:pt x="0" y="1153845"/>
                   </a:moveTo>
@@ -5824,7 +6080,9 @@
           <p:txBody>
             <a:bodyPr/>
             <a:lstStyle/>
-            <a:p/>
+            <a:p>
+              <a:endParaRPr/>
+            </a:p>
           </p:txBody>
         </p:sp>
         <p:sp>
@@ -5840,8 +6098,12 @@
             </a:xfrm>
             <a:custGeom>
               <a:avLst/>
+              <a:gdLst/>
+              <a:ahLst/>
+              <a:cxnLst/>
+              <a:rect l="0" t="0" r="0" b="0"/>
               <a:pathLst>
-                <a:path w="0" h="1153845">
+                <a:path h="1153845">
                   <a:moveTo>
                     <a:pt x="0" y="1153845"/>
                   </a:moveTo>
@@ -5867,7 +6129,9 @@
           <p:txBody>
             <a:bodyPr/>
             <a:lstStyle/>
-            <a:p/>
+            <a:p>
+              <a:endParaRPr/>
+            </a:p>
           </p:txBody>
         </p:sp>
         <p:sp>
@@ -5883,8 +6147,12 @@
             </a:xfrm>
             <a:custGeom>
               <a:avLst/>
+              <a:gdLst/>
+              <a:ahLst/>
+              <a:cxnLst/>
+              <a:rect l="0" t="0" r="0" b="0"/>
               <a:pathLst>
-                <a:path w="0" h="1153845">
+                <a:path h="1153845">
                   <a:moveTo>
                     <a:pt x="0" y="1153845"/>
                   </a:moveTo>
@@ -5910,7 +6178,9 @@
           <p:txBody>
             <a:bodyPr/>
             <a:lstStyle/>
-            <a:p/>
+            <a:p>
+              <a:endParaRPr/>
+            </a:p>
           </p:txBody>
         </p:sp>
         <p:sp>
@@ -5926,8 +6196,12 @@
             </a:xfrm>
             <a:custGeom>
               <a:avLst/>
+              <a:gdLst/>
+              <a:ahLst/>
+              <a:cxnLst/>
+              <a:rect l="0" t="0" r="0" b="0"/>
               <a:pathLst>
-                <a:path w="0" h="1153845">
+                <a:path h="1153845">
                   <a:moveTo>
                     <a:pt x="0" y="1153845"/>
                   </a:moveTo>
@@ -5953,7 +6227,9 @@
           <p:txBody>
             <a:bodyPr/>
             <a:lstStyle/>
-            <a:p/>
+            <a:p>
+              <a:endParaRPr/>
+            </a:p>
           </p:txBody>
         </p:sp>
         <p:sp>
@@ -5969,8 +6245,12 @@
             </a:xfrm>
             <a:custGeom>
               <a:avLst/>
+              <a:gdLst/>
+              <a:ahLst/>
+              <a:cxnLst/>
+              <a:rect l="0" t="0" r="0" b="0"/>
               <a:pathLst>
-                <a:path w="0" h="1153845">
+                <a:path h="1153845">
                   <a:moveTo>
                     <a:pt x="0" y="1153845"/>
                   </a:moveTo>
@@ -5996,7 +6276,9 @@
           <p:txBody>
             <a:bodyPr/>
             <a:lstStyle/>
-            <a:p/>
+            <a:p>
+              <a:endParaRPr/>
+            </a:p>
           </p:txBody>
         </p:sp>
         <p:sp>
@@ -6007,8 +6289,8 @@
           </p:nvSpPr>
           <p:spPr>
             <a:xfrm>
-              <a:off x="4041174" y="5323024"/>
-              <a:ext cx="102903" cy="102903"/>
+              <a:off x="4054724" y="5336575"/>
+              <a:ext cx="75802" cy="75802"/>
             </a:xfrm>
             <a:prstGeom prst="ellipse">
               <a:avLst/>
@@ -6031,7 +6313,9 @@
           <p:txBody>
             <a:bodyPr/>
             <a:lstStyle/>
-            <a:p/>
+            <a:p>
+              <a:endParaRPr/>
+            </a:p>
           </p:txBody>
         </p:sp>
         <p:sp>
@@ -6042,8 +6326,8 @@
           </p:nvSpPr>
           <p:spPr>
             <a:xfrm>
-              <a:off x="5777090" y="5323024"/>
-              <a:ext cx="102903" cy="102903"/>
+              <a:off x="5790641" y="5336575"/>
+              <a:ext cx="75802" cy="75802"/>
             </a:xfrm>
             <a:prstGeom prst="ellipse">
               <a:avLst/>
@@ -6066,7 +6350,9 @@
           <p:txBody>
             <a:bodyPr/>
             <a:lstStyle/>
-            <a:p/>
+            <a:p>
+              <a:endParaRPr/>
+            </a:p>
           </p:txBody>
         </p:sp>
         <p:sp>
@@ -6077,8 +6363,8 @@
           </p:nvSpPr>
           <p:spPr>
             <a:xfrm>
-              <a:off x="4747697" y="4952962"/>
-              <a:ext cx="121874" cy="121874"/>
+              <a:off x="4763958" y="4969223"/>
+              <a:ext cx="89353" cy="89353"/>
             </a:xfrm>
             <a:prstGeom prst="ellipse">
               <a:avLst/>
@@ -6101,7 +6387,9 @@
           <p:txBody>
             <a:bodyPr/>
             <a:lstStyle/>
-            <a:p/>
+            <a:p>
+              <a:endParaRPr/>
+            </a:p>
           </p:txBody>
         </p:sp>
         <p:sp>
@@ -6112,8 +6400,8 @@
           </p:nvSpPr>
           <p:spPr>
             <a:xfrm>
-              <a:off x="4714766" y="4952962"/>
-              <a:ext cx="121874" cy="121874"/>
+              <a:off x="4731027" y="4969223"/>
+              <a:ext cx="89353" cy="89353"/>
             </a:xfrm>
             <a:prstGeom prst="ellipse">
               <a:avLst/>
@@ -6136,7 +6424,9 @@
           <p:txBody>
             <a:bodyPr/>
             <a:lstStyle/>
-            <a:p/>
+            <a:p>
+              <a:endParaRPr/>
+            </a:p>
           </p:txBody>
         </p:sp>
         <p:sp>
@@ -6147,8 +6437,8 @@
           </p:nvSpPr>
           <p:spPr>
             <a:xfrm>
-              <a:off x="4442211" y="4585610"/>
-              <a:ext cx="135425" cy="135425"/>
+              <a:off x="4458471" y="4601871"/>
+              <a:ext cx="102903" cy="102903"/>
             </a:xfrm>
             <a:prstGeom prst="ellipse">
               <a:avLst/>
@@ -6171,7 +6461,9 @@
           <p:txBody>
             <a:bodyPr/>
             <a:lstStyle/>
-            <a:p/>
+            <a:p>
+              <a:endParaRPr/>
+            </a:p>
           </p:txBody>
         </p:sp>
         <p:sp>
@@ -6182,8 +6474,8 @@
           </p:nvSpPr>
           <p:spPr>
             <a:xfrm>
-              <a:off x="3174424" y="4585610"/>
-              <a:ext cx="135425" cy="135425"/>
+              <a:off x="3190685" y="4601871"/>
+              <a:ext cx="102903" cy="102903"/>
             </a:xfrm>
             <a:prstGeom prst="ellipse">
               <a:avLst/>
@@ -6206,7 +6498,9 @@
           <p:txBody>
             <a:bodyPr/>
             <a:lstStyle/>
-            <a:p/>
+            <a:p>
+              <a:endParaRPr/>
+            </a:p>
           </p:txBody>
         </p:sp>
         <p:sp>
@@ -6232,7 +6526,9 @@
           <p:txBody>
             <a:bodyPr/>
             <a:lstStyle/>
-            <a:p/>
+            <a:p>
+              <a:endParaRPr/>
+            </a:p>
           </p:txBody>
         </p:sp>
         <p:sp>
@@ -6252,10 +6548,10 @@
             <a:noFill/>
           </p:spPr>
           <p:txBody>
-            <a:bodyPr lIns="0" rIns="0" tIns="0" bIns="0" anchorCtr="1" anchor="ctr" wrap="none"/>
-            <a:lstStyle/>
-            <a:p>
-              <a:pPr algn="l" marL="0" marR="0" indent="0">
+            <a:bodyPr wrap="none" lIns="0" tIns="0" rIns="0" bIns="0" anchor="ctr" anchorCtr="1"/>
+            <a:lstStyle/>
+            <a:p>
+              <a:pPr marL="0" marR="0" indent="0" algn="l">
                 <a:lnSpc>
                   <a:spcPts val="1200"/>
                 </a:lnSpc>
@@ -6304,7 +6600,9 @@
           <p:txBody>
             <a:bodyPr/>
             <a:lstStyle/>
-            <a:p/>
+            <a:p>
+              <a:endParaRPr/>
+            </a:p>
           </p:txBody>
         </p:sp>
         <p:sp>
@@ -6324,10 +6622,10 @@
             <a:noFill/>
           </p:spPr>
           <p:txBody>
-            <a:bodyPr lIns="0" rIns="0" tIns="0" bIns="0" anchorCtr="1" anchor="ctr" wrap="none"/>
-            <a:lstStyle/>
-            <a:p>
-              <a:pPr algn="l" marL="0" marR="0" indent="0">
+            <a:bodyPr wrap="none" lIns="0" tIns="0" rIns="0" bIns="0" anchor="ctr" anchorCtr="1"/>
+            <a:lstStyle/>
+            <a:p>
+              <a:pPr marL="0" marR="0" indent="0" algn="l">
                 <a:lnSpc>
                   <a:spcPts val="1200"/>
                 </a:lnSpc>
@@ -6376,7 +6674,9 @@
           <p:txBody>
             <a:bodyPr/>
             <a:lstStyle/>
-            <a:p/>
+            <a:p>
+              <a:endParaRPr/>
+            </a:p>
           </p:txBody>
         </p:sp>
         <p:sp>
@@ -6396,10 +6696,10 @@
             <a:noFill/>
           </p:spPr>
           <p:txBody>
-            <a:bodyPr lIns="0" rIns="0" tIns="0" bIns="0" anchorCtr="1" anchor="ctr" wrap="none"/>
-            <a:lstStyle/>
-            <a:p>
-              <a:pPr algn="l" marL="0" marR="0" indent="0">
+            <a:bodyPr wrap="none" lIns="0" tIns="0" rIns="0" bIns="0" anchor="ctr" anchorCtr="1"/>
+            <a:lstStyle/>
+            <a:p>
+              <a:pPr marL="0" marR="0" indent="0" algn="l">
                 <a:lnSpc>
                   <a:spcPts val="1200"/>
                 </a:lnSpc>
@@ -6438,8 +6738,12 @@
             </a:xfrm>
             <a:custGeom>
               <a:avLst/>
+              <a:gdLst/>
+              <a:ahLst/>
+              <a:cxnLst/>
+              <a:rect l="0" t="0" r="0" b="0"/>
               <a:pathLst>
-                <a:path w="6319447" h="0">
+                <a:path w="6319447">
                   <a:moveTo>
                     <a:pt x="0" y="0"/>
                   </a:moveTo>
@@ -6462,7 +6766,9 @@
           <p:txBody>
             <a:bodyPr/>
             <a:lstStyle/>
-            <a:p/>
+            <a:p>
+              <a:endParaRPr/>
+            </a:p>
           </p:txBody>
         </p:sp>
         <p:sp>
@@ -6478,8 +6784,12 @@
             </a:xfrm>
             <a:custGeom>
               <a:avLst/>
+              <a:gdLst/>
+              <a:ahLst/>
+              <a:cxnLst/>
+              <a:rect l="0" t="0" r="0" b="0"/>
               <a:pathLst>
-                <a:path w="0" h="34794">
+                <a:path h="34794">
                   <a:moveTo>
                     <a:pt x="0" y="34794"/>
                   </a:moveTo>
@@ -6502,7 +6812,9 @@
           <p:txBody>
             <a:bodyPr/>
             <a:lstStyle/>
-            <a:p/>
+            <a:p>
+              <a:endParaRPr/>
+            </a:p>
           </p:txBody>
         </p:sp>
         <p:sp>
@@ -6518,8 +6830,12 @@
             </a:xfrm>
             <a:custGeom>
               <a:avLst/>
+              <a:gdLst/>
+              <a:ahLst/>
+              <a:cxnLst/>
+              <a:rect l="0" t="0" r="0" b="0"/>
               <a:pathLst>
-                <a:path w="0" h="34794">
+                <a:path h="34794">
                   <a:moveTo>
                     <a:pt x="0" y="34794"/>
                   </a:moveTo>
@@ -6542,7 +6858,9 @@
           <p:txBody>
             <a:bodyPr/>
             <a:lstStyle/>
-            <a:p/>
+            <a:p>
+              <a:endParaRPr/>
+            </a:p>
           </p:txBody>
         </p:sp>
         <p:sp>
@@ -6558,8 +6876,12 @@
             </a:xfrm>
             <a:custGeom>
               <a:avLst/>
+              <a:gdLst/>
+              <a:ahLst/>
+              <a:cxnLst/>
+              <a:rect l="0" t="0" r="0" b="0"/>
               <a:pathLst>
-                <a:path w="0" h="34794">
+                <a:path h="34794">
                   <a:moveTo>
                     <a:pt x="0" y="34794"/>
                   </a:moveTo>
@@ -6582,7 +6904,9 @@
           <p:txBody>
             <a:bodyPr/>
             <a:lstStyle/>
-            <a:p/>
+            <a:p>
+              <a:endParaRPr/>
+            </a:p>
           </p:txBody>
         </p:sp>
         <p:sp>
@@ -6598,8 +6922,12 @@
             </a:xfrm>
             <a:custGeom>
               <a:avLst/>
+              <a:gdLst/>
+              <a:ahLst/>
+              <a:cxnLst/>
+              <a:rect l="0" t="0" r="0" b="0"/>
               <a:pathLst>
-                <a:path w="0" h="34794">
+                <a:path h="34794">
                   <a:moveTo>
                     <a:pt x="0" y="34794"/>
                   </a:moveTo>
@@ -6622,7 +6950,9 @@
           <p:txBody>
             <a:bodyPr/>
             <a:lstStyle/>
-            <a:p/>
+            <a:p>
+              <a:endParaRPr/>
+            </a:p>
           </p:txBody>
         </p:sp>
         <p:sp>
@@ -6638,8 +6968,12 @@
             </a:xfrm>
             <a:custGeom>
               <a:avLst/>
+              <a:gdLst/>
+              <a:ahLst/>
+              <a:cxnLst/>
+              <a:rect l="0" t="0" r="0" b="0"/>
               <a:pathLst>
-                <a:path w="0" h="34794">
+                <a:path h="34794">
                   <a:moveTo>
                     <a:pt x="0" y="34794"/>
                   </a:moveTo>
@@ -6662,7 +6996,9 @@
           <p:txBody>
             <a:bodyPr/>
             <a:lstStyle/>
-            <a:p/>
+            <a:p>
+              <a:endParaRPr/>
+            </a:p>
           </p:txBody>
         </p:sp>
         <p:sp>
@@ -6678,8 +7014,12 @@
             </a:xfrm>
             <a:custGeom>
               <a:avLst/>
+              <a:gdLst/>
+              <a:ahLst/>
+              <a:cxnLst/>
+              <a:rect l="0" t="0" r="0" b="0"/>
               <a:pathLst>
-                <a:path w="0" h="34794">
+                <a:path h="34794">
                   <a:moveTo>
                     <a:pt x="0" y="34794"/>
                   </a:moveTo>
@@ -6702,7 +7042,9 @@
           <p:txBody>
             <a:bodyPr/>
             <a:lstStyle/>
-            <a:p/>
+            <a:p>
+              <a:endParaRPr/>
+            </a:p>
           </p:txBody>
         </p:sp>
         <p:sp>
@@ -6718,8 +7060,12 @@
             </a:xfrm>
             <a:custGeom>
               <a:avLst/>
+              <a:gdLst/>
+              <a:ahLst/>
+              <a:cxnLst/>
+              <a:rect l="0" t="0" r="0" b="0"/>
               <a:pathLst>
-                <a:path w="0" h="34794">
+                <a:path h="34794">
                   <a:moveTo>
                     <a:pt x="0" y="34794"/>
                   </a:moveTo>
@@ -6742,7 +7088,9 @@
           <p:txBody>
             <a:bodyPr/>
             <a:lstStyle/>
-            <a:p/>
+            <a:p>
+              <a:endParaRPr/>
+            </a:p>
           </p:txBody>
         </p:sp>
         <p:sp>
@@ -6758,8 +7106,12 @@
             </a:xfrm>
             <a:custGeom>
               <a:avLst/>
+              <a:gdLst/>
+              <a:ahLst/>
+              <a:cxnLst/>
+              <a:rect l="0" t="0" r="0" b="0"/>
               <a:pathLst>
-                <a:path w="0" h="34794">
+                <a:path h="34794">
                   <a:moveTo>
                     <a:pt x="0" y="34794"/>
                   </a:moveTo>
@@ -6782,7 +7134,9 @@
           <p:txBody>
             <a:bodyPr/>
             <a:lstStyle/>
-            <a:p/>
+            <a:p>
+              <a:endParaRPr/>
+            </a:p>
           </p:txBody>
         </p:sp>
         <p:sp>
@@ -6798,8 +7152,12 @@
             </a:xfrm>
             <a:custGeom>
               <a:avLst/>
+              <a:gdLst/>
+              <a:ahLst/>
+              <a:cxnLst/>
+              <a:rect l="0" t="0" r="0" b="0"/>
               <a:pathLst>
-                <a:path w="0" h="34794">
+                <a:path h="34794">
                   <a:moveTo>
                     <a:pt x="0" y="34794"/>
                   </a:moveTo>
@@ -6822,7 +7180,9 @@
           <p:txBody>
             <a:bodyPr/>
             <a:lstStyle/>
-            <a:p/>
+            <a:p>
+              <a:endParaRPr/>
+            </a:p>
           </p:txBody>
         </p:sp>
         <p:sp>
@@ -6838,8 +7198,12 @@
             </a:xfrm>
             <a:custGeom>
               <a:avLst/>
+              <a:gdLst/>
+              <a:ahLst/>
+              <a:cxnLst/>
+              <a:rect l="0" t="0" r="0" b="0"/>
               <a:pathLst>
-                <a:path w="0" h="34794">
+                <a:path h="34794">
                   <a:moveTo>
                     <a:pt x="0" y="34794"/>
                   </a:moveTo>
@@ -6862,7 +7226,9 @@
           <p:txBody>
             <a:bodyPr/>
             <a:lstStyle/>
-            <a:p/>
+            <a:p>
+              <a:endParaRPr/>
+            </a:p>
           </p:txBody>
         </p:sp>
         <p:sp>
@@ -6878,8 +7244,12 @@
             </a:xfrm>
             <a:custGeom>
               <a:avLst/>
+              <a:gdLst/>
+              <a:ahLst/>
+              <a:cxnLst/>
+              <a:rect l="0" t="0" r="0" b="0"/>
               <a:pathLst>
-                <a:path w="0" h="34794">
+                <a:path h="34794">
                   <a:moveTo>
                     <a:pt x="0" y="34794"/>
                   </a:moveTo>
@@ -6902,7 +7272,9 @@
           <p:txBody>
             <a:bodyPr/>
             <a:lstStyle/>
-            <a:p/>
+            <a:p>
+              <a:endParaRPr/>
+            </a:p>
           </p:txBody>
         </p:sp>
         <p:sp>
@@ -6922,10 +7294,10 @@
             <a:noFill/>
           </p:spPr>
           <p:txBody>
-            <a:bodyPr lIns="0" rIns="0" tIns="0" bIns="0" anchorCtr="1" anchor="ctr" wrap="none"/>
-            <a:lstStyle/>
-            <a:p>
-              <a:pPr algn="l" marL="0" marR="0" indent="0">
+            <a:bodyPr wrap="none" lIns="0" tIns="0" rIns="0" bIns="0" anchor="ctr" anchorCtr="1"/>
+            <a:lstStyle/>
+            <a:p>
+              <a:pPr marL="0" marR="0" indent="0" algn="l">
                 <a:lnSpc>
                   <a:spcPts val="1300"/>
                 </a:lnSpc>
@@ -6968,10 +7340,10 @@
             <a:noFill/>
           </p:spPr>
           <p:txBody>
-            <a:bodyPr lIns="0" rIns="0" tIns="0" bIns="0" anchorCtr="1" anchor="ctr" wrap="none"/>
-            <a:lstStyle/>
-            <a:p>
-              <a:pPr algn="l" marL="0" marR="0" indent="0">
+            <a:bodyPr wrap="none" lIns="0" tIns="0" rIns="0" bIns="0" anchor="ctr" anchorCtr="1"/>
+            <a:lstStyle/>
+            <a:p>
+              <a:pPr marL="0" marR="0" indent="0" algn="l">
                 <a:lnSpc>
                   <a:spcPts val="1300"/>
                 </a:lnSpc>
@@ -7014,10 +7386,10 @@
             <a:noFill/>
           </p:spPr>
           <p:txBody>
-            <a:bodyPr lIns="0" rIns="0" tIns="0" bIns="0" anchorCtr="1" anchor="ctr" wrap="none"/>
-            <a:lstStyle/>
-            <a:p>
-              <a:pPr algn="l" marL="0" marR="0" indent="0">
+            <a:bodyPr wrap="none" lIns="0" tIns="0" rIns="0" bIns="0" anchor="ctr" anchorCtr="1"/>
+            <a:lstStyle/>
+            <a:p>
+              <a:pPr marL="0" marR="0" indent="0" algn="l">
                 <a:lnSpc>
                   <a:spcPts val="1300"/>
                 </a:lnSpc>
@@ -7060,10 +7432,10 @@
             <a:noFill/>
           </p:spPr>
           <p:txBody>
-            <a:bodyPr lIns="0" rIns="0" tIns="0" bIns="0" anchorCtr="1" anchor="ctr" wrap="none"/>
-            <a:lstStyle/>
-            <a:p>
-              <a:pPr algn="l" marL="0" marR="0" indent="0">
+            <a:bodyPr wrap="none" lIns="0" tIns="0" rIns="0" bIns="0" anchor="ctr" anchorCtr="1"/>
+            <a:lstStyle/>
+            <a:p>
+              <a:pPr marL="0" marR="0" indent="0" algn="l">
                 <a:lnSpc>
                   <a:spcPts val="1300"/>
                 </a:lnSpc>
@@ -7106,10 +7478,10 @@
             <a:noFill/>
           </p:spPr>
           <p:txBody>
-            <a:bodyPr lIns="0" rIns="0" tIns="0" bIns="0" anchorCtr="1" anchor="ctr" wrap="none"/>
-            <a:lstStyle/>
-            <a:p>
-              <a:pPr algn="l" marL="0" marR="0" indent="0">
+            <a:bodyPr wrap="none" lIns="0" tIns="0" rIns="0" bIns="0" anchor="ctr" anchorCtr="1"/>
+            <a:lstStyle/>
+            <a:p>
+              <a:pPr marL="0" marR="0" indent="0" algn="l">
                 <a:lnSpc>
                   <a:spcPts val="1300"/>
                 </a:lnSpc>
@@ -7152,10 +7524,10 @@
             <a:noFill/>
           </p:spPr>
           <p:txBody>
-            <a:bodyPr lIns="0" rIns="0" tIns="0" bIns="0" anchorCtr="1" anchor="ctr" wrap="none"/>
-            <a:lstStyle/>
-            <a:p>
-              <a:pPr algn="l" marL="0" marR="0" indent="0">
+            <a:bodyPr wrap="none" lIns="0" tIns="0" rIns="0" bIns="0" anchor="ctr" anchorCtr="1"/>
+            <a:lstStyle/>
+            <a:p>
+              <a:pPr marL="0" marR="0" indent="0" algn="l">
                 <a:lnSpc>
                   <a:spcPts val="1300"/>
                 </a:lnSpc>
@@ -7198,10 +7570,10 @@
             <a:noFill/>
           </p:spPr>
           <p:txBody>
-            <a:bodyPr lIns="0" rIns="0" tIns="0" bIns="0" anchorCtr="1" anchor="ctr" wrap="none"/>
-            <a:lstStyle/>
-            <a:p>
-              <a:pPr algn="l" marL="0" marR="0" indent="0">
+            <a:bodyPr wrap="none" lIns="0" tIns="0" rIns="0" bIns="0" anchor="ctr" anchorCtr="1"/>
+            <a:lstStyle/>
+            <a:p>
+              <a:pPr marL="0" marR="0" indent="0" algn="l">
                 <a:lnSpc>
                   <a:spcPts val="1300"/>
                 </a:lnSpc>
@@ -7244,10 +7616,10 @@
             <a:noFill/>
           </p:spPr>
           <p:txBody>
-            <a:bodyPr lIns="0" rIns="0" tIns="0" bIns="0" anchorCtr="1" anchor="ctr" wrap="none"/>
-            <a:lstStyle/>
-            <a:p>
-              <a:pPr algn="l" marL="0" marR="0" indent="0">
+            <a:bodyPr wrap="none" lIns="0" tIns="0" rIns="0" bIns="0" anchor="ctr" anchorCtr="1"/>
+            <a:lstStyle/>
+            <a:p>
+              <a:pPr marL="0" marR="0" indent="0" algn="l">
                 <a:lnSpc>
                   <a:spcPts val="1300"/>
                 </a:lnSpc>
@@ -7290,10 +7662,10 @@
             <a:noFill/>
           </p:spPr>
           <p:txBody>
-            <a:bodyPr lIns="0" rIns="0" tIns="0" bIns="0" anchorCtr="1" anchor="ctr" wrap="none"/>
-            <a:lstStyle/>
-            <a:p>
-              <a:pPr algn="l" marL="0" marR="0" indent="0">
+            <a:bodyPr wrap="none" lIns="0" tIns="0" rIns="0" bIns="0" anchor="ctr" anchorCtr="1"/>
+            <a:lstStyle/>
+            <a:p>
+              <a:pPr marL="0" marR="0" indent="0" algn="l">
                 <a:lnSpc>
                   <a:spcPts val="1300"/>
                 </a:lnSpc>
@@ -7336,10 +7708,10 @@
             <a:noFill/>
           </p:spPr>
           <p:txBody>
-            <a:bodyPr lIns="0" rIns="0" tIns="0" bIns="0" anchorCtr="1" anchor="ctr" wrap="none"/>
-            <a:lstStyle/>
-            <a:p>
-              <a:pPr algn="l" marL="0" marR="0" indent="0">
+            <a:bodyPr wrap="none" lIns="0" tIns="0" rIns="0" bIns="0" anchor="ctr" anchorCtr="1"/>
+            <a:lstStyle/>
+            <a:p>
+              <a:pPr marL="0" marR="0" indent="0" algn="l">
                 <a:lnSpc>
                   <a:spcPts val="1300"/>
                 </a:lnSpc>
@@ -7382,10 +7754,10 @@
             <a:noFill/>
           </p:spPr>
           <p:txBody>
-            <a:bodyPr lIns="0" rIns="0" tIns="0" bIns="0" anchorCtr="1" anchor="ctr" wrap="none"/>
-            <a:lstStyle/>
-            <a:p>
-              <a:pPr algn="l" marL="0" marR="0" indent="0">
+            <a:bodyPr wrap="none" lIns="0" tIns="0" rIns="0" bIns="0" anchor="ctr" anchorCtr="1"/>
+            <a:lstStyle/>
+            <a:p>
+              <a:pPr marL="0" marR="0" indent="0" algn="l">
                 <a:lnSpc>
                   <a:spcPts val="1300"/>
                 </a:lnSpc>
@@ -7428,10 +7800,10 @@
             <a:noFill/>
           </p:spPr>
           <p:txBody>
-            <a:bodyPr lIns="0" rIns="0" tIns="0" bIns="0" anchorCtr="1" anchor="ctr" wrap="none"/>
-            <a:lstStyle/>
-            <a:p>
-              <a:pPr algn="l" marL="0" marR="0" indent="0">
+            <a:bodyPr wrap="none" lIns="0" tIns="0" rIns="0" bIns="0" anchor="ctr" anchorCtr="1"/>
+            <a:lstStyle/>
+            <a:p>
+              <a:pPr marL="0" marR="0" indent="0" algn="l">
                 <a:lnSpc>
                   <a:spcPts val="1300"/>
                 </a:lnSpc>
@@ -7474,10 +7846,10 @@
             <a:noFill/>
           </p:spPr>
           <p:txBody>
-            <a:bodyPr lIns="0" rIns="0" tIns="0" bIns="0" anchorCtr="1" anchor="ctr" wrap="none"/>
-            <a:lstStyle/>
-            <a:p>
-              <a:pPr algn="l" marL="0" marR="0" indent="0">
+            <a:bodyPr wrap="none" lIns="0" tIns="0" rIns="0" bIns="0" anchor="ctr" anchorCtr="1"/>
+            <a:lstStyle/>
+            <a:p>
+              <a:pPr marL="0" marR="0" indent="0" algn="l">
                 <a:lnSpc>
                   <a:spcPts val="1300"/>
                 </a:lnSpc>
@@ -7520,10 +7892,10 @@
             <a:noFill/>
           </p:spPr>
           <p:txBody>
-            <a:bodyPr lIns="0" rIns="0" tIns="0" bIns="0" anchorCtr="1" anchor="ctr" wrap="none"/>
-            <a:lstStyle/>
-            <a:p>
-              <a:pPr algn="l" marL="0" marR="0" indent="0">
+            <a:bodyPr wrap="none" lIns="0" tIns="0" rIns="0" bIns="0" anchor="ctr" anchorCtr="1"/>
+            <a:lstStyle/>
+            <a:p>
+              <a:pPr marL="0" marR="0" indent="0" algn="l">
                 <a:lnSpc>
                   <a:spcPts val="1300"/>
                 </a:lnSpc>
@@ -7566,10 +7938,10 @@
             <a:noFill/>
           </p:spPr>
           <p:txBody>
-            <a:bodyPr lIns="0" rIns="0" tIns="0" bIns="0" anchorCtr="1" anchor="ctr" wrap="none"/>
-            <a:lstStyle/>
-            <a:p>
-              <a:pPr algn="l" marL="0" marR="0" indent="0">
+            <a:bodyPr wrap="none" lIns="0" tIns="0" rIns="0" bIns="0" anchor="ctr" anchorCtr="1"/>
+            <a:lstStyle/>
+            <a:p>
+              <a:pPr marL="0" marR="0" indent="0" algn="l">
                 <a:lnSpc>
                   <a:spcPts val="1300"/>
                 </a:lnSpc>
@@ -7612,10 +7984,10 @@
             <a:noFill/>
           </p:spPr>
           <p:txBody>
-            <a:bodyPr lIns="0" rIns="0" tIns="0" bIns="0" anchorCtr="1" anchor="ctr" wrap="none"/>
-            <a:lstStyle/>
-            <a:p>
-              <a:pPr algn="l" marL="0" marR="0" indent="0">
+            <a:bodyPr wrap="none" lIns="0" tIns="0" rIns="0" bIns="0" anchor="ctr" anchorCtr="1"/>
+            <a:lstStyle/>
+            <a:p>
+              <a:pPr marL="0" marR="0" indent="0" algn="l">
                 <a:lnSpc>
                   <a:spcPts val="1300"/>
                 </a:lnSpc>
@@ -7658,10 +8030,10 @@
             <a:noFill/>
           </p:spPr>
           <p:txBody>
-            <a:bodyPr lIns="0" rIns="0" tIns="0" bIns="0" anchorCtr="1" anchor="ctr" wrap="none"/>
-            <a:lstStyle/>
-            <a:p>
-              <a:pPr algn="l" marL="0" marR="0" indent="0">
+            <a:bodyPr wrap="none" lIns="0" tIns="0" rIns="0" bIns="0" anchor="ctr" anchorCtr="1"/>
+            <a:lstStyle/>
+            <a:p>
+              <a:pPr marL="0" marR="0" indent="0" algn="l">
                 <a:lnSpc>
                   <a:spcPts val="1300"/>
                 </a:lnSpc>
@@ -7704,10 +8076,10 @@
             <a:noFill/>
           </p:spPr>
           <p:txBody>
-            <a:bodyPr lIns="0" rIns="0" tIns="0" bIns="0" anchorCtr="1" anchor="ctr" wrap="none"/>
-            <a:lstStyle/>
-            <a:p>
-              <a:pPr algn="l" marL="0" marR="0" indent="0">
+            <a:bodyPr wrap="none" lIns="0" tIns="0" rIns="0" bIns="0" anchor="ctr" anchorCtr="1"/>
+            <a:lstStyle/>
+            <a:p>
+              <a:pPr marL="0" marR="0" indent="0" algn="l">
                 <a:lnSpc>
                   <a:spcPts val="1300"/>
                 </a:lnSpc>
@@ -7750,10 +8122,10 @@
             <a:noFill/>
           </p:spPr>
           <p:txBody>
-            <a:bodyPr lIns="0" rIns="0" tIns="0" bIns="0" anchorCtr="1" anchor="ctr" wrap="none"/>
-            <a:lstStyle/>
-            <a:p>
-              <a:pPr algn="l" marL="0" marR="0" indent="0">
+            <a:bodyPr wrap="none" lIns="0" tIns="0" rIns="0" bIns="0" anchor="ctr" anchorCtr="1"/>
+            <a:lstStyle/>
+            <a:p>
+              <a:pPr marL="0" marR="0" indent="0" algn="l">
                 <a:lnSpc>
                   <a:spcPts val="1300"/>
                 </a:lnSpc>
@@ -7796,10 +8168,10 @@
             <a:noFill/>
           </p:spPr>
           <p:txBody>
-            <a:bodyPr lIns="0" rIns="0" tIns="0" bIns="0" anchorCtr="1" anchor="ctr" wrap="none"/>
-            <a:lstStyle/>
-            <a:p>
-              <a:pPr algn="l" marL="0" marR="0" indent="0">
+            <a:bodyPr wrap="none" lIns="0" tIns="0" rIns="0" bIns="0" anchor="ctr" anchorCtr="1"/>
+            <a:lstStyle/>
+            <a:p>
+              <a:pPr marL="0" marR="0" indent="0" algn="l">
                 <a:lnSpc>
                   <a:spcPts val="1300"/>
                 </a:lnSpc>
@@ -7842,10 +8214,10 @@
             <a:noFill/>
           </p:spPr>
           <p:txBody>
-            <a:bodyPr lIns="0" rIns="0" tIns="0" bIns="0" anchorCtr="1" anchor="ctr" wrap="none"/>
-            <a:lstStyle/>
-            <a:p>
-              <a:pPr algn="l" marL="0" marR="0" indent="0">
+            <a:bodyPr wrap="none" lIns="0" tIns="0" rIns="0" bIns="0" anchor="ctr" anchorCtr="1"/>
+            <a:lstStyle/>
+            <a:p>
+              <a:pPr marL="0" marR="0" indent="0" algn="l">
                 <a:lnSpc>
                   <a:spcPts val="1500"/>
                 </a:lnSpc>
@@ -7879,7 +8251,7 @@
           </p:nvSpPr>
           <p:spPr>
             <a:xfrm>
-              <a:off x="9229731" y="1737818"/>
+              <a:off x="9229731" y="1757762"/>
               <a:ext cx="878923" cy="176361"/>
             </a:xfrm>
             <a:prstGeom prst="rect">
@@ -7888,10 +8260,10 @@
             <a:noFill/>
           </p:spPr>
           <p:txBody>
-            <a:bodyPr lIns="0" rIns="0" tIns="0" bIns="0" anchorCtr="1" anchor="ctr" wrap="none"/>
-            <a:lstStyle/>
-            <a:p>
-              <a:pPr algn="l" marL="0" marR="0" indent="0">
+            <a:bodyPr wrap="none" lIns="0" tIns="0" rIns="0" bIns="0" anchor="ctr" anchorCtr="1"/>
+            <a:lstStyle/>
+            <a:p>
+              <a:pPr marL="0" marR="0" indent="0" algn="l">
                 <a:lnSpc>
                   <a:spcPts val="1500"/>
                 </a:lnSpc>
@@ -7925,8 +8297,8 @@
           </p:nvSpPr>
           <p:spPr>
             <a:xfrm>
-              <a:off x="9304279" y="2120049"/>
-              <a:ext cx="102903" cy="102903"/>
+              <a:off x="9301558" y="2153544"/>
+              <a:ext cx="75802" cy="75802"/>
             </a:xfrm>
             <a:prstGeom prst="ellipse">
               <a:avLst/>
@@ -7944,7 +8316,9 @@
           <p:txBody>
             <a:bodyPr/>
             <a:lstStyle/>
-            <a:p/>
+            <a:p>
+              <a:endParaRPr/>
+            </a:p>
           </p:txBody>
         </p:sp>
         <p:sp>
@@ -7955,8 +8329,8 @@
           </p:nvSpPr>
           <p:spPr>
             <a:xfrm>
-              <a:off x="9294794" y="2456545"/>
-              <a:ext cx="121874" cy="121874"/>
+              <a:off x="9294783" y="2492750"/>
+              <a:ext cx="89353" cy="89353"/>
             </a:xfrm>
             <a:prstGeom prst="ellipse">
               <a:avLst/>
@@ -7974,7 +8348,9 @@
           <p:txBody>
             <a:bodyPr/>
             <a:lstStyle/>
-            <a:p/>
+            <a:p>
+              <a:endParaRPr/>
+            </a:p>
           </p:txBody>
         </p:sp>
         <p:sp>
@@ -7985,8 +8361,8 @@
           </p:nvSpPr>
           <p:spPr>
             <a:xfrm>
-              <a:off x="9288019" y="2795752"/>
-              <a:ext cx="135425" cy="135425"/>
+              <a:off x="9288007" y="2831956"/>
+              <a:ext cx="102903" cy="102903"/>
             </a:xfrm>
             <a:prstGeom prst="ellipse">
               <a:avLst/>
@@ -8004,7 +8380,9 @@
           <p:txBody>
             <a:bodyPr/>
             <a:lstStyle/>
-            <a:p/>
+            <a:p>
+              <a:endParaRPr/>
+            </a:p>
           </p:txBody>
         </p:sp>
         <p:sp>
@@ -8015,8 +8393,8 @@
           </p:nvSpPr>
           <p:spPr>
             <a:xfrm>
-              <a:off x="9278533" y="3132248"/>
-              <a:ext cx="154396" cy="154396"/>
+              <a:off x="9281232" y="3171163"/>
+              <a:ext cx="116454" cy="116454"/>
             </a:xfrm>
             <a:prstGeom prst="ellipse">
               <a:avLst/>
@@ -8034,7 +8412,9 @@
           <p:txBody>
             <a:bodyPr/>
             <a:lstStyle/>
-            <a:p/>
+            <a:p>
+              <a:endParaRPr/>
+            </a:p>
           </p:txBody>
         </p:sp>
         <p:sp>
@@ -8045,8 +8425,8 @@
           </p:nvSpPr>
           <p:spPr>
             <a:xfrm>
-              <a:off x="9269048" y="3468744"/>
-              <a:ext cx="173367" cy="173367"/>
+              <a:off x="9274457" y="3510369"/>
+              <a:ext cx="130005" cy="130005"/>
             </a:xfrm>
             <a:prstGeom prst="ellipse">
               <a:avLst/>
@@ -8064,7 +8444,9 @@
           <p:txBody>
             <a:bodyPr/>
             <a:lstStyle/>
-            <a:p/>
+            <a:p>
+              <a:endParaRPr/>
+            </a:p>
           </p:txBody>
         </p:sp>
         <p:sp>
@@ -8075,8 +8457,8 @@
           </p:nvSpPr>
           <p:spPr>
             <a:xfrm>
-              <a:off x="9259562" y="3808912"/>
-              <a:ext cx="192337" cy="192337"/>
+              <a:off x="9267681" y="3849575"/>
+              <a:ext cx="143555" cy="143555"/>
             </a:xfrm>
             <a:prstGeom prst="ellipse">
               <a:avLst/>
@@ -8094,7 +8476,9 @@
           <p:txBody>
             <a:bodyPr/>
             <a:lstStyle/>
-            <a:p/>
+            <a:p>
+              <a:endParaRPr/>
+            </a:p>
           </p:txBody>
         </p:sp>
         <p:sp>
@@ -8105,8 +8489,8 @@
           </p:nvSpPr>
           <p:spPr>
             <a:xfrm>
-              <a:off x="9250077" y="4165352"/>
-              <a:ext cx="211308" cy="211308"/>
+              <a:off x="9260906" y="4188781"/>
+              <a:ext cx="157106" cy="157106"/>
             </a:xfrm>
             <a:prstGeom prst="ellipse">
               <a:avLst/>
@@ -8124,7 +8508,9 @@
           <p:txBody>
             <a:bodyPr/>
             <a:lstStyle/>
-            <a:p/>
+            <a:p>
+              <a:endParaRPr/>
+            </a:p>
           </p:txBody>
         </p:sp>
         <p:sp>
@@ -8135,7 +8521,7 @@
           </p:nvSpPr>
           <p:spPr>
             <a:xfrm>
-              <a:off x="9551320" y="2108984"/>
+              <a:off x="9518776" y="2128928"/>
               <a:ext cx="853473" cy="121729"/>
             </a:xfrm>
             <a:prstGeom prst="rect">
@@ -8144,10 +8530,10 @@
             <a:noFill/>
           </p:spPr>
           <p:txBody>
-            <a:bodyPr lIns="0" rIns="0" tIns="0" bIns="0" anchorCtr="1" anchor="ctr" wrap="none"/>
-            <a:lstStyle/>
-            <a:p>
-              <a:pPr algn="l" marL="0" marR="0" indent="0">
+            <a:bodyPr wrap="none" lIns="0" tIns="0" rIns="0" bIns="0" anchor="ctr" anchorCtr="1"/>
+            <a:lstStyle/>
+            <a:p>
+              <a:pPr marL="0" marR="0" indent="0" algn="l">
                 <a:lnSpc>
                   <a:spcPts val="1300"/>
                 </a:lnSpc>
@@ -8181,7 +8567,7 @@
           </p:nvSpPr>
           <p:spPr>
             <a:xfrm>
-              <a:off x="9551320" y="2457707"/>
+              <a:off x="9518776" y="2477651"/>
               <a:ext cx="789464" cy="118988"/>
             </a:xfrm>
             <a:prstGeom prst="rect">
@@ -8190,10 +8576,10 @@
             <a:noFill/>
           </p:spPr>
           <p:txBody>
-            <a:bodyPr lIns="0" rIns="0" tIns="0" bIns="0" anchorCtr="1" anchor="ctr" wrap="none"/>
-            <a:lstStyle/>
-            <a:p>
-              <a:pPr algn="l" marL="0" marR="0" indent="0">
+            <a:bodyPr wrap="none" lIns="0" tIns="0" rIns="0" bIns="0" anchor="ctr" anchorCtr="1"/>
+            <a:lstStyle/>
+            <a:p>
+              <a:pPr marL="0" marR="0" indent="0" algn="l">
                 <a:lnSpc>
                   <a:spcPts val="1300"/>
                 </a:lnSpc>
@@ -8227,7 +8613,7 @@
           </p:nvSpPr>
           <p:spPr>
             <a:xfrm>
-              <a:off x="9551320" y="2803688"/>
+              <a:off x="9518776" y="2823632"/>
               <a:ext cx="789464" cy="118988"/>
             </a:xfrm>
             <a:prstGeom prst="rect">
@@ -8236,10 +8622,10 @@
             <a:noFill/>
           </p:spPr>
           <p:txBody>
-            <a:bodyPr lIns="0" rIns="0" tIns="0" bIns="0" anchorCtr="1" anchor="ctr" wrap="none"/>
-            <a:lstStyle/>
-            <a:p>
-              <a:pPr algn="l" marL="0" marR="0" indent="0">
+            <a:bodyPr wrap="none" lIns="0" tIns="0" rIns="0" bIns="0" anchor="ctr" anchorCtr="1"/>
+            <a:lstStyle/>
+            <a:p>
+              <a:pPr marL="0" marR="0" indent="0" algn="l">
                 <a:lnSpc>
                   <a:spcPts val="1300"/>
                 </a:lnSpc>
@@ -8273,7 +8659,7 @@
           </p:nvSpPr>
           <p:spPr>
             <a:xfrm>
-              <a:off x="9551320" y="3150073"/>
+              <a:off x="9518776" y="3170017"/>
               <a:ext cx="605823" cy="118585"/>
             </a:xfrm>
             <a:prstGeom prst="rect">
@@ -8282,10 +8668,10 @@
             <a:noFill/>
           </p:spPr>
           <p:txBody>
-            <a:bodyPr lIns="0" rIns="0" tIns="0" bIns="0" anchorCtr="1" anchor="ctr" wrap="none"/>
-            <a:lstStyle/>
-            <a:p>
-              <a:pPr algn="l" marL="0" marR="0" indent="0">
+            <a:bodyPr wrap="none" lIns="0" tIns="0" rIns="0" bIns="0" anchor="ctr" anchorCtr="1"/>
+            <a:lstStyle/>
+            <a:p>
+              <a:pPr marL="0" marR="0" indent="0" algn="l">
                 <a:lnSpc>
                   <a:spcPts val="1300"/>
                 </a:lnSpc>
@@ -8319,7 +8705,7 @@
           </p:nvSpPr>
           <p:spPr>
             <a:xfrm>
-              <a:off x="9551320" y="3495651"/>
+              <a:off x="9518776" y="3515595"/>
               <a:ext cx="514002" cy="118988"/>
             </a:xfrm>
             <a:prstGeom prst="rect">
@@ -8328,10 +8714,10 @@
             <a:noFill/>
           </p:spPr>
           <p:txBody>
-            <a:bodyPr lIns="0" rIns="0" tIns="0" bIns="0" anchorCtr="1" anchor="ctr" wrap="none"/>
-            <a:lstStyle/>
-            <a:p>
-              <a:pPr algn="l" marL="0" marR="0" indent="0">
+            <a:bodyPr wrap="none" lIns="0" tIns="0" rIns="0" bIns="0" anchor="ctr" anchorCtr="1"/>
+            <a:lstStyle/>
+            <a:p>
+              <a:pPr marL="0" marR="0" indent="0" algn="l">
                 <a:lnSpc>
                   <a:spcPts val="1300"/>
                 </a:lnSpc>
@@ -8365,7 +8751,7 @@
           </p:nvSpPr>
           <p:spPr>
             <a:xfrm>
-              <a:off x="9551320" y="3845305"/>
+              <a:off x="9518776" y="3861577"/>
               <a:ext cx="514002" cy="118988"/>
             </a:xfrm>
             <a:prstGeom prst="rect">
@@ -8374,10 +8760,10 @@
             <a:noFill/>
           </p:spPr>
           <p:txBody>
-            <a:bodyPr lIns="0" rIns="0" tIns="0" bIns="0" anchorCtr="1" anchor="ctr" wrap="none"/>
-            <a:lstStyle/>
-            <a:p>
-              <a:pPr algn="l" marL="0" marR="0" indent="0">
+            <a:bodyPr wrap="none" lIns="0" tIns="0" rIns="0" bIns="0" anchor="ctr" anchorCtr="1"/>
+            <a:lstStyle/>
+            <a:p>
+              <a:pPr marL="0" marR="0" indent="0" algn="l">
                 <a:lnSpc>
                   <a:spcPts val="1300"/>
                 </a:lnSpc>
@@ -8411,7 +8797,7 @@
           </p:nvSpPr>
           <p:spPr>
             <a:xfrm>
-              <a:off x="9551320" y="4178259"/>
+              <a:off x="9518776" y="4174587"/>
               <a:ext cx="991164" cy="151959"/>
             </a:xfrm>
             <a:prstGeom prst="rect">
@@ -8420,10 +8806,10 @@
             <a:noFill/>
           </p:spPr>
           <p:txBody>
-            <a:bodyPr lIns="0" rIns="0" tIns="0" bIns="0" anchorCtr="1" anchor="ctr" wrap="none"/>
-            <a:lstStyle/>
-            <a:p>
-              <a:pPr algn="l" marL="0" marR="0" indent="0">
+            <a:bodyPr wrap="none" lIns="0" tIns="0" rIns="0" bIns="0" anchor="ctr" anchorCtr="1"/>
+            <a:lstStyle/>
+            <a:p>
+              <a:pPr marL="0" marR="0" indent="0" algn="l">
                 <a:lnSpc>
                   <a:spcPts val="1300"/>
                 </a:lnSpc>
@@ -8457,7 +8843,7 @@
           </p:nvSpPr>
           <p:spPr>
             <a:xfrm>
-              <a:off x="9229731" y="4767702"/>
+              <a:off x="9229731" y="4747758"/>
               <a:ext cx="2054479" cy="179244"/>
             </a:xfrm>
             <a:prstGeom prst="rect">
@@ -8466,10 +8852,10 @@
             <a:noFill/>
           </p:spPr>
           <p:txBody>
-            <a:bodyPr lIns="0" rIns="0" tIns="0" bIns="0" anchorCtr="1" anchor="ctr" wrap="none"/>
-            <a:lstStyle/>
-            <a:p>
-              <a:pPr algn="l" marL="0" marR="0" indent="0">
+            <a:bodyPr wrap="none" lIns="0" tIns="0" rIns="0" bIns="0" anchor="ctr" anchorCtr="1"/>
+            <a:lstStyle/>
+            <a:p>
+              <a:pPr marL="0" marR="0" indent="0" algn="l">
                 <a:lnSpc>
                   <a:spcPts val="1500"/>
                 </a:lnSpc>
@@ -8503,7 +8889,7 @@
           </p:nvSpPr>
           <p:spPr>
             <a:xfrm>
-              <a:off x="9308333" y="5173143"/>
+              <a:off x="9308333" y="5153199"/>
               <a:ext cx="62251" cy="62251"/>
             </a:xfrm>
             <a:prstGeom prst="ellipse">
@@ -8527,7 +8913,9 @@
           <p:txBody>
             <a:bodyPr/>
             <a:lstStyle/>
-            <a:p/>
+            <a:p>
+              <a:endParaRPr/>
+            </a:p>
           </p:txBody>
         </p:sp>
         <p:sp>
@@ -8538,7 +8926,7 @@
           </p:nvSpPr>
           <p:spPr>
             <a:xfrm>
-              <a:off x="9308333" y="5519124"/>
+              <a:off x="9308333" y="5499180"/>
               <a:ext cx="62251" cy="62251"/>
             </a:xfrm>
             <a:prstGeom prst="ellipse">
@@ -8562,7 +8950,9 @@
           <p:txBody>
             <a:bodyPr/>
             <a:lstStyle/>
-            <a:p/>
+            <a:p>
+              <a:endParaRPr/>
+            </a:p>
           </p:txBody>
         </p:sp>
         <p:sp>
@@ -8573,7 +8963,7 @@
           </p:nvSpPr>
           <p:spPr>
             <a:xfrm>
-              <a:off x="9518776" y="5108135"/>
+              <a:off x="9518776" y="5088191"/>
               <a:ext cx="881124" cy="155345"/>
             </a:xfrm>
             <a:prstGeom prst="rect">
@@ -8582,10 +8972,10 @@
             <a:noFill/>
           </p:spPr>
           <p:txBody>
-            <a:bodyPr lIns="0" rIns="0" tIns="0" bIns="0" anchorCtr="1" anchor="ctr" wrap="none"/>
-            <a:lstStyle/>
-            <a:p>
-              <a:pPr algn="l" marL="0" marR="0" indent="0">
+            <a:bodyPr wrap="none" lIns="0" tIns="0" rIns="0" bIns="0" anchor="ctr" anchorCtr="1"/>
+            <a:lstStyle/>
+            <a:p>
+              <a:pPr marL="0" marR="0" indent="0" algn="l">
                 <a:lnSpc>
                   <a:spcPts val="1300"/>
                 </a:lnSpc>
@@ -8619,7 +9009,7 @@
           </p:nvSpPr>
           <p:spPr>
             <a:xfrm>
-              <a:off x="9518776" y="5454117"/>
+              <a:off x="9518776" y="5434173"/>
               <a:ext cx="853554" cy="155345"/>
             </a:xfrm>
             <a:prstGeom prst="rect">
@@ -8628,10 +9018,10 @@
             <a:noFill/>
           </p:spPr>
           <p:txBody>
-            <a:bodyPr lIns="0" rIns="0" tIns="0" bIns="0" anchorCtr="1" anchor="ctr" wrap="none"/>
-            <a:lstStyle/>
-            <a:p>
-              <a:pPr algn="l" marL="0" marR="0" indent="0">
+            <a:bodyPr wrap="none" lIns="0" tIns="0" rIns="0" bIns="0" anchor="ctr" anchorCtr="1"/>
+            <a:lstStyle/>
+            <a:p>
+              <a:pPr marL="0" marR="0" indent="0" algn="l">
                 <a:lnSpc>
                   <a:spcPts val="1300"/>
                 </a:lnSpc>

</xml_diff>